<commit_message>
Pro Asp.net MVC 4 samples
</commit_message>
<xml_diff>
--- a/BasicMVCNorthwind/Asp.Net MVC Tech Talk.pptx
+++ b/BasicMVCNorthwind/Asp.Net MVC Tech Talk.pptx
@@ -2,13 +2,26 @@
 <file path=ppt/presentation.xml><?xml version="1.0" encoding="utf-8"?>
 <p:presentation xmlns:a="http://schemas.openxmlformats.org/drawingml/2006/main" xmlns:r="http://schemas.openxmlformats.org/officeDocument/2006/relationships" xmlns:p="http://schemas.openxmlformats.org/presentationml/2006/main" saveSubsetFonts="1">
   <p:sldMasterIdLst>
-    <p:sldMasterId id="2147483648" r:id="rId1"/>
+    <p:sldMasterId id="2147483766" r:id="rId1"/>
   </p:sldMasterIdLst>
   <p:sldIdLst>
     <p:sldId id="256" r:id="rId2"/>
     <p:sldId id="257" r:id="rId3"/>
-    <p:sldId id="259" r:id="rId4"/>
-    <p:sldId id="258" r:id="rId5"/>
+    <p:sldId id="258" r:id="rId4"/>
+    <p:sldId id="259" r:id="rId5"/>
+    <p:sldId id="260" r:id="rId6"/>
+    <p:sldId id="261" r:id="rId7"/>
+    <p:sldId id="262" r:id="rId8"/>
+    <p:sldId id="263" r:id="rId9"/>
+    <p:sldId id="264" r:id="rId10"/>
+    <p:sldId id="265" r:id="rId11"/>
+    <p:sldId id="266" r:id="rId12"/>
+    <p:sldId id="267" r:id="rId13"/>
+    <p:sldId id="268" r:id="rId14"/>
+    <p:sldId id="269" r:id="rId15"/>
+    <p:sldId id="270" r:id="rId16"/>
+    <p:sldId id="271" r:id="rId17"/>
+    <p:sldId id="272" r:id="rId18"/>
   </p:sldIdLst>
   <p:sldSz cx="12192000" cy="6858000"/>
   <p:notesSz cx="6858000" cy="9144000"/>
@@ -107,6 +120,22 @@
       </a:defRPr>
     </a:lvl9pPr>
   </p:defaultTextStyle>
+  <p:extLst>
+    <p:ext uri="{EFAFB233-063F-42B5-8137-9DF3F51BA10A}">
+      <p15:sldGuideLst xmlns:p15="http://schemas.microsoft.com/office/powerpoint/2012/main">
+        <p15:guide id="1" orient="horz" pos="2160">
+          <p15:clr>
+            <a:srgbClr val="A4A3A4"/>
+          </p15:clr>
+        </p15:guide>
+        <p15:guide id="2" pos="3840">
+          <p15:clr>
+            <a:srgbClr val="A4A3A4"/>
+          </p15:clr>
+        </p15:guide>
+      </p15:sldGuideLst>
+    </p:ext>
+  </p:extLst>
 </p:presentation>
 </file>
 
@@ -241,7 +270,7 @@
           <a:p>
             <a:fld id="{87616BB5-C631-4E5A-9B7F-8BF46521B327}" type="datetimeFigureOut">
               <a:rPr lang="zh-CN" altLang="en-US" smtClean="0"/>
-              <a:t>2014/4/18</a:t>
+              <a:t>2014/4/20</a:t>
             </a:fld>
             <a:endParaRPr lang="zh-CN" altLang="en-US"/>
           </a:p>
@@ -292,7 +321,7 @@
     </p:spTree>
     <p:extLst>
       <p:ext uri="{BB962C8B-B14F-4D97-AF65-F5344CB8AC3E}">
-        <p14:creationId xmlns:p14="http://schemas.microsoft.com/office/powerpoint/2010/main" val="3329576919"/>
+        <p14:creationId xmlns:p14="http://schemas.microsoft.com/office/powerpoint/2010/main" val="3789944762"/>
       </p:ext>
     </p:extLst>
   </p:cSld>
@@ -411,7 +440,7 @@
           <a:p>
             <a:fld id="{87616BB5-C631-4E5A-9B7F-8BF46521B327}" type="datetimeFigureOut">
               <a:rPr lang="zh-CN" altLang="en-US" smtClean="0"/>
-              <a:t>2014/4/18</a:t>
+              <a:t>2014/4/20</a:t>
             </a:fld>
             <a:endParaRPr lang="zh-CN" altLang="en-US"/>
           </a:p>
@@ -462,7 +491,7 @@
     </p:spTree>
     <p:extLst>
       <p:ext uri="{BB962C8B-B14F-4D97-AF65-F5344CB8AC3E}">
-        <p14:creationId xmlns:p14="http://schemas.microsoft.com/office/powerpoint/2010/main" val="2014789124"/>
+        <p14:creationId xmlns:p14="http://schemas.microsoft.com/office/powerpoint/2010/main" val="3743906770"/>
       </p:ext>
     </p:extLst>
   </p:cSld>
@@ -591,7 +620,7 @@
           <a:p>
             <a:fld id="{87616BB5-C631-4E5A-9B7F-8BF46521B327}" type="datetimeFigureOut">
               <a:rPr lang="zh-CN" altLang="en-US" smtClean="0"/>
-              <a:t>2014/4/18</a:t>
+              <a:t>2014/4/20</a:t>
             </a:fld>
             <a:endParaRPr lang="zh-CN" altLang="en-US"/>
           </a:p>
@@ -642,7 +671,7 @@
     </p:spTree>
     <p:extLst>
       <p:ext uri="{BB962C8B-B14F-4D97-AF65-F5344CB8AC3E}">
-        <p14:creationId xmlns:p14="http://schemas.microsoft.com/office/powerpoint/2010/main" val="3403766162"/>
+        <p14:creationId xmlns:p14="http://schemas.microsoft.com/office/powerpoint/2010/main" val="3264102476"/>
       </p:ext>
     </p:extLst>
   </p:cSld>
@@ -761,7 +790,7 @@
           <a:p>
             <a:fld id="{87616BB5-C631-4E5A-9B7F-8BF46521B327}" type="datetimeFigureOut">
               <a:rPr lang="zh-CN" altLang="en-US" smtClean="0"/>
-              <a:t>2014/4/18</a:t>
+              <a:t>2014/4/20</a:t>
             </a:fld>
             <a:endParaRPr lang="zh-CN" altLang="en-US"/>
           </a:p>
@@ -812,7 +841,7 @@
     </p:spTree>
     <p:extLst>
       <p:ext uri="{BB962C8B-B14F-4D97-AF65-F5344CB8AC3E}">
-        <p14:creationId xmlns:p14="http://schemas.microsoft.com/office/powerpoint/2010/main" val="2289616829"/>
+        <p14:creationId xmlns:p14="http://schemas.microsoft.com/office/powerpoint/2010/main" val="615451053"/>
       </p:ext>
     </p:extLst>
   </p:cSld>
@@ -1007,7 +1036,7 @@
           <a:p>
             <a:fld id="{87616BB5-C631-4E5A-9B7F-8BF46521B327}" type="datetimeFigureOut">
               <a:rPr lang="zh-CN" altLang="en-US" smtClean="0"/>
-              <a:t>2014/4/18</a:t>
+              <a:t>2014/4/20</a:t>
             </a:fld>
             <a:endParaRPr lang="zh-CN" altLang="en-US"/>
           </a:p>
@@ -1058,7 +1087,7 @@
     </p:spTree>
     <p:extLst>
       <p:ext uri="{BB962C8B-B14F-4D97-AF65-F5344CB8AC3E}">
-        <p14:creationId xmlns:p14="http://schemas.microsoft.com/office/powerpoint/2010/main" val="366923674"/>
+        <p14:creationId xmlns:p14="http://schemas.microsoft.com/office/powerpoint/2010/main" val="1519137530"/>
       </p:ext>
     </p:extLst>
   </p:cSld>
@@ -1239,7 +1268,7 @@
           <a:p>
             <a:fld id="{87616BB5-C631-4E5A-9B7F-8BF46521B327}" type="datetimeFigureOut">
               <a:rPr lang="zh-CN" altLang="en-US" smtClean="0"/>
-              <a:t>2014/4/18</a:t>
+              <a:t>2014/4/20</a:t>
             </a:fld>
             <a:endParaRPr lang="zh-CN" altLang="en-US"/>
           </a:p>
@@ -1290,7 +1319,7 @@
     </p:spTree>
     <p:extLst>
       <p:ext uri="{BB962C8B-B14F-4D97-AF65-F5344CB8AC3E}">
-        <p14:creationId xmlns:p14="http://schemas.microsoft.com/office/powerpoint/2010/main" val="3693142645"/>
+        <p14:creationId xmlns:p14="http://schemas.microsoft.com/office/powerpoint/2010/main" val="1511710530"/>
       </p:ext>
     </p:extLst>
   </p:cSld>
@@ -1606,7 +1635,7 @@
           <a:p>
             <a:fld id="{87616BB5-C631-4E5A-9B7F-8BF46521B327}" type="datetimeFigureOut">
               <a:rPr lang="zh-CN" altLang="en-US" smtClean="0"/>
-              <a:t>2014/4/18</a:t>
+              <a:t>2014/4/20</a:t>
             </a:fld>
             <a:endParaRPr lang="zh-CN" altLang="en-US"/>
           </a:p>
@@ -1657,7 +1686,7 @@
     </p:spTree>
     <p:extLst>
       <p:ext uri="{BB962C8B-B14F-4D97-AF65-F5344CB8AC3E}">
-        <p14:creationId xmlns:p14="http://schemas.microsoft.com/office/powerpoint/2010/main" val="3537912404"/>
+        <p14:creationId xmlns:p14="http://schemas.microsoft.com/office/powerpoint/2010/main" val="4222748799"/>
       </p:ext>
     </p:extLst>
   </p:cSld>
@@ -1724,7 +1753,7 @@
           <a:p>
             <a:fld id="{87616BB5-C631-4E5A-9B7F-8BF46521B327}" type="datetimeFigureOut">
               <a:rPr lang="zh-CN" altLang="en-US" smtClean="0"/>
-              <a:t>2014/4/18</a:t>
+              <a:t>2014/4/20</a:t>
             </a:fld>
             <a:endParaRPr lang="zh-CN" altLang="en-US"/>
           </a:p>
@@ -1775,7 +1804,7 @@
     </p:spTree>
     <p:extLst>
       <p:ext uri="{BB962C8B-B14F-4D97-AF65-F5344CB8AC3E}">
-        <p14:creationId xmlns:p14="http://schemas.microsoft.com/office/powerpoint/2010/main" val="1723175013"/>
+        <p14:creationId xmlns:p14="http://schemas.microsoft.com/office/powerpoint/2010/main" val="2703758262"/>
       </p:ext>
     </p:extLst>
   </p:cSld>
@@ -1819,7 +1848,7 @@
           <a:p>
             <a:fld id="{87616BB5-C631-4E5A-9B7F-8BF46521B327}" type="datetimeFigureOut">
               <a:rPr lang="zh-CN" altLang="en-US" smtClean="0"/>
-              <a:t>2014/4/18</a:t>
+              <a:t>2014/4/20</a:t>
             </a:fld>
             <a:endParaRPr lang="zh-CN" altLang="en-US"/>
           </a:p>
@@ -1870,7 +1899,7 @@
     </p:spTree>
     <p:extLst>
       <p:ext uri="{BB962C8B-B14F-4D97-AF65-F5344CB8AC3E}">
-        <p14:creationId xmlns:p14="http://schemas.microsoft.com/office/powerpoint/2010/main" val="3835000531"/>
+        <p14:creationId xmlns:p14="http://schemas.microsoft.com/office/powerpoint/2010/main" val="2757826040"/>
       </p:ext>
     </p:extLst>
   </p:cSld>
@@ -2096,7 +2125,7 @@
           <a:p>
             <a:fld id="{87616BB5-C631-4E5A-9B7F-8BF46521B327}" type="datetimeFigureOut">
               <a:rPr lang="zh-CN" altLang="en-US" smtClean="0"/>
-              <a:t>2014/4/18</a:t>
+              <a:t>2014/4/20</a:t>
             </a:fld>
             <a:endParaRPr lang="zh-CN" altLang="en-US"/>
           </a:p>
@@ -2147,7 +2176,7 @@
     </p:spTree>
     <p:extLst>
       <p:ext uri="{BB962C8B-B14F-4D97-AF65-F5344CB8AC3E}">
-        <p14:creationId xmlns:p14="http://schemas.microsoft.com/office/powerpoint/2010/main" val="812223527"/>
+        <p14:creationId xmlns:p14="http://schemas.microsoft.com/office/powerpoint/2010/main" val="620488080"/>
       </p:ext>
     </p:extLst>
   </p:cSld>
@@ -2349,7 +2378,7 @@
           <a:p>
             <a:fld id="{87616BB5-C631-4E5A-9B7F-8BF46521B327}" type="datetimeFigureOut">
               <a:rPr lang="zh-CN" altLang="en-US" smtClean="0"/>
-              <a:t>2014/4/18</a:t>
+              <a:t>2014/4/20</a:t>
             </a:fld>
             <a:endParaRPr lang="zh-CN" altLang="en-US"/>
           </a:p>
@@ -2400,7 +2429,7 @@
     </p:spTree>
     <p:extLst>
       <p:ext uri="{BB962C8B-B14F-4D97-AF65-F5344CB8AC3E}">
-        <p14:creationId xmlns:p14="http://schemas.microsoft.com/office/powerpoint/2010/main" val="973377627"/>
+        <p14:creationId xmlns:p14="http://schemas.microsoft.com/office/powerpoint/2010/main" val="2598550485"/>
       </p:ext>
     </p:extLst>
   </p:cSld>
@@ -2562,7 +2591,7 @@
           <a:p>
             <a:fld id="{87616BB5-C631-4E5A-9B7F-8BF46521B327}" type="datetimeFigureOut">
               <a:rPr lang="zh-CN" altLang="en-US" smtClean="0"/>
-              <a:t>2014/4/18</a:t>
+              <a:t>2014/4/20</a:t>
             </a:fld>
             <a:endParaRPr lang="zh-CN" altLang="en-US"/>
           </a:p>
@@ -2649,23 +2678,23 @@
     </p:spTree>
     <p:extLst>
       <p:ext uri="{BB962C8B-B14F-4D97-AF65-F5344CB8AC3E}">
-        <p14:creationId xmlns:p14="http://schemas.microsoft.com/office/powerpoint/2010/main" val="3325315403"/>
+        <p14:creationId xmlns:p14="http://schemas.microsoft.com/office/powerpoint/2010/main" val="2955724905"/>
       </p:ext>
     </p:extLst>
   </p:cSld>
   <p:clrMap bg1="lt1" tx1="dk1" bg2="lt2" tx2="dk2" accent1="accent1" accent2="accent2" accent3="accent3" accent4="accent4" accent5="accent5" accent6="accent6" hlink="hlink" folHlink="folHlink"/>
   <p:sldLayoutIdLst>
-    <p:sldLayoutId id="2147483649" r:id="rId1"/>
-    <p:sldLayoutId id="2147483650" r:id="rId2"/>
-    <p:sldLayoutId id="2147483651" r:id="rId3"/>
-    <p:sldLayoutId id="2147483652" r:id="rId4"/>
-    <p:sldLayoutId id="2147483653" r:id="rId5"/>
-    <p:sldLayoutId id="2147483654" r:id="rId6"/>
-    <p:sldLayoutId id="2147483655" r:id="rId7"/>
-    <p:sldLayoutId id="2147483656" r:id="rId8"/>
-    <p:sldLayoutId id="2147483657" r:id="rId9"/>
-    <p:sldLayoutId id="2147483658" r:id="rId10"/>
-    <p:sldLayoutId id="2147483659" r:id="rId11"/>
+    <p:sldLayoutId id="2147483767" r:id="rId1"/>
+    <p:sldLayoutId id="2147483768" r:id="rId2"/>
+    <p:sldLayoutId id="2147483769" r:id="rId3"/>
+    <p:sldLayoutId id="2147483770" r:id="rId4"/>
+    <p:sldLayoutId id="2147483771" r:id="rId5"/>
+    <p:sldLayoutId id="2147483772" r:id="rId6"/>
+    <p:sldLayoutId id="2147483773" r:id="rId7"/>
+    <p:sldLayoutId id="2147483774" r:id="rId8"/>
+    <p:sldLayoutId id="2147483775" r:id="rId9"/>
+    <p:sldLayoutId id="2147483776" r:id="rId10"/>
+    <p:sldLayoutId id="2147483777" r:id="rId11"/>
   </p:sldLayoutIdLst>
   <p:txStyles>
     <p:titleStyle>
@@ -3019,6 +3048,2275 @@
   <p:clrMapOvr>
     <a:masterClrMapping/>
   </p:clrMapOvr>
+  <p:timing>
+    <p:tnLst>
+      <p:par>
+        <p:cTn id="1" dur="indefinite" restart="never" nodeType="tmRoot"/>
+      </p:par>
+    </p:tnLst>
+  </p:timing>
+</p:sld>
+</file>
+
+<file path=ppt/slides/slide10.xml><?xml version="1.0" encoding="utf-8"?>
+<p:sld xmlns:a="http://schemas.openxmlformats.org/drawingml/2006/main" xmlns:r="http://schemas.openxmlformats.org/officeDocument/2006/relationships" xmlns:p="http://schemas.openxmlformats.org/presentationml/2006/main">
+  <p:cSld>
+    <p:spTree>
+      <p:nvGrpSpPr>
+        <p:cNvPr id="1" name=""/>
+        <p:cNvGrpSpPr/>
+        <p:nvPr/>
+      </p:nvGrpSpPr>
+      <p:grpSpPr>
+        <a:xfrm>
+          <a:off x="0" y="0"/>
+          <a:ext cx="0" cy="0"/>
+          <a:chOff x="0" y="0"/>
+          <a:chExt cx="0" cy="0"/>
+        </a:xfrm>
+      </p:grpSpPr>
+      <p:sp>
+        <p:nvSpPr>
+          <p:cNvPr id="2" name="Title 1"/>
+          <p:cNvSpPr>
+            <a:spLocks noGrp="1"/>
+          </p:cNvSpPr>
+          <p:nvPr>
+            <p:ph type="title"/>
+          </p:nvPr>
+        </p:nvSpPr>
+        <p:spPr/>
+        <p:txBody>
+          <a:bodyPr/>
+          <a:lstStyle/>
+          <a:p>
+            <a:r>
+              <a:rPr lang="en-US" altLang="zh-CN" dirty="0" smtClean="0"/>
+              <a:t>URL Routing</a:t>
+            </a:r>
+            <a:endParaRPr lang="zh-CN" altLang="en-US" dirty="0"/>
+          </a:p>
+        </p:txBody>
+      </p:sp>
+      <p:sp>
+        <p:nvSpPr>
+          <p:cNvPr id="3" name="Content Placeholder 2"/>
+          <p:cNvSpPr>
+            <a:spLocks noGrp="1"/>
+          </p:cNvSpPr>
+          <p:nvPr>
+            <p:ph idx="1"/>
+          </p:nvPr>
+        </p:nvSpPr>
+        <p:spPr/>
+        <p:txBody>
+          <a:bodyPr>
+            <a:normAutofit/>
+          </a:bodyPr>
+          <a:lstStyle/>
+          <a:p>
+            <a:pPr marL="0" indent="0">
+              <a:buNone/>
+            </a:pPr>
+            <a:r>
+              <a:rPr lang="en-US" altLang="zh-CN" sz="2400" b="1" dirty="0" smtClean="0"/>
+              <a:t>Generating URLs (not links)</a:t>
+            </a:r>
+          </a:p>
+          <a:p>
+            <a:pPr marL="0" indent="0">
+              <a:buNone/>
+            </a:pPr>
+            <a:r>
+              <a:rPr lang="en-US" altLang="zh-CN" sz="2400" dirty="0"/>
+              <a:t>@</a:t>
+            </a:r>
+            <a:r>
+              <a:rPr lang="en-US" altLang="zh-CN" sz="2400" dirty="0" err="1"/>
+              <a:t>Url.Action</a:t>
+            </a:r>
+            <a:r>
+              <a:rPr lang="en-US" altLang="zh-CN" sz="2400" dirty="0"/>
+              <a:t>("Edit", "Product", new { id = 0 </a:t>
+            </a:r>
+            <a:r>
+              <a:rPr lang="en-US" altLang="zh-CN" sz="2400" dirty="0" smtClean="0"/>
+              <a:t>})</a:t>
+            </a:r>
+          </a:p>
+          <a:p>
+            <a:pPr marL="0" indent="0">
+              <a:buNone/>
+            </a:pPr>
+            <a:r>
+              <a:rPr lang="en-US" altLang="zh-CN" sz="2400" dirty="0"/>
+              <a:t>/Product/Edit/0 </a:t>
+            </a:r>
+            <a:endParaRPr lang="zh-CN" altLang="en-US" sz="2400" dirty="0"/>
+          </a:p>
+        </p:txBody>
+      </p:sp>
+    </p:spTree>
+    <p:extLst>
+      <p:ext uri="{BB962C8B-B14F-4D97-AF65-F5344CB8AC3E}">
+        <p14:creationId xmlns:p14="http://schemas.microsoft.com/office/powerpoint/2010/main" val="620494418"/>
+      </p:ext>
+    </p:extLst>
+  </p:cSld>
+  <p:clrMapOvr>
+    <a:masterClrMapping/>
+  </p:clrMapOvr>
+</p:sld>
+</file>
+
+<file path=ppt/slides/slide11.xml><?xml version="1.0" encoding="utf-8"?>
+<p:sld xmlns:a="http://schemas.openxmlformats.org/drawingml/2006/main" xmlns:r="http://schemas.openxmlformats.org/officeDocument/2006/relationships" xmlns:p="http://schemas.openxmlformats.org/presentationml/2006/main">
+  <p:cSld>
+    <p:spTree>
+      <p:nvGrpSpPr>
+        <p:cNvPr id="1" name=""/>
+        <p:cNvGrpSpPr/>
+        <p:nvPr/>
+      </p:nvGrpSpPr>
+      <p:grpSpPr>
+        <a:xfrm>
+          <a:off x="0" y="0"/>
+          <a:ext cx="0" cy="0"/>
+          <a:chOff x="0" y="0"/>
+          <a:chExt cx="0" cy="0"/>
+        </a:xfrm>
+      </p:grpSpPr>
+      <p:sp>
+        <p:nvSpPr>
+          <p:cNvPr id="2" name="Title 1"/>
+          <p:cNvSpPr>
+            <a:spLocks noGrp="1"/>
+          </p:cNvSpPr>
+          <p:nvPr>
+            <p:ph type="title"/>
+          </p:nvPr>
+        </p:nvSpPr>
+        <p:spPr/>
+        <p:txBody>
+          <a:bodyPr/>
+          <a:lstStyle/>
+          <a:p>
+            <a:r>
+              <a:rPr lang="en-US" altLang="zh-CN" dirty="0" smtClean="0"/>
+              <a:t>Controllers and Actions</a:t>
+            </a:r>
+            <a:endParaRPr lang="zh-CN" altLang="en-US" dirty="0"/>
+          </a:p>
+        </p:txBody>
+      </p:sp>
+      <p:sp>
+        <p:nvSpPr>
+          <p:cNvPr id="3" name="Content Placeholder 2"/>
+          <p:cNvSpPr>
+            <a:spLocks noGrp="1"/>
+          </p:cNvSpPr>
+          <p:nvPr>
+            <p:ph idx="1"/>
+          </p:nvPr>
+        </p:nvSpPr>
+        <p:spPr/>
+        <p:txBody>
+          <a:bodyPr>
+            <a:normAutofit/>
+          </a:bodyPr>
+          <a:lstStyle/>
+          <a:p>
+            <a:pPr marL="0" indent="0">
+              <a:buNone/>
+            </a:pPr>
+            <a:r>
+              <a:rPr lang="en-US" altLang="zh-CN" sz="2400" dirty="0" smtClean="0"/>
+              <a:t>Responsible for </a:t>
+            </a:r>
+            <a:r>
+              <a:rPr lang="en-US" altLang="zh-CN" sz="2400" dirty="0"/>
+              <a:t>processing incoming </a:t>
+            </a:r>
+            <a:r>
+              <a:rPr lang="en-US" altLang="zh-CN" sz="2400" dirty="0" smtClean="0"/>
+              <a:t>requests, performing </a:t>
+            </a:r>
+            <a:r>
+              <a:rPr lang="en-US" altLang="zh-CN" sz="2400" dirty="0"/>
+              <a:t>operations on the domain </a:t>
+            </a:r>
+            <a:r>
+              <a:rPr lang="en-US" altLang="zh-CN" sz="2400" dirty="0" smtClean="0"/>
+              <a:t>model</a:t>
+            </a:r>
+            <a:r>
+              <a:rPr lang="en-US" altLang="zh-CN" sz="2400" dirty="0"/>
+              <a:t>, and selecting views to render to the </a:t>
+            </a:r>
+            <a:r>
+              <a:rPr lang="en-US" altLang="zh-CN" sz="2400" dirty="0" smtClean="0"/>
+              <a:t>user</a:t>
+            </a:r>
+          </a:p>
+          <a:p>
+            <a:pPr marL="0" indent="0">
+              <a:buNone/>
+            </a:pPr>
+            <a:endParaRPr lang="en-US" altLang="zh-CN" sz="2400" dirty="0"/>
+          </a:p>
+          <a:p>
+            <a:pPr marL="0" indent="0">
+              <a:buNone/>
+            </a:pPr>
+            <a:r>
+              <a:rPr lang="en-US" altLang="zh-CN" sz="2400" b="1" dirty="0" err="1" smtClean="0"/>
+              <a:t>System.Web.Mvc.Controller</a:t>
+            </a:r>
+            <a:r>
+              <a:rPr lang="en-US" altLang="zh-CN" sz="2400" b="1" dirty="0" smtClean="0"/>
+              <a:t> is the class </a:t>
+            </a:r>
+            <a:r>
+              <a:rPr lang="en-US" altLang="zh-CN" sz="2400" dirty="0"/>
+              <a:t>provides three key </a:t>
+            </a:r>
+            <a:r>
+              <a:rPr lang="en-US" altLang="zh-CN" sz="2400" dirty="0" smtClean="0"/>
+              <a:t>features:</a:t>
+            </a:r>
+          </a:p>
+          <a:p>
+            <a:pPr marL="0" indent="0">
+              <a:buNone/>
+            </a:pPr>
+            <a:r>
+              <a:rPr lang="en-US" altLang="zh-CN" sz="2400" dirty="0" smtClean="0"/>
+              <a:t>Action methods, Action results, Filters</a:t>
+            </a:r>
+            <a:endParaRPr lang="zh-CN" altLang="en-US" sz="2400" dirty="0"/>
+          </a:p>
+        </p:txBody>
+      </p:sp>
+    </p:spTree>
+    <p:extLst>
+      <p:ext uri="{BB962C8B-B14F-4D97-AF65-F5344CB8AC3E}">
+        <p14:creationId xmlns:p14="http://schemas.microsoft.com/office/powerpoint/2010/main" val="2665492482"/>
+      </p:ext>
+    </p:extLst>
+  </p:cSld>
+  <p:clrMapOvr>
+    <a:masterClrMapping/>
+  </p:clrMapOvr>
+</p:sld>
+</file>
+
+<file path=ppt/slides/slide12.xml><?xml version="1.0" encoding="utf-8"?>
+<p:sld xmlns:a="http://schemas.openxmlformats.org/drawingml/2006/main" xmlns:r="http://schemas.openxmlformats.org/officeDocument/2006/relationships" xmlns:p="http://schemas.openxmlformats.org/presentationml/2006/main">
+  <p:cSld>
+    <p:spTree>
+      <p:nvGrpSpPr>
+        <p:cNvPr id="1" name=""/>
+        <p:cNvGrpSpPr/>
+        <p:nvPr/>
+      </p:nvGrpSpPr>
+      <p:grpSpPr>
+        <a:xfrm>
+          <a:off x="0" y="0"/>
+          <a:ext cx="0" cy="0"/>
+          <a:chOff x="0" y="0"/>
+          <a:chExt cx="0" cy="0"/>
+        </a:xfrm>
+      </p:grpSpPr>
+      <p:sp>
+        <p:nvSpPr>
+          <p:cNvPr id="2" name="Title 1"/>
+          <p:cNvSpPr>
+            <a:spLocks noGrp="1"/>
+          </p:cNvSpPr>
+          <p:nvPr>
+            <p:ph type="title"/>
+          </p:nvPr>
+        </p:nvSpPr>
+        <p:spPr/>
+        <p:txBody>
+          <a:bodyPr/>
+          <a:lstStyle/>
+          <a:p>
+            <a:r>
+              <a:rPr lang="en-US" altLang="zh-CN" dirty="0"/>
+              <a:t>Controllers and Actions</a:t>
+            </a:r>
+            <a:endParaRPr lang="zh-CN" altLang="en-US" dirty="0"/>
+          </a:p>
+        </p:txBody>
+      </p:sp>
+      <p:sp>
+        <p:nvSpPr>
+          <p:cNvPr id="3" name="Content Placeholder 2"/>
+          <p:cNvSpPr>
+            <a:spLocks noGrp="1"/>
+          </p:cNvSpPr>
+          <p:nvPr>
+            <p:ph idx="1"/>
+          </p:nvPr>
+        </p:nvSpPr>
+        <p:spPr/>
+        <p:txBody>
+          <a:bodyPr>
+            <a:normAutofit/>
+          </a:bodyPr>
+          <a:lstStyle/>
+          <a:p>
+            <a:r>
+              <a:rPr lang="en-US" altLang="zh-CN" dirty="0" smtClean="0"/>
+              <a:t>Receiving Input</a:t>
+            </a:r>
+          </a:p>
+          <a:p>
+            <a:pPr marL="0" indent="0">
+              <a:buNone/>
+            </a:pPr>
+            <a:r>
+              <a:rPr lang="en-US" altLang="zh-CN" sz="2400" dirty="0" smtClean="0"/>
+              <a:t>Getting Data from Context Objects (extract manually)</a:t>
+            </a:r>
+          </a:p>
+          <a:p>
+            <a:pPr marL="0" indent="0">
+              <a:buNone/>
+            </a:pPr>
+            <a:r>
+              <a:rPr lang="en-US" altLang="zh-CN" dirty="0"/>
+              <a:t> </a:t>
+            </a:r>
+            <a:r>
+              <a:rPr lang="en-US" altLang="zh-CN" dirty="0"/>
+              <a:t> </a:t>
+            </a:r>
+            <a:r>
+              <a:rPr lang="en-US" altLang="zh-CN" dirty="0" smtClean="0"/>
+              <a:t>      </a:t>
+            </a:r>
+            <a:r>
+              <a:rPr lang="en-US" altLang="zh-CN" sz="2000" dirty="0" err="1" smtClean="0"/>
+              <a:t>ViewBag.RequestUrl</a:t>
+            </a:r>
+            <a:r>
+              <a:rPr lang="en-US" altLang="zh-CN" sz="2000" dirty="0" smtClean="0"/>
+              <a:t> </a:t>
+            </a:r>
+            <a:r>
+              <a:rPr lang="en-US" altLang="zh-CN" sz="2000" dirty="0"/>
+              <a:t>= </a:t>
+            </a:r>
+            <a:r>
+              <a:rPr lang="en-US" altLang="zh-CN" sz="2000" dirty="0" err="1"/>
+              <a:t>Request.Url</a:t>
+            </a:r>
+            <a:r>
+              <a:rPr lang="en-US" altLang="zh-CN" sz="2000" dirty="0"/>
+              <a:t>;</a:t>
+            </a:r>
+          </a:p>
+          <a:p>
+            <a:pPr marL="0" indent="0">
+              <a:buNone/>
+            </a:pPr>
+            <a:r>
+              <a:rPr lang="en-US" altLang="zh-CN" sz="2000" dirty="0"/>
+              <a:t>            </a:t>
+            </a:r>
+            <a:r>
+              <a:rPr lang="en-US" altLang="zh-CN" sz="2000" dirty="0" err="1"/>
+              <a:t>ViewBag.UserHostAddress</a:t>
+            </a:r>
+            <a:r>
+              <a:rPr lang="en-US" altLang="zh-CN" sz="2000" dirty="0"/>
+              <a:t> = </a:t>
+            </a:r>
+            <a:r>
+              <a:rPr lang="en-US" altLang="zh-CN" sz="2000" dirty="0" err="1"/>
+              <a:t>Request.UserHostAddress</a:t>
+            </a:r>
+            <a:r>
+              <a:rPr lang="en-US" altLang="zh-CN" sz="2000" dirty="0"/>
+              <a:t>;</a:t>
+            </a:r>
+          </a:p>
+          <a:p>
+            <a:pPr marL="0" indent="0">
+              <a:buNone/>
+            </a:pPr>
+            <a:r>
+              <a:rPr lang="en-US" altLang="zh-CN" sz="2000" dirty="0"/>
+              <a:t>            string </a:t>
+            </a:r>
+            <a:r>
+              <a:rPr lang="en-US" altLang="zh-CN" sz="2000" dirty="0" err="1"/>
+              <a:t>serverName</a:t>
+            </a:r>
+            <a:r>
+              <a:rPr lang="en-US" altLang="zh-CN" sz="2000" dirty="0"/>
+              <a:t> = </a:t>
+            </a:r>
+            <a:r>
+              <a:rPr lang="en-US" altLang="zh-CN" sz="2000" dirty="0" err="1"/>
+              <a:t>Server.MachineName</a:t>
+            </a:r>
+            <a:r>
+              <a:rPr lang="en-US" altLang="zh-CN" sz="2000" dirty="0"/>
+              <a:t>;</a:t>
+            </a:r>
+          </a:p>
+          <a:p>
+            <a:pPr marL="0" indent="0">
+              <a:buNone/>
+            </a:pPr>
+            <a:r>
+              <a:rPr lang="en-US" altLang="zh-CN" sz="2000" dirty="0"/>
+              <a:t>            string </a:t>
+            </a:r>
+            <a:r>
+              <a:rPr lang="en-US" altLang="zh-CN" sz="2000" dirty="0" err="1"/>
+              <a:t>userName</a:t>
+            </a:r>
+            <a:r>
+              <a:rPr lang="en-US" altLang="zh-CN" sz="2000" dirty="0"/>
+              <a:t> = </a:t>
+            </a:r>
+            <a:r>
+              <a:rPr lang="en-US" altLang="zh-CN" sz="2000" dirty="0" err="1"/>
+              <a:t>User.Identity.Name</a:t>
+            </a:r>
+            <a:r>
+              <a:rPr lang="en-US" altLang="zh-CN" sz="2000" dirty="0"/>
+              <a:t>;</a:t>
+            </a:r>
+            <a:endParaRPr lang="en-US" altLang="zh-CN" sz="2000" dirty="0" smtClean="0"/>
+          </a:p>
+          <a:p>
+            <a:pPr marL="0" indent="0">
+              <a:buNone/>
+            </a:pPr>
+            <a:r>
+              <a:rPr lang="en-US" altLang="zh-CN" sz="2400" dirty="0" smtClean="0"/>
+              <a:t>Using Action Method Parameters (value providers &amp; model binders)</a:t>
+            </a:r>
+          </a:p>
+          <a:p>
+            <a:pPr marL="0" indent="0">
+              <a:buNone/>
+            </a:pPr>
+            <a:endParaRPr lang="zh-CN" altLang="en-US" sz="2400" dirty="0"/>
+          </a:p>
+        </p:txBody>
+      </p:sp>
+      <p:pic>
+        <p:nvPicPr>
+          <p:cNvPr id="4" name="Picture 3"/>
+          <p:cNvPicPr>
+            <a:picLocks noChangeAspect="1"/>
+          </p:cNvPicPr>
+          <p:nvPr/>
+        </p:nvPicPr>
+        <p:blipFill>
+          <a:blip r:embed="rId2"/>
+          <a:stretch>
+            <a:fillRect/>
+          </a:stretch>
+        </p:blipFill>
+        <p:spPr>
+          <a:xfrm>
+            <a:off x="838200" y="4957763"/>
+            <a:ext cx="3048000" cy="1219200"/>
+          </a:xfrm>
+          <a:prstGeom prst="rect">
+            <a:avLst/>
+          </a:prstGeom>
+        </p:spPr>
+      </p:pic>
+    </p:spTree>
+    <p:extLst>
+      <p:ext uri="{BB962C8B-B14F-4D97-AF65-F5344CB8AC3E}">
+        <p14:creationId xmlns:p14="http://schemas.microsoft.com/office/powerpoint/2010/main" val="949030371"/>
+      </p:ext>
+    </p:extLst>
+  </p:cSld>
+  <p:clrMapOvr>
+    <a:masterClrMapping/>
+  </p:clrMapOvr>
+  <p:timing>
+    <p:tnLst>
+      <p:par>
+        <p:cTn id="1" dur="indefinite" restart="never" nodeType="tmRoot"/>
+      </p:par>
+    </p:tnLst>
+  </p:timing>
+</p:sld>
+</file>
+
+<file path=ppt/slides/slide13.xml><?xml version="1.0" encoding="utf-8"?>
+<p:sld xmlns:a="http://schemas.openxmlformats.org/drawingml/2006/main" xmlns:r="http://schemas.openxmlformats.org/officeDocument/2006/relationships" xmlns:p="http://schemas.openxmlformats.org/presentationml/2006/main">
+  <p:cSld>
+    <p:spTree>
+      <p:nvGrpSpPr>
+        <p:cNvPr id="1" name=""/>
+        <p:cNvGrpSpPr/>
+        <p:nvPr/>
+      </p:nvGrpSpPr>
+      <p:grpSpPr>
+        <a:xfrm>
+          <a:off x="0" y="0"/>
+          <a:ext cx="0" cy="0"/>
+          <a:chOff x="0" y="0"/>
+          <a:chExt cx="0" cy="0"/>
+        </a:xfrm>
+      </p:grpSpPr>
+      <p:sp>
+        <p:nvSpPr>
+          <p:cNvPr id="2" name="Title 1"/>
+          <p:cNvSpPr>
+            <a:spLocks noGrp="1"/>
+          </p:cNvSpPr>
+          <p:nvPr>
+            <p:ph type="title"/>
+          </p:nvPr>
+        </p:nvSpPr>
+        <p:spPr/>
+        <p:txBody>
+          <a:bodyPr/>
+          <a:lstStyle/>
+          <a:p>
+            <a:r>
+              <a:rPr lang="en-US" altLang="zh-CN" dirty="0" smtClean="0"/>
+              <a:t>Controllers and Actions</a:t>
+            </a:r>
+            <a:endParaRPr lang="zh-CN" altLang="en-US" dirty="0"/>
+          </a:p>
+        </p:txBody>
+      </p:sp>
+      <p:sp>
+        <p:nvSpPr>
+          <p:cNvPr id="3" name="Content Placeholder 2"/>
+          <p:cNvSpPr>
+            <a:spLocks noGrp="1"/>
+          </p:cNvSpPr>
+          <p:nvPr>
+            <p:ph idx="1"/>
+          </p:nvPr>
+        </p:nvSpPr>
+        <p:spPr/>
+        <p:txBody>
+          <a:bodyPr/>
+          <a:lstStyle/>
+          <a:p>
+            <a:r>
+              <a:rPr lang="en-US" altLang="zh-CN" dirty="0" smtClean="0"/>
+              <a:t>Producing Output</a:t>
+            </a:r>
+          </a:p>
+          <a:p>
+            <a:pPr marL="0" indent="0">
+              <a:buNone/>
+            </a:pPr>
+            <a:r>
+              <a:rPr lang="en-US" altLang="zh-CN" sz="2400" dirty="0" smtClean="0"/>
+              <a:t>Return an object derived from the </a:t>
+            </a:r>
+            <a:r>
+              <a:rPr lang="en-US" altLang="zh-CN" sz="2400" dirty="0" err="1" smtClean="0"/>
+              <a:t>ActionResult</a:t>
+            </a:r>
+            <a:r>
+              <a:rPr lang="en-US" altLang="zh-CN" sz="2400" dirty="0" smtClean="0"/>
+              <a:t>, MVC Framework calls the </a:t>
+            </a:r>
+            <a:r>
+              <a:rPr lang="en-US" altLang="zh-CN" sz="2400" dirty="0" err="1" smtClean="0"/>
+              <a:t>ExecuteResult</a:t>
+            </a:r>
+            <a:r>
+              <a:rPr lang="en-US" altLang="zh-CN" sz="2400" dirty="0" smtClean="0"/>
+              <a:t> method defined by </a:t>
+            </a:r>
+            <a:r>
+              <a:rPr lang="en-US" altLang="zh-CN" sz="2400" dirty="0" err="1" smtClean="0"/>
+              <a:t>ActionResult</a:t>
+            </a:r>
+            <a:endParaRPr lang="en-US" altLang="zh-CN" sz="2400" dirty="0" smtClean="0"/>
+          </a:p>
+          <a:p>
+            <a:pPr marL="0" indent="0">
+              <a:buNone/>
+            </a:pPr>
+            <a:endParaRPr lang="en-US" altLang="zh-CN" sz="2400" dirty="0" smtClean="0"/>
+          </a:p>
+          <a:p>
+            <a:pPr marL="0" indent="0">
+              <a:buNone/>
+            </a:pPr>
+            <a:r>
+              <a:rPr lang="en-US" altLang="zh-CN" sz="2400" dirty="0" err="1" smtClean="0"/>
+              <a:t>ActionResult</a:t>
+            </a:r>
+            <a:r>
+              <a:rPr lang="en-US" altLang="zh-CN" sz="2400" dirty="0" smtClean="0"/>
+              <a:t> Types:</a:t>
+            </a:r>
+          </a:p>
+          <a:p>
+            <a:pPr marL="0" indent="0">
+              <a:buNone/>
+            </a:pPr>
+            <a:endParaRPr lang="en-US" altLang="zh-CN" sz="2400" dirty="0" smtClean="0"/>
+          </a:p>
+        </p:txBody>
+      </p:sp>
+    </p:spTree>
+    <p:extLst>
+      <p:ext uri="{BB962C8B-B14F-4D97-AF65-F5344CB8AC3E}">
+        <p14:creationId xmlns:p14="http://schemas.microsoft.com/office/powerpoint/2010/main" val="2877505629"/>
+      </p:ext>
+    </p:extLst>
+  </p:cSld>
+  <p:clrMapOvr>
+    <a:masterClrMapping/>
+  </p:clrMapOvr>
+  <p:timing>
+    <p:tnLst>
+      <p:par>
+        <p:cTn id="1" dur="indefinite" restart="never" nodeType="tmRoot"/>
+      </p:par>
+    </p:tnLst>
+  </p:timing>
+</p:sld>
+</file>
+
+<file path=ppt/slides/slide14.xml><?xml version="1.0" encoding="utf-8"?>
+<p:sld xmlns:a="http://schemas.openxmlformats.org/drawingml/2006/main" xmlns:r="http://schemas.openxmlformats.org/officeDocument/2006/relationships" xmlns:p="http://schemas.openxmlformats.org/presentationml/2006/main">
+  <p:cSld>
+    <p:spTree>
+      <p:nvGrpSpPr>
+        <p:cNvPr id="1" name=""/>
+        <p:cNvGrpSpPr/>
+        <p:nvPr/>
+      </p:nvGrpSpPr>
+      <p:grpSpPr>
+        <a:xfrm>
+          <a:off x="0" y="0"/>
+          <a:ext cx="0" cy="0"/>
+          <a:chOff x="0" y="0"/>
+          <a:chExt cx="0" cy="0"/>
+        </a:xfrm>
+      </p:grpSpPr>
+      <p:sp>
+        <p:nvSpPr>
+          <p:cNvPr id="2" name="Title 1"/>
+          <p:cNvSpPr>
+            <a:spLocks noGrp="1"/>
+          </p:cNvSpPr>
+          <p:nvPr>
+            <p:ph type="title"/>
+          </p:nvPr>
+        </p:nvSpPr>
+        <p:spPr/>
+        <p:txBody>
+          <a:bodyPr/>
+          <a:lstStyle/>
+          <a:p>
+            <a:r>
+              <a:rPr lang="en-US" altLang="zh-CN" dirty="0"/>
+              <a:t>Controllers and Actions</a:t>
+            </a:r>
+            <a:endParaRPr lang="zh-CN" altLang="en-US" dirty="0"/>
+          </a:p>
+        </p:txBody>
+      </p:sp>
+      <p:sp>
+        <p:nvSpPr>
+          <p:cNvPr id="3" name="Content Placeholder 2"/>
+          <p:cNvSpPr>
+            <a:spLocks noGrp="1"/>
+          </p:cNvSpPr>
+          <p:nvPr>
+            <p:ph idx="1"/>
+          </p:nvPr>
+        </p:nvSpPr>
+        <p:spPr/>
+        <p:txBody>
+          <a:bodyPr/>
+          <a:lstStyle/>
+          <a:p>
+            <a:endParaRPr lang="zh-CN" altLang="en-US" dirty="0"/>
+          </a:p>
+        </p:txBody>
+      </p:sp>
+      <p:graphicFrame>
+        <p:nvGraphicFramePr>
+          <p:cNvPr id="4" name="Table 3"/>
+          <p:cNvGraphicFramePr>
+            <a:graphicFrameLocks noGrp="1"/>
+          </p:cNvGraphicFramePr>
+          <p:nvPr>
+            <p:extLst>
+              <p:ext uri="{D42A27DB-BD31-4B8C-83A1-F6EECF244321}">
+                <p14:modId xmlns:p14="http://schemas.microsoft.com/office/powerpoint/2010/main" val="959929852"/>
+              </p:ext>
+            </p:extLst>
+          </p:nvPr>
+        </p:nvGraphicFramePr>
+        <p:xfrm>
+          <a:off x="618187" y="1825625"/>
+          <a:ext cx="11359166" cy="4812638"/>
+        </p:xfrm>
+        <a:graphic>
+          <a:graphicData uri="http://schemas.openxmlformats.org/drawingml/2006/table">
+            <a:tbl>
+              <a:tblPr firstRow="1" bandRow="1">
+                <a:tableStyleId>{5C22544A-7EE6-4342-B048-85BDC9FD1C3A}</a:tableStyleId>
+              </a:tblPr>
+              <a:tblGrid>
+                <a:gridCol w="2833351"/>
+                <a:gridCol w="5623444"/>
+                <a:gridCol w="2902371"/>
+              </a:tblGrid>
+              <a:tr h="197319">
+                <a:tc>
+                  <a:txBody>
+                    <a:bodyPr/>
+                    <a:lstStyle/>
+                    <a:p>
+                      <a:r>
+                        <a:rPr lang="en-US" altLang="zh-CN" sz="1800" b="1" i="0" u="none" strike="noStrike" kern="1200" baseline="0" dirty="0" smtClean="0">
+                          <a:solidFill>
+                            <a:schemeClr val="lt1"/>
+                          </a:solidFill>
+                          <a:latin typeface="+mn-lt"/>
+                          <a:ea typeface="+mn-ea"/>
+                          <a:cs typeface="+mn-cs"/>
+                        </a:rPr>
+                        <a:t>Type</a:t>
+                      </a:r>
+                      <a:endParaRPr lang="zh-CN" altLang="en-US" dirty="0"/>
+                    </a:p>
+                  </a:txBody>
+                  <a:tcPr/>
+                </a:tc>
+                <a:tc>
+                  <a:txBody>
+                    <a:bodyPr/>
+                    <a:lstStyle/>
+                    <a:p>
+                      <a:r>
+                        <a:rPr lang="en-US" altLang="zh-CN" sz="1800" b="1" i="0" u="none" strike="noStrike" kern="1200" baseline="0" dirty="0" smtClean="0">
+                          <a:solidFill>
+                            <a:schemeClr val="lt1"/>
+                          </a:solidFill>
+                          <a:latin typeface="+mn-lt"/>
+                          <a:ea typeface="+mn-ea"/>
+                          <a:cs typeface="+mn-cs"/>
+                        </a:rPr>
+                        <a:t>Description</a:t>
+                      </a:r>
+                      <a:endParaRPr lang="zh-CN" altLang="en-US" dirty="0"/>
+                    </a:p>
+                  </a:txBody>
+                  <a:tcPr/>
+                </a:tc>
+                <a:tc>
+                  <a:txBody>
+                    <a:bodyPr/>
+                    <a:lstStyle/>
+                    <a:p>
+                      <a:r>
+                        <a:rPr lang="en-US" altLang="zh-CN" sz="1800" b="1" i="0" u="none" strike="noStrike" kern="1200" baseline="0" dirty="0" smtClean="0">
+                          <a:solidFill>
+                            <a:schemeClr val="lt1"/>
+                          </a:solidFill>
+                          <a:latin typeface="+mn-lt"/>
+                          <a:ea typeface="+mn-ea"/>
+                          <a:cs typeface="+mn-cs"/>
+                        </a:rPr>
+                        <a:t>Helper Methods</a:t>
+                      </a:r>
+                      <a:endParaRPr lang="zh-CN" altLang="en-US" dirty="0"/>
+                    </a:p>
+                  </a:txBody>
+                  <a:tcPr/>
+                </a:tc>
+              </a:tr>
+              <a:tr h="197319">
+                <a:tc>
+                  <a:txBody>
+                    <a:bodyPr/>
+                    <a:lstStyle/>
+                    <a:p>
+                      <a:r>
+                        <a:rPr lang="en-US" altLang="zh-CN" sz="1800" b="1" i="0" u="none" strike="noStrike" kern="1200" baseline="0" dirty="0" err="1" smtClean="0">
+                          <a:solidFill>
+                            <a:schemeClr val="dk1"/>
+                          </a:solidFill>
+                          <a:latin typeface="+mn-lt"/>
+                          <a:ea typeface="+mn-ea"/>
+                          <a:cs typeface="+mn-cs"/>
+                        </a:rPr>
+                        <a:t>ViewResult</a:t>
+                      </a:r>
+                      <a:endParaRPr lang="zh-CN" altLang="en-US" dirty="0"/>
+                    </a:p>
+                  </a:txBody>
+                  <a:tcPr/>
+                </a:tc>
+                <a:tc>
+                  <a:txBody>
+                    <a:bodyPr/>
+                    <a:lstStyle/>
+                    <a:p>
+                      <a:r>
+                        <a:rPr lang="en-US" altLang="zh-CN" sz="1800" b="0" i="0" u="none" strike="noStrike" kern="1200" baseline="0" dirty="0" smtClean="0">
+                          <a:solidFill>
+                            <a:schemeClr val="dk1"/>
+                          </a:solidFill>
+                          <a:latin typeface="+mn-lt"/>
+                          <a:ea typeface="+mn-ea"/>
+                          <a:cs typeface="+mn-cs"/>
+                        </a:rPr>
+                        <a:t>Renders the specified or default view template</a:t>
+                      </a:r>
+                      <a:endParaRPr lang="zh-CN" altLang="en-US" dirty="0"/>
+                    </a:p>
+                  </a:txBody>
+                  <a:tcPr/>
+                </a:tc>
+                <a:tc>
+                  <a:txBody>
+                    <a:bodyPr/>
+                    <a:lstStyle/>
+                    <a:p>
+                      <a:r>
+                        <a:rPr lang="en-US" altLang="zh-CN" sz="1800" b="1" i="0" u="none" strike="noStrike" kern="1200" baseline="0" dirty="0" smtClean="0">
+                          <a:solidFill>
+                            <a:schemeClr val="dk1"/>
+                          </a:solidFill>
+                          <a:latin typeface="+mn-lt"/>
+                          <a:ea typeface="+mn-ea"/>
+                          <a:cs typeface="+mn-cs"/>
+                        </a:rPr>
+                        <a:t>View</a:t>
+                      </a:r>
+                      <a:endParaRPr lang="zh-CN" altLang="en-US" dirty="0"/>
+                    </a:p>
+                  </a:txBody>
+                  <a:tcPr/>
+                </a:tc>
+              </a:tr>
+              <a:tr h="197319">
+                <a:tc>
+                  <a:txBody>
+                    <a:bodyPr/>
+                    <a:lstStyle/>
+                    <a:p>
+                      <a:r>
+                        <a:rPr lang="en-US" altLang="zh-CN" sz="1800" b="1" i="0" u="none" strike="noStrike" kern="1200" baseline="0" dirty="0" err="1" smtClean="0">
+                          <a:solidFill>
+                            <a:schemeClr val="dk1"/>
+                          </a:solidFill>
+                          <a:latin typeface="+mn-lt"/>
+                          <a:ea typeface="+mn-ea"/>
+                          <a:cs typeface="+mn-cs"/>
+                        </a:rPr>
+                        <a:t>PartialViewResult</a:t>
+                      </a:r>
+                      <a:endParaRPr lang="zh-CN" altLang="en-US" dirty="0"/>
+                    </a:p>
+                  </a:txBody>
+                  <a:tcPr/>
+                </a:tc>
+                <a:tc>
+                  <a:txBody>
+                    <a:bodyPr/>
+                    <a:lstStyle/>
+                    <a:p>
+                      <a:r>
+                        <a:rPr lang="en-US" altLang="zh-CN" sz="1800" b="0" i="0" u="none" strike="noStrike" kern="1200" baseline="0" dirty="0" smtClean="0">
+                          <a:solidFill>
+                            <a:schemeClr val="dk1"/>
+                          </a:solidFill>
+                          <a:latin typeface="+mn-lt"/>
+                          <a:ea typeface="+mn-ea"/>
+                          <a:cs typeface="+mn-cs"/>
+                        </a:rPr>
+                        <a:t>Renders the specified or default partial view template</a:t>
+                      </a:r>
+                      <a:endParaRPr lang="zh-CN" altLang="en-US" dirty="0"/>
+                    </a:p>
+                  </a:txBody>
+                  <a:tcPr/>
+                </a:tc>
+                <a:tc>
+                  <a:txBody>
+                    <a:bodyPr/>
+                    <a:lstStyle/>
+                    <a:p>
+                      <a:r>
+                        <a:rPr lang="en-US" altLang="zh-CN" sz="1800" b="1" i="0" u="none" strike="noStrike" kern="1200" baseline="0" dirty="0" err="1" smtClean="0">
+                          <a:solidFill>
+                            <a:schemeClr val="dk1"/>
+                          </a:solidFill>
+                          <a:latin typeface="+mn-lt"/>
+                          <a:ea typeface="+mn-ea"/>
+                          <a:cs typeface="+mn-cs"/>
+                        </a:rPr>
+                        <a:t>PartialView</a:t>
+                      </a:r>
+                      <a:endParaRPr lang="zh-CN" altLang="en-US" dirty="0"/>
+                    </a:p>
+                  </a:txBody>
+                  <a:tcPr/>
+                </a:tc>
+              </a:tr>
+              <a:tr h="937267">
+                <a:tc>
+                  <a:txBody>
+                    <a:bodyPr/>
+                    <a:lstStyle/>
+                    <a:p>
+                      <a:r>
+                        <a:rPr lang="en-US" altLang="zh-CN" sz="1800" b="1" i="0" u="none" strike="noStrike" kern="1200" baseline="0" dirty="0" err="1" smtClean="0">
+                          <a:solidFill>
+                            <a:schemeClr val="dk1"/>
+                          </a:solidFill>
+                          <a:latin typeface="+mn-lt"/>
+                          <a:ea typeface="+mn-ea"/>
+                          <a:cs typeface="+mn-cs"/>
+                        </a:rPr>
+                        <a:t>RedirectToRouteResult</a:t>
+                      </a:r>
+                      <a:endParaRPr lang="zh-CN" altLang="en-US" dirty="0"/>
+                    </a:p>
+                  </a:txBody>
+                  <a:tcPr/>
+                </a:tc>
+                <a:tc>
+                  <a:txBody>
+                    <a:bodyPr/>
+                    <a:lstStyle/>
+                    <a:p>
+                      <a:r>
+                        <a:rPr lang="en-US" altLang="zh-CN" sz="1800" b="0" i="0" u="none" strike="noStrike" kern="1200" baseline="0" dirty="0" smtClean="0">
+                          <a:solidFill>
+                            <a:schemeClr val="dk1"/>
+                          </a:solidFill>
+                          <a:latin typeface="+mn-lt"/>
+                          <a:ea typeface="+mn-ea"/>
+                          <a:cs typeface="+mn-cs"/>
+                        </a:rPr>
+                        <a:t>Issues an HTTP 301 or 302 redirection to an action method or specific route entry, generating a URL according to your routing configuration</a:t>
+                      </a:r>
+                      <a:endParaRPr lang="zh-CN" altLang="en-US" dirty="0"/>
+                    </a:p>
+                  </a:txBody>
+                  <a:tcPr/>
+                </a:tc>
+                <a:tc>
+                  <a:txBody>
+                    <a:bodyPr/>
+                    <a:lstStyle/>
+                    <a:p>
+                      <a:r>
+                        <a:rPr lang="en-US" altLang="zh-CN" sz="1800" b="1" i="0" u="none" strike="noStrike" kern="1200" baseline="0" dirty="0" err="1" smtClean="0">
+                          <a:solidFill>
+                            <a:schemeClr val="dk1"/>
+                          </a:solidFill>
+                          <a:latin typeface="+mn-lt"/>
+                          <a:ea typeface="+mn-ea"/>
+                          <a:cs typeface="+mn-cs"/>
+                        </a:rPr>
+                        <a:t>RedirectToAction</a:t>
+                      </a:r>
+                      <a:endParaRPr lang="en-US" altLang="zh-CN" sz="1800" b="1" i="0" u="none" strike="noStrike" kern="1200" baseline="0" dirty="0" smtClean="0">
+                        <a:solidFill>
+                          <a:schemeClr val="dk1"/>
+                        </a:solidFill>
+                        <a:latin typeface="+mn-lt"/>
+                        <a:ea typeface="+mn-ea"/>
+                        <a:cs typeface="+mn-cs"/>
+                      </a:endParaRPr>
+                    </a:p>
+                    <a:p>
+                      <a:r>
+                        <a:rPr lang="en-US" altLang="zh-CN" sz="1800" b="1" i="0" u="none" strike="noStrike" kern="1200" baseline="0" dirty="0" err="1" smtClean="0">
+                          <a:solidFill>
+                            <a:schemeClr val="dk1"/>
+                          </a:solidFill>
+                          <a:latin typeface="+mn-lt"/>
+                          <a:ea typeface="+mn-ea"/>
+                          <a:cs typeface="+mn-cs"/>
+                        </a:rPr>
+                        <a:t>RedirectToActionPermanent</a:t>
+                      </a:r>
+                      <a:endParaRPr lang="en-US" altLang="zh-CN" sz="1800" b="1" i="0" u="none" strike="noStrike" kern="1200" baseline="0" dirty="0" smtClean="0">
+                        <a:solidFill>
+                          <a:schemeClr val="dk1"/>
+                        </a:solidFill>
+                        <a:latin typeface="+mn-lt"/>
+                        <a:ea typeface="+mn-ea"/>
+                        <a:cs typeface="+mn-cs"/>
+                      </a:endParaRPr>
+                    </a:p>
+                    <a:p>
+                      <a:r>
+                        <a:rPr lang="en-US" altLang="zh-CN" sz="1800" b="1" i="0" u="none" strike="noStrike" kern="1200" baseline="0" dirty="0" err="1" smtClean="0">
+                          <a:solidFill>
+                            <a:schemeClr val="dk1"/>
+                          </a:solidFill>
+                          <a:latin typeface="+mn-lt"/>
+                          <a:ea typeface="+mn-ea"/>
+                          <a:cs typeface="+mn-cs"/>
+                        </a:rPr>
+                        <a:t>RedirectToRoute</a:t>
+                      </a:r>
+                      <a:endParaRPr lang="en-US" altLang="zh-CN" sz="1800" b="1" i="0" u="none" strike="noStrike" kern="1200" baseline="0" dirty="0" smtClean="0">
+                        <a:solidFill>
+                          <a:schemeClr val="dk1"/>
+                        </a:solidFill>
+                        <a:latin typeface="+mn-lt"/>
+                        <a:ea typeface="+mn-ea"/>
+                        <a:cs typeface="+mn-cs"/>
+                      </a:endParaRPr>
+                    </a:p>
+                    <a:p>
+                      <a:r>
+                        <a:rPr lang="en-US" altLang="zh-CN" sz="1800" b="1" i="0" u="none" strike="noStrike" kern="1200" baseline="0" dirty="0" err="1" smtClean="0">
+                          <a:solidFill>
+                            <a:schemeClr val="dk1"/>
+                          </a:solidFill>
+                          <a:latin typeface="+mn-lt"/>
+                          <a:ea typeface="+mn-ea"/>
+                          <a:cs typeface="+mn-cs"/>
+                        </a:rPr>
+                        <a:t>RedirectToRoutePermanent</a:t>
+                      </a:r>
+                      <a:endParaRPr lang="zh-CN" altLang="en-US" dirty="0"/>
+                    </a:p>
+                  </a:txBody>
+                  <a:tcPr/>
+                </a:tc>
+              </a:tr>
+              <a:tr h="789278">
+                <a:tc>
+                  <a:txBody>
+                    <a:bodyPr/>
+                    <a:lstStyle/>
+                    <a:p>
+                      <a:r>
+                        <a:rPr lang="en-US" altLang="zh-CN" sz="1800" b="1" i="0" u="none" strike="noStrike" kern="1200" baseline="0" dirty="0" err="1" smtClean="0">
+                          <a:solidFill>
+                            <a:schemeClr val="dk1"/>
+                          </a:solidFill>
+                          <a:latin typeface="+mn-lt"/>
+                          <a:ea typeface="+mn-ea"/>
+                          <a:cs typeface="+mn-cs"/>
+                        </a:rPr>
+                        <a:t>HttpUnauthorizedResult</a:t>
+                      </a:r>
+                      <a:endParaRPr lang="zh-CN" altLang="en-US" dirty="0"/>
+                    </a:p>
+                  </a:txBody>
+                  <a:tcPr/>
+                </a:tc>
+                <a:tc>
+                  <a:txBody>
+                    <a:bodyPr/>
+                    <a:lstStyle/>
+                    <a:p>
+                      <a:r>
+                        <a:rPr lang="en-US" altLang="zh-CN" sz="1800" b="0" i="0" u="none" strike="noStrike" kern="1200" baseline="0" dirty="0" smtClean="0">
+                          <a:solidFill>
+                            <a:schemeClr val="dk1"/>
+                          </a:solidFill>
+                          <a:latin typeface="+mn-lt"/>
+                          <a:ea typeface="+mn-ea"/>
+                          <a:cs typeface="+mn-cs"/>
+                        </a:rPr>
+                        <a:t>Sets the response HTTP status code to 401 (meaning “not authorized”), ask the visitor to log in</a:t>
+                      </a:r>
+                      <a:endParaRPr lang="zh-CN" altLang="en-US" dirty="0"/>
+                    </a:p>
+                  </a:txBody>
+                  <a:tcPr/>
+                </a:tc>
+                <a:tc>
+                  <a:txBody>
+                    <a:bodyPr/>
+                    <a:lstStyle/>
+                    <a:p>
+                      <a:r>
+                        <a:rPr lang="en-US" altLang="zh-CN" sz="1800" b="0" i="0" u="none" strike="noStrike" kern="1200" baseline="0" dirty="0" smtClean="0">
+                          <a:solidFill>
+                            <a:schemeClr val="dk1"/>
+                          </a:solidFill>
+                          <a:latin typeface="+mn-lt"/>
+                          <a:ea typeface="+mn-ea"/>
+                          <a:cs typeface="+mn-cs"/>
+                        </a:rPr>
+                        <a:t>None</a:t>
+                      </a:r>
+                      <a:endParaRPr lang="zh-CN" altLang="en-US" dirty="0"/>
+                    </a:p>
+                  </a:txBody>
+                  <a:tcPr/>
+                </a:tc>
+              </a:tr>
+              <a:tr h="197319">
+                <a:tc>
+                  <a:txBody>
+                    <a:bodyPr/>
+                    <a:lstStyle/>
+                    <a:p>
+                      <a:r>
+                        <a:rPr lang="en-US" altLang="zh-CN" sz="1800" b="1" i="0" u="none" strike="noStrike" kern="1200" baseline="0" dirty="0" err="1" smtClean="0">
+                          <a:solidFill>
+                            <a:schemeClr val="dk1"/>
+                          </a:solidFill>
+                          <a:latin typeface="+mn-lt"/>
+                          <a:ea typeface="+mn-ea"/>
+                          <a:cs typeface="+mn-cs"/>
+                        </a:rPr>
+                        <a:t>HttpNotFoundResult</a:t>
+                      </a:r>
+                      <a:endParaRPr lang="zh-CN" altLang="en-US" dirty="0"/>
+                    </a:p>
+                  </a:txBody>
+                  <a:tcPr/>
+                </a:tc>
+                <a:tc>
+                  <a:txBody>
+                    <a:bodyPr/>
+                    <a:lstStyle/>
+                    <a:p>
+                      <a:r>
+                        <a:rPr lang="en-US" altLang="zh-CN" sz="1800" b="0" i="0" u="none" strike="noStrike" kern="1200" baseline="0" dirty="0" smtClean="0">
+                          <a:solidFill>
+                            <a:schemeClr val="dk1"/>
+                          </a:solidFill>
+                          <a:latin typeface="+mn-lt"/>
+                          <a:ea typeface="+mn-ea"/>
+                          <a:cs typeface="+mn-cs"/>
+                        </a:rPr>
+                        <a:t>Returns a HTTP 404—Not found error</a:t>
+                      </a:r>
+                      <a:endParaRPr lang="zh-CN" altLang="en-US" dirty="0"/>
+                    </a:p>
+                  </a:txBody>
+                  <a:tcPr/>
+                </a:tc>
+                <a:tc>
+                  <a:txBody>
+                    <a:bodyPr/>
+                    <a:lstStyle/>
+                    <a:p>
+                      <a:r>
+                        <a:rPr lang="en-US" altLang="zh-CN" sz="1800" b="1" i="0" u="none" strike="noStrike" kern="1200" baseline="0" dirty="0" err="1" smtClean="0">
+                          <a:solidFill>
+                            <a:schemeClr val="dk1"/>
+                          </a:solidFill>
+                          <a:latin typeface="+mn-lt"/>
+                          <a:ea typeface="+mn-ea"/>
+                          <a:cs typeface="+mn-cs"/>
+                        </a:rPr>
+                        <a:t>HttpNotFound</a:t>
+                      </a:r>
+                      <a:endParaRPr lang="zh-CN" altLang="en-US" dirty="0"/>
+                    </a:p>
+                  </a:txBody>
+                  <a:tcPr/>
+                </a:tc>
+              </a:tr>
+              <a:tr h="345309">
+                <a:tc>
+                  <a:txBody>
+                    <a:bodyPr/>
+                    <a:lstStyle/>
+                    <a:p>
+                      <a:r>
+                        <a:rPr lang="en-US" altLang="zh-CN" sz="1800" b="1" i="0" u="none" strike="noStrike" kern="1200" baseline="0" dirty="0" err="1" smtClean="0">
+                          <a:solidFill>
+                            <a:schemeClr val="dk1"/>
+                          </a:solidFill>
+                          <a:latin typeface="+mn-lt"/>
+                          <a:ea typeface="+mn-ea"/>
+                          <a:cs typeface="+mn-cs"/>
+                        </a:rPr>
+                        <a:t>RedirectResult</a:t>
+                      </a:r>
+                      <a:endParaRPr lang="zh-CN" altLang="en-US" dirty="0"/>
+                    </a:p>
+                  </a:txBody>
+                  <a:tcPr/>
+                </a:tc>
+                <a:tc>
+                  <a:txBody>
+                    <a:bodyPr/>
+                    <a:lstStyle/>
+                    <a:p>
+                      <a:r>
+                        <a:rPr lang="en-US" altLang="zh-CN" sz="1800" b="0" i="0" u="none" strike="noStrike" kern="1200" baseline="0" dirty="0" smtClean="0">
+                          <a:solidFill>
+                            <a:schemeClr val="dk1"/>
+                          </a:solidFill>
+                          <a:latin typeface="+mn-lt"/>
+                          <a:ea typeface="+mn-ea"/>
+                          <a:cs typeface="+mn-cs"/>
+                        </a:rPr>
+                        <a:t>Issues an HTTP 301 or 302 redirection to a specific URL</a:t>
+                      </a:r>
+                      <a:endParaRPr lang="zh-CN" altLang="en-US" dirty="0"/>
+                    </a:p>
+                  </a:txBody>
+                  <a:tcPr/>
+                </a:tc>
+                <a:tc>
+                  <a:txBody>
+                    <a:bodyPr/>
+                    <a:lstStyle/>
+                    <a:p>
+                      <a:r>
+                        <a:rPr lang="en-US" altLang="zh-CN" sz="1800" b="1" i="0" u="none" strike="noStrike" kern="1200" baseline="0" dirty="0" smtClean="0">
+                          <a:solidFill>
+                            <a:schemeClr val="dk1"/>
+                          </a:solidFill>
+                          <a:latin typeface="+mn-lt"/>
+                          <a:ea typeface="+mn-ea"/>
+                          <a:cs typeface="+mn-cs"/>
+                        </a:rPr>
+                        <a:t>Redirect</a:t>
+                      </a:r>
+                    </a:p>
+                    <a:p>
+                      <a:r>
+                        <a:rPr lang="en-US" altLang="zh-CN" sz="1800" b="1" i="0" u="none" strike="noStrike" kern="1200" baseline="0" dirty="0" err="1" smtClean="0">
+                          <a:solidFill>
+                            <a:schemeClr val="dk1"/>
+                          </a:solidFill>
+                          <a:latin typeface="+mn-lt"/>
+                          <a:ea typeface="+mn-ea"/>
+                          <a:cs typeface="+mn-cs"/>
+                        </a:rPr>
+                        <a:t>RedirectPermanent</a:t>
+                      </a:r>
+                      <a:endParaRPr lang="zh-CN" altLang="en-US" dirty="0"/>
+                    </a:p>
+                  </a:txBody>
+                  <a:tcPr/>
+                </a:tc>
+              </a:tr>
+              <a:tr h="197319">
+                <a:tc>
+                  <a:txBody>
+                    <a:bodyPr/>
+                    <a:lstStyle/>
+                    <a:p>
+                      <a:r>
+                        <a:rPr lang="en-US" altLang="zh-CN" b="1" dirty="0" err="1" smtClean="0"/>
+                        <a:t>JsonResult</a:t>
+                      </a:r>
+                      <a:endParaRPr lang="zh-CN" altLang="en-US" b="1" dirty="0"/>
+                    </a:p>
+                  </a:txBody>
+                  <a:tcPr/>
+                </a:tc>
+                <a:tc>
+                  <a:txBody>
+                    <a:bodyPr/>
+                    <a:lstStyle/>
+                    <a:p>
+                      <a:r>
+                        <a:rPr lang="en-US" altLang="zh-CN" dirty="0" smtClean="0"/>
+                        <a:t>Serialize</a:t>
+                      </a:r>
+                      <a:r>
+                        <a:rPr lang="en-US" altLang="zh-CN" baseline="0" dirty="0" smtClean="0"/>
+                        <a:t> data to </a:t>
+                      </a:r>
+                      <a:r>
+                        <a:rPr lang="en-US" altLang="zh-CN" baseline="0" dirty="0" err="1" smtClean="0"/>
+                        <a:t>json</a:t>
+                      </a:r>
+                      <a:r>
+                        <a:rPr lang="en-US" altLang="zh-CN" baseline="0" dirty="0" smtClean="0"/>
+                        <a:t> format</a:t>
+                      </a:r>
+                      <a:endParaRPr lang="zh-CN" altLang="en-US" dirty="0"/>
+                    </a:p>
+                  </a:txBody>
+                  <a:tcPr/>
+                </a:tc>
+                <a:tc>
+                  <a:txBody>
+                    <a:bodyPr/>
+                    <a:lstStyle/>
+                    <a:p>
+                      <a:r>
+                        <a:rPr lang="en-US" altLang="zh-CN" sz="1800" b="1" i="0" u="none" strike="noStrike" kern="1200" baseline="0" dirty="0" err="1" smtClean="0">
+                          <a:solidFill>
+                            <a:schemeClr val="dk1"/>
+                          </a:solidFill>
+                          <a:latin typeface="+mn-lt"/>
+                          <a:ea typeface="+mn-ea"/>
+                          <a:cs typeface="+mn-cs"/>
+                        </a:rPr>
+                        <a:t>Json</a:t>
+                      </a:r>
+                      <a:endParaRPr lang="zh-CN" altLang="en-US" sz="1800" b="1" i="0" u="none" strike="noStrike" kern="1200" baseline="0" dirty="0">
+                        <a:solidFill>
+                          <a:schemeClr val="dk1"/>
+                        </a:solidFill>
+                        <a:latin typeface="+mn-lt"/>
+                        <a:ea typeface="+mn-ea"/>
+                        <a:cs typeface="+mn-cs"/>
+                      </a:endParaRPr>
+                    </a:p>
+                  </a:txBody>
+                  <a:tcPr/>
+                </a:tc>
+              </a:tr>
+              <a:tr h="197319">
+                <a:tc>
+                  <a:txBody>
+                    <a:bodyPr/>
+                    <a:lstStyle/>
+                    <a:p>
+                      <a:r>
+                        <a:rPr lang="en-US" altLang="zh-CN" sz="1800" b="1" i="0" u="none" strike="noStrike" kern="1200" baseline="0" dirty="0" err="1" smtClean="0">
+                          <a:solidFill>
+                            <a:schemeClr val="dk1"/>
+                          </a:solidFill>
+                          <a:latin typeface="+mn-lt"/>
+                          <a:ea typeface="+mn-ea"/>
+                          <a:cs typeface="+mn-cs"/>
+                        </a:rPr>
+                        <a:t>EmptyResult</a:t>
+                      </a:r>
+                      <a:endParaRPr lang="zh-CN" altLang="en-US" dirty="0"/>
+                    </a:p>
+                  </a:txBody>
+                  <a:tcPr/>
+                </a:tc>
+                <a:tc>
+                  <a:txBody>
+                    <a:bodyPr/>
+                    <a:lstStyle/>
+                    <a:p>
+                      <a:r>
+                        <a:rPr lang="en-US" altLang="zh-CN" sz="1800" b="0" i="0" u="none" strike="noStrike" kern="1200" baseline="0" dirty="0" smtClean="0">
+                          <a:solidFill>
+                            <a:schemeClr val="dk1"/>
+                          </a:solidFill>
+                          <a:latin typeface="+mn-lt"/>
+                          <a:ea typeface="+mn-ea"/>
+                          <a:cs typeface="+mn-cs"/>
+                        </a:rPr>
+                        <a:t>Does nothing</a:t>
+                      </a:r>
+                      <a:endParaRPr lang="zh-CN" altLang="en-US" dirty="0"/>
+                    </a:p>
+                  </a:txBody>
+                  <a:tcPr/>
+                </a:tc>
+                <a:tc>
+                  <a:txBody>
+                    <a:bodyPr/>
+                    <a:lstStyle/>
+                    <a:p>
+                      <a:r>
+                        <a:rPr lang="en-US" altLang="zh-CN" sz="1800" b="1" i="0" u="none" strike="noStrike" kern="1200" baseline="0" dirty="0" smtClean="0">
+                          <a:solidFill>
+                            <a:schemeClr val="dk1"/>
+                          </a:solidFill>
+                          <a:latin typeface="+mn-lt"/>
+                          <a:ea typeface="+mn-ea"/>
+                          <a:cs typeface="+mn-cs"/>
+                        </a:rPr>
+                        <a:t>None</a:t>
+                      </a:r>
+                      <a:endParaRPr lang="zh-CN" altLang="en-US" sz="1800" b="1" i="0" u="none" strike="noStrike" kern="1200" baseline="0" dirty="0">
+                        <a:solidFill>
+                          <a:schemeClr val="dk1"/>
+                        </a:solidFill>
+                        <a:latin typeface="+mn-lt"/>
+                        <a:ea typeface="+mn-ea"/>
+                        <a:cs typeface="+mn-cs"/>
+                      </a:endParaRPr>
+                    </a:p>
+                  </a:txBody>
+                  <a:tcPr/>
+                </a:tc>
+              </a:tr>
+            </a:tbl>
+          </a:graphicData>
+        </a:graphic>
+      </p:graphicFrame>
+    </p:spTree>
+    <p:extLst>
+      <p:ext uri="{BB962C8B-B14F-4D97-AF65-F5344CB8AC3E}">
+        <p14:creationId xmlns:p14="http://schemas.microsoft.com/office/powerpoint/2010/main" val="2336634145"/>
+      </p:ext>
+    </p:extLst>
+  </p:cSld>
+  <p:clrMapOvr>
+    <a:masterClrMapping/>
+  </p:clrMapOvr>
+  <p:timing>
+    <p:tnLst>
+      <p:par>
+        <p:cTn id="1" dur="indefinite" restart="never" nodeType="tmRoot"/>
+      </p:par>
+    </p:tnLst>
+  </p:timing>
+</p:sld>
+</file>
+
+<file path=ppt/slides/slide15.xml><?xml version="1.0" encoding="utf-8"?>
+<p:sld xmlns:a="http://schemas.openxmlformats.org/drawingml/2006/main" xmlns:r="http://schemas.openxmlformats.org/officeDocument/2006/relationships" xmlns:p="http://schemas.openxmlformats.org/presentationml/2006/main">
+  <p:cSld>
+    <p:spTree>
+      <p:nvGrpSpPr>
+        <p:cNvPr id="1" name=""/>
+        <p:cNvGrpSpPr/>
+        <p:nvPr/>
+      </p:nvGrpSpPr>
+      <p:grpSpPr>
+        <a:xfrm>
+          <a:off x="0" y="0"/>
+          <a:ext cx="0" cy="0"/>
+          <a:chOff x="0" y="0"/>
+          <a:chExt cx="0" cy="0"/>
+        </a:xfrm>
+      </p:grpSpPr>
+      <p:sp>
+        <p:nvSpPr>
+          <p:cNvPr id="2" name="Title 1"/>
+          <p:cNvSpPr>
+            <a:spLocks noGrp="1"/>
+          </p:cNvSpPr>
+          <p:nvPr>
+            <p:ph type="title"/>
+          </p:nvPr>
+        </p:nvSpPr>
+        <p:spPr/>
+        <p:txBody>
+          <a:bodyPr/>
+          <a:lstStyle/>
+          <a:p>
+            <a:r>
+              <a:rPr lang="en-US" altLang="zh-CN" dirty="0"/>
+              <a:t>Controllers and Actions</a:t>
+            </a:r>
+            <a:endParaRPr lang="zh-CN" altLang="en-US" dirty="0"/>
+          </a:p>
+        </p:txBody>
+      </p:sp>
+      <p:sp>
+        <p:nvSpPr>
+          <p:cNvPr id="3" name="Content Placeholder 2"/>
+          <p:cNvSpPr>
+            <a:spLocks noGrp="1"/>
+          </p:cNvSpPr>
+          <p:nvPr>
+            <p:ph idx="1"/>
+          </p:nvPr>
+        </p:nvSpPr>
+        <p:spPr/>
+        <p:txBody>
+          <a:bodyPr/>
+          <a:lstStyle/>
+          <a:p>
+            <a:r>
+              <a:rPr lang="en-US" altLang="zh-CN" dirty="0" smtClean="0"/>
+              <a:t>Passing Data from an Action Method to a View</a:t>
+            </a:r>
+          </a:p>
+          <a:p>
+            <a:pPr marL="514350" indent="-514350">
+              <a:buFont typeface="+mj-lt"/>
+              <a:buAutoNum type="arabicPeriod"/>
+            </a:pPr>
+            <a:r>
+              <a:rPr lang="en-US" altLang="zh-CN" sz="2400" dirty="0" smtClean="0"/>
+              <a:t>Providing a View Model Object</a:t>
+            </a:r>
+          </a:p>
+          <a:p>
+            <a:pPr marL="457200" lvl="1" indent="0">
+              <a:buNone/>
+            </a:pPr>
+            <a:r>
+              <a:rPr lang="en-US" altLang="zh-CN" sz="1600" dirty="0"/>
+              <a:t>public </a:t>
+            </a:r>
+            <a:r>
+              <a:rPr lang="en-US" altLang="zh-CN" sz="1600" dirty="0" err="1"/>
+              <a:t>ViewResult</a:t>
+            </a:r>
+            <a:r>
+              <a:rPr lang="en-US" altLang="zh-CN" sz="1600" dirty="0"/>
+              <a:t> Index() {</a:t>
+            </a:r>
+          </a:p>
+          <a:p>
+            <a:pPr marL="914400" lvl="2" indent="0">
+              <a:buNone/>
+            </a:pPr>
+            <a:r>
+              <a:rPr lang="en-US" altLang="zh-CN" sz="1600" dirty="0" err="1"/>
+              <a:t>DateTime</a:t>
+            </a:r>
+            <a:r>
+              <a:rPr lang="en-US" altLang="zh-CN" sz="1600" dirty="0"/>
+              <a:t> date = </a:t>
+            </a:r>
+            <a:r>
+              <a:rPr lang="en-US" altLang="zh-CN" sz="1600" dirty="0" err="1"/>
+              <a:t>DateTime.Now</a:t>
+            </a:r>
+            <a:r>
+              <a:rPr lang="en-US" altLang="zh-CN" sz="1600" dirty="0"/>
+              <a:t>;</a:t>
+            </a:r>
+          </a:p>
+          <a:p>
+            <a:pPr marL="914400" lvl="2" indent="0">
+              <a:buNone/>
+            </a:pPr>
+            <a:r>
+              <a:rPr lang="en-US" altLang="zh-CN" sz="1600" dirty="0"/>
+              <a:t>return View(date);</a:t>
+            </a:r>
+          </a:p>
+          <a:p>
+            <a:pPr marL="457200" lvl="1" indent="0">
+              <a:buNone/>
+            </a:pPr>
+            <a:r>
+              <a:rPr lang="en-US" altLang="zh-CN" sz="1600" dirty="0" smtClean="0"/>
+              <a:t>}</a:t>
+            </a:r>
+          </a:p>
+          <a:p>
+            <a:pPr marL="457200" lvl="1" indent="0">
+              <a:buNone/>
+            </a:pPr>
+            <a:endParaRPr lang="en-US" altLang="zh-CN" sz="1600" dirty="0"/>
+          </a:p>
+          <a:p>
+            <a:pPr marL="457200" lvl="1" indent="0">
+              <a:buNone/>
+            </a:pPr>
+            <a:r>
+              <a:rPr lang="en-US" altLang="zh-CN" sz="1600" dirty="0" smtClean="0"/>
+              <a:t>public </a:t>
+            </a:r>
+            <a:r>
+              <a:rPr lang="en-US" altLang="zh-CN" sz="1600" dirty="0" err="1" smtClean="0"/>
+              <a:t>ActionResult</a:t>
+            </a:r>
+            <a:r>
+              <a:rPr lang="en-US" altLang="zh-CN" sz="1600" dirty="0" smtClean="0"/>
+              <a:t> Index()</a:t>
+            </a:r>
+          </a:p>
+          <a:p>
+            <a:pPr marL="457200" lvl="1" indent="0">
+              <a:buNone/>
+            </a:pPr>
+            <a:r>
+              <a:rPr lang="en-US" altLang="zh-CN" sz="1600" dirty="0" smtClean="0"/>
+              <a:t>{</a:t>
+            </a:r>
+          </a:p>
+          <a:p>
+            <a:pPr marL="457200" lvl="1" indent="0">
+              <a:buNone/>
+            </a:pPr>
+            <a:r>
+              <a:rPr lang="en-US" altLang="zh-CN" sz="1600" dirty="0" smtClean="0"/>
+              <a:t>            </a:t>
+            </a:r>
+            <a:r>
+              <a:rPr lang="en-US" altLang="zh-CN" sz="1600" dirty="0" err="1" smtClean="0"/>
+              <a:t>var</a:t>
+            </a:r>
+            <a:r>
+              <a:rPr lang="en-US" altLang="zh-CN" sz="1600" dirty="0" smtClean="0"/>
+              <a:t> products = </a:t>
+            </a:r>
+            <a:r>
+              <a:rPr lang="en-US" altLang="zh-CN" sz="1600" dirty="0" err="1" smtClean="0"/>
+              <a:t>db.Products.Include</a:t>
+            </a:r>
+            <a:r>
+              <a:rPr lang="en-US" altLang="zh-CN" sz="1600" dirty="0" smtClean="0"/>
+              <a:t>(p =&gt; </a:t>
+            </a:r>
+            <a:r>
+              <a:rPr lang="en-US" altLang="zh-CN" sz="1600" dirty="0" err="1" smtClean="0"/>
+              <a:t>p.Categories</a:t>
+            </a:r>
+            <a:r>
+              <a:rPr lang="en-US" altLang="zh-CN" sz="1600" dirty="0" smtClean="0"/>
+              <a:t>).Include(p =&gt; </a:t>
+            </a:r>
+            <a:r>
+              <a:rPr lang="en-US" altLang="zh-CN" sz="1600" dirty="0" err="1" smtClean="0"/>
+              <a:t>p.Suppliers</a:t>
+            </a:r>
+            <a:r>
+              <a:rPr lang="en-US" altLang="zh-CN" sz="1600" dirty="0" smtClean="0"/>
+              <a:t>);</a:t>
+            </a:r>
+          </a:p>
+          <a:p>
+            <a:pPr marL="457200" lvl="1" indent="0">
+              <a:buNone/>
+            </a:pPr>
+            <a:r>
+              <a:rPr lang="en-US" altLang="zh-CN" sz="1600" dirty="0" smtClean="0"/>
+              <a:t>            return View(</a:t>
+            </a:r>
+            <a:r>
+              <a:rPr lang="en-US" altLang="zh-CN" sz="1600" dirty="0" err="1" smtClean="0"/>
+              <a:t>products.ToList</a:t>
+            </a:r>
+            <a:r>
+              <a:rPr lang="en-US" altLang="zh-CN" sz="1600" dirty="0" smtClean="0"/>
+              <a:t>());</a:t>
+            </a:r>
+          </a:p>
+          <a:p>
+            <a:pPr marL="457200" lvl="1" indent="0">
+              <a:buNone/>
+            </a:pPr>
+            <a:r>
+              <a:rPr lang="en-US" altLang="zh-CN" sz="1600" dirty="0" smtClean="0"/>
+              <a:t>}</a:t>
+            </a:r>
+          </a:p>
+          <a:p>
+            <a:pPr marL="514350" indent="-514350">
+              <a:buFont typeface="+mj-lt"/>
+              <a:buAutoNum type="arabicPeriod"/>
+            </a:pPr>
+            <a:r>
+              <a:rPr lang="en-US" altLang="zh-CN" sz="2400" dirty="0" smtClean="0"/>
+              <a:t>Passing Data with the View Bag</a:t>
+            </a:r>
+            <a:endParaRPr lang="zh-CN" altLang="en-US" sz="2400" dirty="0"/>
+          </a:p>
+        </p:txBody>
+      </p:sp>
+    </p:spTree>
+    <p:extLst>
+      <p:ext uri="{BB962C8B-B14F-4D97-AF65-F5344CB8AC3E}">
+        <p14:creationId xmlns:p14="http://schemas.microsoft.com/office/powerpoint/2010/main" val="3355010638"/>
+      </p:ext>
+    </p:extLst>
+  </p:cSld>
+  <p:clrMapOvr>
+    <a:masterClrMapping/>
+  </p:clrMapOvr>
+  <p:timing>
+    <p:tnLst>
+      <p:par>
+        <p:cTn id="1" dur="indefinite" restart="never" nodeType="tmRoot"/>
+      </p:par>
+    </p:tnLst>
+  </p:timing>
+</p:sld>
+</file>
+
+<file path=ppt/slides/slide16.xml><?xml version="1.0" encoding="utf-8"?>
+<p:sld xmlns:a="http://schemas.openxmlformats.org/drawingml/2006/main" xmlns:r="http://schemas.openxmlformats.org/officeDocument/2006/relationships" xmlns:p="http://schemas.openxmlformats.org/presentationml/2006/main">
+  <p:cSld>
+    <p:spTree>
+      <p:nvGrpSpPr>
+        <p:cNvPr id="1" name=""/>
+        <p:cNvGrpSpPr/>
+        <p:nvPr/>
+      </p:nvGrpSpPr>
+      <p:grpSpPr>
+        <a:xfrm>
+          <a:off x="0" y="0"/>
+          <a:ext cx="0" cy="0"/>
+          <a:chOff x="0" y="0"/>
+          <a:chExt cx="0" cy="0"/>
+        </a:xfrm>
+      </p:grpSpPr>
+      <p:sp>
+        <p:nvSpPr>
+          <p:cNvPr id="2" name="Title 1"/>
+          <p:cNvSpPr>
+            <a:spLocks noGrp="1"/>
+          </p:cNvSpPr>
+          <p:nvPr>
+            <p:ph type="title"/>
+          </p:nvPr>
+        </p:nvSpPr>
+        <p:spPr/>
+        <p:txBody>
+          <a:bodyPr/>
+          <a:lstStyle/>
+          <a:p>
+            <a:r>
+              <a:rPr lang="en-US" altLang="zh-CN" dirty="0" smtClean="0"/>
+              <a:t>Controllers and Actions</a:t>
+            </a:r>
+            <a:endParaRPr lang="zh-CN" altLang="en-US" dirty="0"/>
+          </a:p>
+        </p:txBody>
+      </p:sp>
+      <p:sp>
+        <p:nvSpPr>
+          <p:cNvPr id="3" name="Content Placeholder 2"/>
+          <p:cNvSpPr>
+            <a:spLocks noGrp="1"/>
+          </p:cNvSpPr>
+          <p:nvPr>
+            <p:ph idx="1"/>
+          </p:nvPr>
+        </p:nvSpPr>
+        <p:spPr/>
+        <p:txBody>
+          <a:bodyPr>
+            <a:normAutofit fontScale="92500" lnSpcReduction="20000"/>
+          </a:bodyPr>
+          <a:lstStyle/>
+          <a:p>
+            <a:r>
+              <a:rPr lang="en-US" altLang="zh-CN" dirty="0" smtClean="0"/>
+              <a:t>Performing Redirections</a:t>
+            </a:r>
+          </a:p>
+          <a:p>
+            <a:pPr marL="0" indent="0">
+              <a:buNone/>
+            </a:pPr>
+            <a:r>
+              <a:rPr lang="en-US" altLang="zh-CN" sz="2000" dirty="0"/>
+              <a:t> </a:t>
+            </a:r>
+            <a:r>
+              <a:rPr lang="en-US" altLang="zh-CN" sz="2000" dirty="0" smtClean="0"/>
+              <a:t>       public </a:t>
+            </a:r>
+            <a:r>
+              <a:rPr lang="en-US" altLang="zh-CN" sz="2000" dirty="0" err="1"/>
+              <a:t>RedirectResult</a:t>
+            </a:r>
+            <a:r>
+              <a:rPr lang="en-US" altLang="zh-CN" sz="2000" dirty="0"/>
+              <a:t> </a:t>
+            </a:r>
+            <a:r>
+              <a:rPr lang="en-US" altLang="zh-CN" sz="2000" dirty="0" err="1"/>
+              <a:t>RedirectToAbout</a:t>
+            </a:r>
+            <a:r>
+              <a:rPr lang="en-US" altLang="zh-CN" sz="2000" dirty="0"/>
+              <a:t>()</a:t>
+            </a:r>
+          </a:p>
+          <a:p>
+            <a:pPr marL="0" indent="0">
+              <a:buNone/>
+            </a:pPr>
+            <a:r>
+              <a:rPr lang="zh-CN" altLang="en-US" sz="2000" dirty="0"/>
+              <a:t>        </a:t>
+            </a:r>
+            <a:r>
+              <a:rPr lang="en-US" altLang="zh-CN" sz="2000" dirty="0"/>
+              <a:t>{</a:t>
+            </a:r>
+          </a:p>
+          <a:p>
+            <a:pPr marL="0" indent="0">
+              <a:buNone/>
+            </a:pPr>
+            <a:r>
+              <a:rPr lang="en-US" altLang="zh-CN" sz="2000" dirty="0"/>
+              <a:t>            return Redirect("/Home/About");</a:t>
+            </a:r>
+          </a:p>
+          <a:p>
+            <a:pPr marL="0" indent="0">
+              <a:buNone/>
+            </a:pPr>
+            <a:r>
+              <a:rPr lang="en-US" altLang="zh-CN" sz="2000" dirty="0"/>
+              <a:t>            //return </a:t>
+            </a:r>
+            <a:r>
+              <a:rPr lang="en-US" altLang="zh-CN" sz="2000" dirty="0" err="1"/>
+              <a:t>RedirectPermanent</a:t>
+            </a:r>
+            <a:r>
+              <a:rPr lang="en-US" altLang="zh-CN" sz="2000" dirty="0"/>
+              <a:t>("/Home/About");</a:t>
+            </a:r>
+          </a:p>
+          <a:p>
+            <a:pPr marL="0" indent="0">
+              <a:buNone/>
+            </a:pPr>
+            <a:r>
+              <a:rPr lang="zh-CN" altLang="en-US" sz="2000" dirty="0"/>
+              <a:t>        </a:t>
+            </a:r>
+            <a:r>
+              <a:rPr lang="en-US" altLang="zh-CN" sz="2000" dirty="0" smtClean="0"/>
+              <a:t>}</a:t>
+            </a:r>
+          </a:p>
+          <a:p>
+            <a:pPr marL="0" indent="0">
+              <a:buNone/>
+            </a:pPr>
+            <a:r>
+              <a:rPr lang="en-US" altLang="zh-CN" sz="2000" dirty="0" smtClean="0">
+                <a:hlinkClick r:id="rId2"/>
+              </a:rPr>
+              <a:t>http://localhost:7973/Home/About</a:t>
+            </a:r>
+            <a:endParaRPr lang="en-US" altLang="zh-CN" sz="2000" dirty="0" smtClean="0"/>
+          </a:p>
+          <a:p>
+            <a:pPr marL="0" indent="0">
+              <a:buNone/>
+            </a:pPr>
+            <a:endParaRPr lang="en-US" altLang="zh-CN" sz="2000" dirty="0" smtClean="0"/>
+          </a:p>
+          <a:p>
+            <a:pPr marL="0" indent="0">
+              <a:buNone/>
+            </a:pPr>
+            <a:r>
+              <a:rPr lang="en-US" altLang="zh-CN" sz="2000" dirty="0"/>
+              <a:t> </a:t>
+            </a:r>
+            <a:r>
+              <a:rPr lang="en-US" altLang="zh-CN" sz="2000" dirty="0" smtClean="0"/>
+              <a:t>       public </a:t>
+            </a:r>
+            <a:r>
+              <a:rPr lang="en-US" altLang="zh-CN" sz="2000" dirty="0" err="1"/>
+              <a:t>RedirectToRouteResult</a:t>
+            </a:r>
+            <a:r>
+              <a:rPr lang="en-US" altLang="zh-CN" sz="2000" dirty="0"/>
+              <a:t> </a:t>
+            </a:r>
+            <a:r>
+              <a:rPr lang="en-US" altLang="zh-CN" sz="2000" dirty="0" err="1"/>
+              <a:t>RedirectToRouteResult</a:t>
+            </a:r>
+            <a:r>
+              <a:rPr lang="en-US" altLang="zh-CN" sz="2000" dirty="0"/>
+              <a:t>()</a:t>
+            </a:r>
+          </a:p>
+          <a:p>
+            <a:pPr marL="0" indent="0">
+              <a:buNone/>
+            </a:pPr>
+            <a:r>
+              <a:rPr lang="zh-CN" altLang="en-US" sz="2000" dirty="0"/>
+              <a:t>        </a:t>
+            </a:r>
+            <a:r>
+              <a:rPr lang="en-US" altLang="zh-CN" sz="2000" dirty="0"/>
+              <a:t>{</a:t>
+            </a:r>
+          </a:p>
+          <a:p>
+            <a:pPr marL="0" indent="0">
+              <a:buNone/>
+            </a:pPr>
+            <a:r>
+              <a:rPr lang="en-US" altLang="zh-CN" sz="2000" dirty="0"/>
+              <a:t>            return </a:t>
+            </a:r>
+            <a:r>
+              <a:rPr lang="en-US" altLang="zh-CN" sz="2000" dirty="0" err="1"/>
+              <a:t>RedirectToRoute</a:t>
+            </a:r>
+            <a:r>
+              <a:rPr lang="en-US" altLang="zh-CN" sz="2000" dirty="0"/>
+              <a:t>(new { controller = "Example", action = "Index", ID = "</a:t>
+            </a:r>
+            <a:r>
+              <a:rPr lang="en-US" altLang="zh-CN" sz="2000" dirty="0" err="1"/>
+              <a:t>MyID</a:t>
+            </a:r>
+            <a:r>
+              <a:rPr lang="en-US" altLang="zh-CN" sz="2000" dirty="0"/>
+              <a:t>" });</a:t>
+            </a:r>
+          </a:p>
+          <a:p>
+            <a:pPr marL="0" indent="0">
+              <a:buNone/>
+            </a:pPr>
+            <a:r>
+              <a:rPr lang="zh-CN" altLang="en-US" sz="2000" dirty="0"/>
+              <a:t>        </a:t>
+            </a:r>
+            <a:r>
+              <a:rPr lang="en-US" altLang="zh-CN" sz="2000" dirty="0" smtClean="0"/>
+              <a:t>}</a:t>
+            </a:r>
+          </a:p>
+          <a:p>
+            <a:pPr marL="0" indent="0">
+              <a:buNone/>
+            </a:pPr>
+            <a:r>
+              <a:rPr lang="en-US" altLang="zh-CN" sz="2000" dirty="0" smtClean="0">
+                <a:hlinkClick r:id="rId3"/>
+              </a:rPr>
+              <a:t>http://localhost:7973/Example/Index/MyID</a:t>
+            </a:r>
+            <a:endParaRPr lang="en-US" altLang="zh-CN" sz="2000" dirty="0" smtClean="0"/>
+          </a:p>
+          <a:p>
+            <a:pPr marL="0" indent="0">
+              <a:buNone/>
+            </a:pPr>
+            <a:endParaRPr lang="zh-CN" altLang="en-US" sz="2000" dirty="0"/>
+          </a:p>
+        </p:txBody>
+      </p:sp>
+    </p:spTree>
+    <p:extLst>
+      <p:ext uri="{BB962C8B-B14F-4D97-AF65-F5344CB8AC3E}">
+        <p14:creationId xmlns:p14="http://schemas.microsoft.com/office/powerpoint/2010/main" val="596354782"/>
+      </p:ext>
+    </p:extLst>
+  </p:cSld>
+  <p:clrMapOvr>
+    <a:masterClrMapping/>
+  </p:clrMapOvr>
+  <p:timing>
+    <p:tnLst>
+      <p:par>
+        <p:cTn id="1" dur="indefinite" restart="never" nodeType="tmRoot">
+          <p:childTnLst>
+            <p:seq concurrent="1" nextAc="seek">
+              <p:cTn id="2" dur="indefinite" nodeType="mainSeq">
+                <p:childTnLst>
+                  <p:par>
+                    <p:cTn id="3" fill="hold">
+                      <p:stCondLst>
+                        <p:cond delay="indefinite"/>
+                      </p:stCondLst>
+                      <p:childTnLst>
+                        <p:par>
+                          <p:cTn id="4" fill="hold">
+                            <p:stCondLst>
+                              <p:cond delay="0"/>
+                            </p:stCondLst>
+                            <p:childTnLst>
+                              <p:par>
+                                <p:cTn id="5" presetID="2" presetClass="entr" presetSubtype="4" fill="hold" nodeType="clickEffect">
+                                  <p:stCondLst>
+                                    <p:cond delay="0"/>
+                                  </p:stCondLst>
+                                  <p:childTnLst>
+                                    <p:set>
+                                      <p:cBhvr>
+                                        <p:cTn id="6" dur="1" fill="hold">
+                                          <p:stCondLst>
+                                            <p:cond delay="0"/>
+                                          </p:stCondLst>
+                                        </p:cTn>
+                                        <p:tgtEl>
+                                          <p:spTgt spid="3">
+                                            <p:txEl>
+                                              <p:pRg st="6" end="6"/>
+                                            </p:txEl>
+                                          </p:spTgt>
+                                        </p:tgtEl>
+                                        <p:attrNameLst>
+                                          <p:attrName>style.visibility</p:attrName>
+                                        </p:attrNameLst>
+                                      </p:cBhvr>
+                                      <p:to>
+                                        <p:strVal val="visible"/>
+                                      </p:to>
+                                    </p:set>
+                                    <p:anim calcmode="lin" valueType="num">
+                                      <p:cBhvr additive="base">
+                                        <p:cTn id="7" dur="500" fill="hold"/>
+                                        <p:tgtEl>
+                                          <p:spTgt spid="3">
+                                            <p:txEl>
+                                              <p:pRg st="6" end="6"/>
+                                            </p:txEl>
+                                          </p:spTgt>
+                                        </p:tgtEl>
+                                        <p:attrNameLst>
+                                          <p:attrName>ppt_x</p:attrName>
+                                        </p:attrNameLst>
+                                      </p:cBhvr>
+                                      <p:tavLst>
+                                        <p:tav tm="0">
+                                          <p:val>
+                                            <p:strVal val="#ppt_x"/>
+                                          </p:val>
+                                        </p:tav>
+                                        <p:tav tm="100000">
+                                          <p:val>
+                                            <p:strVal val="#ppt_x"/>
+                                          </p:val>
+                                        </p:tav>
+                                      </p:tavLst>
+                                    </p:anim>
+                                    <p:anim calcmode="lin" valueType="num">
+                                      <p:cBhvr additive="base">
+                                        <p:cTn id="8" dur="500" fill="hold"/>
+                                        <p:tgtEl>
+                                          <p:spTgt spid="3">
+                                            <p:txEl>
+                                              <p:pRg st="6" end="6"/>
+                                            </p:txEl>
+                                          </p:spTgt>
+                                        </p:tgtEl>
+                                        <p:attrNameLst>
+                                          <p:attrName>ppt_y</p:attrName>
+                                        </p:attrNameLst>
+                                      </p:cBhvr>
+                                      <p:tavLst>
+                                        <p:tav tm="0">
+                                          <p:val>
+                                            <p:strVal val="1+#ppt_h/2"/>
+                                          </p:val>
+                                        </p:tav>
+                                        <p:tav tm="100000">
+                                          <p:val>
+                                            <p:strVal val="#ppt_y"/>
+                                          </p:val>
+                                        </p:tav>
+                                      </p:tavLst>
+                                    </p:anim>
+                                  </p:childTnLst>
+                                </p:cTn>
+                              </p:par>
+                            </p:childTnLst>
+                          </p:cTn>
+                        </p:par>
+                      </p:childTnLst>
+                    </p:cTn>
+                  </p:par>
+                  <p:par>
+                    <p:cTn id="9" fill="hold">
+                      <p:stCondLst>
+                        <p:cond delay="indefinite"/>
+                      </p:stCondLst>
+                      <p:childTnLst>
+                        <p:par>
+                          <p:cTn id="10" fill="hold">
+                            <p:stCondLst>
+                              <p:cond delay="0"/>
+                            </p:stCondLst>
+                            <p:childTnLst>
+                              <p:par>
+                                <p:cTn id="11" presetID="2" presetClass="entr" presetSubtype="4" fill="hold" nodeType="clickEffect">
+                                  <p:stCondLst>
+                                    <p:cond delay="0"/>
+                                  </p:stCondLst>
+                                  <p:childTnLst>
+                                    <p:set>
+                                      <p:cBhvr>
+                                        <p:cTn id="12" dur="1" fill="hold">
+                                          <p:stCondLst>
+                                            <p:cond delay="0"/>
+                                          </p:stCondLst>
+                                        </p:cTn>
+                                        <p:tgtEl>
+                                          <p:spTgt spid="3">
+                                            <p:txEl>
+                                              <p:pRg st="12" end="12"/>
+                                            </p:txEl>
+                                          </p:spTgt>
+                                        </p:tgtEl>
+                                        <p:attrNameLst>
+                                          <p:attrName>style.visibility</p:attrName>
+                                        </p:attrNameLst>
+                                      </p:cBhvr>
+                                      <p:to>
+                                        <p:strVal val="visible"/>
+                                      </p:to>
+                                    </p:set>
+                                    <p:anim calcmode="lin" valueType="num">
+                                      <p:cBhvr additive="base">
+                                        <p:cTn id="13" dur="500" fill="hold"/>
+                                        <p:tgtEl>
+                                          <p:spTgt spid="3">
+                                            <p:txEl>
+                                              <p:pRg st="12" end="12"/>
+                                            </p:txEl>
+                                          </p:spTgt>
+                                        </p:tgtEl>
+                                        <p:attrNameLst>
+                                          <p:attrName>ppt_x</p:attrName>
+                                        </p:attrNameLst>
+                                      </p:cBhvr>
+                                      <p:tavLst>
+                                        <p:tav tm="0">
+                                          <p:val>
+                                            <p:strVal val="#ppt_x"/>
+                                          </p:val>
+                                        </p:tav>
+                                        <p:tav tm="100000">
+                                          <p:val>
+                                            <p:strVal val="#ppt_x"/>
+                                          </p:val>
+                                        </p:tav>
+                                      </p:tavLst>
+                                    </p:anim>
+                                    <p:anim calcmode="lin" valueType="num">
+                                      <p:cBhvr additive="base">
+                                        <p:cTn id="14" dur="500" fill="hold"/>
+                                        <p:tgtEl>
+                                          <p:spTgt spid="3">
+                                            <p:txEl>
+                                              <p:pRg st="12" end="12"/>
+                                            </p:txEl>
+                                          </p:spTgt>
+                                        </p:tgtEl>
+                                        <p:attrNameLst>
+                                          <p:attrName>ppt_y</p:attrName>
+                                        </p:attrNameLst>
+                                      </p:cBhvr>
+                                      <p:tavLst>
+                                        <p:tav tm="0">
+                                          <p:val>
+                                            <p:strVal val="1+#ppt_h/2"/>
+                                          </p:val>
+                                        </p:tav>
+                                        <p:tav tm="100000">
+                                          <p:val>
+                                            <p:strVal val="#ppt_y"/>
+                                          </p:val>
+                                        </p:tav>
+                                      </p:tavLst>
+                                    </p:anim>
+                                  </p:childTnLst>
+                                </p:cTn>
+                              </p:par>
+                            </p:childTnLst>
+                          </p:cTn>
+                        </p:par>
+                      </p:childTnLst>
+                    </p:cTn>
+                  </p:par>
+                </p:childTnLst>
+              </p:cTn>
+              <p:prevCondLst>
+                <p:cond evt="onPrev" delay="0">
+                  <p:tgtEl>
+                    <p:sldTgt/>
+                  </p:tgtEl>
+                </p:cond>
+              </p:prevCondLst>
+              <p:nextCondLst>
+                <p:cond evt="onNext" delay="0">
+                  <p:tgtEl>
+                    <p:sldTgt/>
+                  </p:tgtEl>
+                </p:cond>
+              </p:nextCondLst>
+            </p:seq>
+          </p:childTnLst>
+        </p:cTn>
+      </p:par>
+    </p:tnLst>
+  </p:timing>
+</p:sld>
+</file>
+
+<file path=ppt/slides/slide17.xml><?xml version="1.0" encoding="utf-8"?>
+<p:sld xmlns:a="http://schemas.openxmlformats.org/drawingml/2006/main" xmlns:r="http://schemas.openxmlformats.org/officeDocument/2006/relationships" xmlns:p="http://schemas.openxmlformats.org/presentationml/2006/main">
+  <p:cSld>
+    <p:spTree>
+      <p:nvGrpSpPr>
+        <p:cNvPr id="1" name=""/>
+        <p:cNvGrpSpPr/>
+        <p:nvPr/>
+      </p:nvGrpSpPr>
+      <p:grpSpPr>
+        <a:xfrm>
+          <a:off x="0" y="0"/>
+          <a:ext cx="0" cy="0"/>
+          <a:chOff x="0" y="0"/>
+          <a:chExt cx="0" cy="0"/>
+        </a:xfrm>
+      </p:grpSpPr>
+      <p:sp>
+        <p:nvSpPr>
+          <p:cNvPr id="2" name="Title 1"/>
+          <p:cNvSpPr>
+            <a:spLocks noGrp="1"/>
+          </p:cNvSpPr>
+          <p:nvPr>
+            <p:ph type="title"/>
+          </p:nvPr>
+        </p:nvSpPr>
+        <p:spPr/>
+        <p:txBody>
+          <a:bodyPr/>
+          <a:lstStyle/>
+          <a:p>
+            <a:endParaRPr lang="zh-CN" altLang="en-US"/>
+          </a:p>
+        </p:txBody>
+      </p:sp>
+      <p:sp>
+        <p:nvSpPr>
+          <p:cNvPr id="3" name="Content Placeholder 2"/>
+          <p:cNvSpPr>
+            <a:spLocks noGrp="1"/>
+          </p:cNvSpPr>
+          <p:nvPr>
+            <p:ph idx="1"/>
+          </p:nvPr>
+        </p:nvSpPr>
+        <p:spPr/>
+        <p:txBody>
+          <a:bodyPr/>
+          <a:lstStyle/>
+          <a:p>
+            <a:endParaRPr lang="zh-CN" altLang="en-US"/>
+          </a:p>
+        </p:txBody>
+      </p:sp>
+    </p:spTree>
+    <p:extLst>
+      <p:ext uri="{BB962C8B-B14F-4D97-AF65-F5344CB8AC3E}">
+        <p14:creationId xmlns:p14="http://schemas.microsoft.com/office/powerpoint/2010/main" val="2263667834"/>
+      </p:ext>
+    </p:extLst>
+  </p:cSld>
+  <p:clrMapOvr>
+    <a:masterClrMapping/>
+  </p:clrMapOvr>
+  <p:timing>
+    <p:tnLst>
+      <p:par>
+        <p:cTn id="1" dur="indefinite" restart="never" nodeType="tmRoot"/>
+      </p:par>
+    </p:tnLst>
+  </p:timing>
 </p:sld>
 </file>
 
@@ -3127,6 +5425,13 @@
   <p:clrMapOvr>
     <a:masterClrMapping/>
   </p:clrMapOvr>
+  <p:timing>
+    <p:tnLst>
+      <p:par>
+        <p:cTn id="1" dur="indefinite" restart="never" nodeType="tmRoot"/>
+      </p:par>
+    </p:tnLst>
+  </p:timing>
 </p:sld>
 </file>
 
@@ -3163,10 +5468,10 @@
           <a:lstStyle/>
           <a:p>
             <a:r>
-              <a:rPr lang="en-US" dirty="0" smtClean="0"/>
-              <a:t>MVC conventions</a:t>
-            </a:r>
-            <a:endParaRPr lang="en-US" dirty="0"/>
+              <a:rPr lang="en-US" altLang="zh-CN" dirty="0" smtClean="0"/>
+              <a:t>Model-View-Controller</a:t>
+            </a:r>
+            <a:endParaRPr lang="zh-CN" altLang="en-US" dirty="0"/>
           </a:p>
         </p:txBody>
       </p:sp>
@@ -3185,71 +5490,105 @@
           <a:bodyPr/>
           <a:lstStyle/>
           <a:p>
-            <a:r>
-              <a:rPr lang="en-US" dirty="0"/>
-              <a:t>Controller classes must have names that end with Controller, such as </a:t>
-            </a:r>
-            <a:r>
-              <a:rPr lang="en-US" dirty="0" err="1" smtClean="0"/>
-              <a:t>ProductController</a:t>
-            </a:r>
-            <a:r>
-              <a:rPr lang="en-US" dirty="0" smtClean="0"/>
-              <a:t>, </a:t>
-            </a:r>
-            <a:r>
-              <a:rPr lang="en-US" dirty="0" err="1" smtClean="0"/>
-              <a:t>AdminController</a:t>
-            </a:r>
-            <a:r>
-              <a:rPr lang="en-US" dirty="0"/>
-              <a:t>, and </a:t>
-            </a:r>
-            <a:r>
-              <a:rPr lang="en-US" dirty="0" err="1" smtClean="0"/>
-              <a:t>HomeController</a:t>
-            </a:r>
-            <a:endParaRPr lang="en-US" dirty="0" smtClean="0"/>
-          </a:p>
-          <a:p>
-            <a:r>
-              <a:rPr lang="en-US" dirty="0"/>
-              <a:t>Views and partial views go into the folder /Views/</a:t>
-            </a:r>
-            <a:r>
-              <a:rPr lang="en-US" i="1" dirty="0" err="1"/>
-              <a:t>Controllername</a:t>
-            </a:r>
-            <a:r>
-              <a:rPr lang="en-US" dirty="0"/>
-              <a:t>. For example, a view associated </a:t>
-            </a:r>
-            <a:r>
-              <a:rPr lang="en-US" dirty="0" smtClean="0"/>
-              <a:t>with the </a:t>
-            </a:r>
-            <a:r>
-              <a:rPr lang="en-US" dirty="0" err="1"/>
-              <a:t>ProductController</a:t>
-            </a:r>
-            <a:r>
-              <a:rPr lang="en-US" dirty="0"/>
-              <a:t> class would go in the /Views/Product folder.</a:t>
-            </a:r>
-            <a:endParaRPr lang="en-US" dirty="0"/>
+            <a:pPr>
+              <a:lnSpc>
+                <a:spcPts val="3775"/>
+              </a:lnSpc>
+              <a:spcBef>
+                <a:spcPts val="600"/>
+              </a:spcBef>
+              <a:spcAft>
+                <a:spcPts val="600"/>
+              </a:spcAft>
+              <a:buClr>
+                <a:srgbClr val="B5DBE5"/>
+              </a:buClr>
+              <a:buSzPct val="70000"/>
+              <a:buFont typeface="Wingdings 2" panose="05020102010507070707" pitchFamily="18" charset="2"/>
+              <a:buChar char=""/>
+            </a:pPr>
+            <a:r>
+              <a:rPr lang="en-US" altLang="zh-CN" b="1" dirty="0" smtClean="0">
+                <a:latin typeface="Corbel" panose="020B0503020204020204" pitchFamily="34" charset="0"/>
+              </a:rPr>
+              <a:t>Controller - responsible for handling all user input</a:t>
+            </a:r>
+          </a:p>
+          <a:p>
+            <a:pPr>
+              <a:lnSpc>
+                <a:spcPts val="3775"/>
+              </a:lnSpc>
+              <a:spcBef>
+                <a:spcPts val="600"/>
+              </a:spcBef>
+              <a:spcAft>
+                <a:spcPts val="600"/>
+              </a:spcAft>
+              <a:buClr>
+                <a:srgbClr val="B5DBE5"/>
+              </a:buClr>
+              <a:buSzPct val="70000"/>
+              <a:buFont typeface="Wingdings 2" panose="05020102010507070707" pitchFamily="18" charset="2"/>
+              <a:buChar char=""/>
+            </a:pPr>
+            <a:r>
+              <a:rPr lang="en-US" altLang="zh-CN" b="1" dirty="0" smtClean="0">
+                <a:latin typeface="Corbel" panose="020B0503020204020204" pitchFamily="34" charset="0"/>
+              </a:rPr>
+              <a:t>View - the visual representation of the model</a:t>
+            </a:r>
+          </a:p>
+          <a:p>
+            <a:pPr>
+              <a:lnSpc>
+                <a:spcPts val="3775"/>
+              </a:lnSpc>
+              <a:spcBef>
+                <a:spcPts val="600"/>
+              </a:spcBef>
+              <a:spcAft>
+                <a:spcPts val="600"/>
+              </a:spcAft>
+              <a:buClr>
+                <a:srgbClr val="B5DBE5"/>
+              </a:buClr>
+              <a:buSzPct val="70000"/>
+              <a:buFont typeface="Wingdings 2" panose="05020102010507070707" pitchFamily="18" charset="2"/>
+              <a:buChar char=""/>
+            </a:pPr>
+            <a:r>
+              <a:rPr lang="en-US" altLang="zh-CN" b="1" dirty="0" smtClean="0">
+                <a:latin typeface="Corbel" panose="020B0503020204020204" pitchFamily="34" charset="0"/>
+              </a:rPr>
+              <a:t>Model - represents the logic of the application</a:t>
+            </a:r>
+          </a:p>
+          <a:p>
+            <a:pPr marL="0" indent="0">
+              <a:buNone/>
+            </a:pPr>
+            <a:endParaRPr lang="zh-CN" altLang="en-US" dirty="0"/>
           </a:p>
         </p:txBody>
       </p:sp>
     </p:spTree>
     <p:extLst>
       <p:ext uri="{BB962C8B-B14F-4D97-AF65-F5344CB8AC3E}">
-        <p14:creationId xmlns:p14="http://schemas.microsoft.com/office/powerpoint/2010/main" val="1131637355"/>
+        <p14:creationId xmlns:p14="http://schemas.microsoft.com/office/powerpoint/2010/main" val="3311370443"/>
       </p:ext>
     </p:extLst>
   </p:cSld>
   <p:clrMapOvr>
     <a:masterClrMapping/>
   </p:clrMapOvr>
+  <p:timing>
+    <p:tnLst>
+      <p:par>
+        <p:cTn id="1" dur="indefinite" restart="never" nodeType="tmRoot"/>
+      </p:par>
+    </p:tnLst>
+  </p:timing>
 </p:sld>
 </file>
 
@@ -3286,10 +5625,10 @@
           <a:lstStyle/>
           <a:p>
             <a:r>
-              <a:rPr lang="en-US" altLang="zh-CN" dirty="0" smtClean="0"/>
-              <a:t>Model-View-Controller</a:t>
-            </a:r>
-            <a:endParaRPr lang="zh-CN" altLang="en-US" dirty="0"/>
+              <a:rPr lang="en-US" dirty="0" smtClean="0"/>
+              <a:t>MVC conventions</a:t>
+            </a:r>
+            <a:endParaRPr lang="en-US" dirty="0"/>
           </a:p>
         </p:txBody>
       </p:sp>
@@ -3308,92 +5647,1955 @@
           <a:bodyPr/>
           <a:lstStyle/>
           <a:p>
-            <a:pPr>
-              <a:lnSpc>
-                <a:spcPts val="3775"/>
-              </a:lnSpc>
-              <a:spcBef>
-                <a:spcPts val="600"/>
-              </a:spcBef>
-              <a:spcAft>
-                <a:spcPts val="600"/>
-              </a:spcAft>
-              <a:buClr>
-                <a:srgbClr val="B5DBE5"/>
-              </a:buClr>
-              <a:buSzPct val="70000"/>
-              <a:buFont typeface="Wingdings 2" panose="05020102010507070707" pitchFamily="18" charset="2"/>
-              <a:buChar char=""/>
-            </a:pPr>
-            <a:r>
-              <a:rPr lang="en-US" altLang="zh-CN" b="1" dirty="0" smtClean="0">
-                <a:latin typeface="Corbel" panose="020B0503020204020204" pitchFamily="34" charset="0"/>
-              </a:rPr>
-              <a:t>Controller - responsible for handling all user input</a:t>
-            </a:r>
-          </a:p>
-          <a:p>
-            <a:pPr>
-              <a:lnSpc>
-                <a:spcPts val="3775"/>
-              </a:lnSpc>
-              <a:spcBef>
-                <a:spcPts val="600"/>
-              </a:spcBef>
-              <a:spcAft>
-                <a:spcPts val="600"/>
-              </a:spcAft>
-              <a:buClr>
-                <a:srgbClr val="B5DBE5"/>
-              </a:buClr>
-              <a:buSzPct val="70000"/>
-              <a:buFont typeface="Wingdings 2" panose="05020102010507070707" pitchFamily="18" charset="2"/>
-              <a:buChar char=""/>
-            </a:pPr>
-            <a:r>
-              <a:rPr lang="en-US" altLang="zh-CN" b="1" dirty="0" smtClean="0">
-                <a:latin typeface="Corbel" panose="020B0503020204020204" pitchFamily="34" charset="0"/>
-              </a:rPr>
-              <a:t>View - the visual representation of the model</a:t>
-            </a:r>
-          </a:p>
-          <a:p>
-            <a:pPr>
-              <a:lnSpc>
-                <a:spcPts val="3775"/>
-              </a:lnSpc>
-              <a:spcBef>
-                <a:spcPts val="600"/>
-              </a:spcBef>
-              <a:spcAft>
-                <a:spcPts val="600"/>
-              </a:spcAft>
-              <a:buClr>
-                <a:srgbClr val="B5DBE5"/>
-              </a:buClr>
-              <a:buSzPct val="70000"/>
-              <a:buFont typeface="Wingdings 2" panose="05020102010507070707" pitchFamily="18" charset="2"/>
-              <a:buChar char=""/>
-            </a:pPr>
-            <a:r>
-              <a:rPr lang="en-US" altLang="zh-CN" b="1" dirty="0" smtClean="0">
-                <a:latin typeface="Corbel" panose="020B0503020204020204" pitchFamily="34" charset="0"/>
-              </a:rPr>
-              <a:t>Model - represents the logic of the application</a:t>
-            </a:r>
-          </a:p>
-          <a:p>
-            <a:pPr marL="0" indent="0">
-              <a:buNone/>
-            </a:pPr>
-            <a:endParaRPr lang="zh-CN" altLang="en-US" dirty="0"/>
+            <a:r>
+              <a:rPr lang="en-US" dirty="0"/>
+              <a:t>Controller classes must have names that end with Controller, such as </a:t>
+            </a:r>
+            <a:r>
+              <a:rPr lang="en-US" dirty="0" err="1" smtClean="0"/>
+              <a:t>ProductController</a:t>
+            </a:r>
+            <a:r>
+              <a:rPr lang="en-US" dirty="0" smtClean="0"/>
+              <a:t>, </a:t>
+            </a:r>
+            <a:r>
+              <a:rPr lang="en-US" dirty="0" err="1" smtClean="0"/>
+              <a:t>AdminController</a:t>
+            </a:r>
+            <a:r>
+              <a:rPr lang="en-US" dirty="0"/>
+              <a:t>, and </a:t>
+            </a:r>
+            <a:r>
+              <a:rPr lang="en-US" dirty="0" err="1" smtClean="0"/>
+              <a:t>HomeController</a:t>
+            </a:r>
+            <a:endParaRPr lang="en-US" dirty="0" smtClean="0"/>
+          </a:p>
+          <a:p>
+            <a:r>
+              <a:rPr lang="en-US" dirty="0"/>
+              <a:t>Views and partial views go into the folder /Views/</a:t>
+            </a:r>
+            <a:r>
+              <a:rPr lang="en-US" i="1" dirty="0" err="1"/>
+              <a:t>Controllername</a:t>
+            </a:r>
+            <a:r>
+              <a:rPr lang="en-US" dirty="0"/>
+              <a:t>. For example, a view associated </a:t>
+            </a:r>
+            <a:r>
+              <a:rPr lang="en-US" dirty="0" smtClean="0"/>
+              <a:t>with the </a:t>
+            </a:r>
+            <a:r>
+              <a:rPr lang="en-US" dirty="0" err="1"/>
+              <a:t>ProductController</a:t>
+            </a:r>
+            <a:r>
+              <a:rPr lang="en-US" dirty="0"/>
+              <a:t> class would go in the /Views/Product folder</a:t>
+            </a:r>
+            <a:r>
+              <a:rPr lang="en-US" dirty="0" smtClean="0"/>
+              <a:t>.</a:t>
+            </a:r>
+          </a:p>
+          <a:p>
+            <a:r>
+              <a:rPr lang="en-US" dirty="0" smtClean="0"/>
+              <a:t>Views/Shared/_</a:t>
+            </a:r>
+            <a:r>
+              <a:rPr lang="en-US" dirty="0" err="1" smtClean="0"/>
+              <a:t>Layout.cshtml</a:t>
+            </a:r>
+            <a:r>
+              <a:rPr lang="en-US" dirty="0" smtClean="0"/>
+              <a:t>, _</a:t>
+            </a:r>
+            <a:r>
+              <a:rPr lang="en-US" dirty="0" err="1" smtClean="0"/>
+              <a:t>ViewStart.cshtml</a:t>
+            </a:r>
+            <a:endParaRPr lang="en-US" dirty="0"/>
           </a:p>
         </p:txBody>
       </p:sp>
     </p:spTree>
     <p:extLst>
       <p:ext uri="{BB962C8B-B14F-4D97-AF65-F5344CB8AC3E}">
-        <p14:creationId xmlns:p14="http://schemas.microsoft.com/office/powerpoint/2010/main" val="3311370443"/>
+        <p14:creationId xmlns:p14="http://schemas.microsoft.com/office/powerpoint/2010/main" val="1131637355"/>
+      </p:ext>
+    </p:extLst>
+  </p:cSld>
+  <p:clrMapOvr>
+    <a:masterClrMapping/>
+  </p:clrMapOvr>
+  <p:timing>
+    <p:tnLst>
+      <p:par>
+        <p:cTn id="1" dur="indefinite" restart="never" nodeType="tmRoot"/>
+      </p:par>
+    </p:tnLst>
+  </p:timing>
+</p:sld>
+</file>
+
+<file path=ppt/slides/slide5.xml><?xml version="1.0" encoding="utf-8"?>
+<p:sld xmlns:a="http://schemas.openxmlformats.org/drawingml/2006/main" xmlns:r="http://schemas.openxmlformats.org/officeDocument/2006/relationships" xmlns:p="http://schemas.openxmlformats.org/presentationml/2006/main">
+  <p:cSld>
+    <p:spTree>
+      <p:nvGrpSpPr>
+        <p:cNvPr id="1" name=""/>
+        <p:cNvGrpSpPr/>
+        <p:nvPr/>
+      </p:nvGrpSpPr>
+      <p:grpSpPr>
+        <a:xfrm>
+          <a:off x="0" y="0"/>
+          <a:ext cx="0" cy="0"/>
+          <a:chOff x="0" y="0"/>
+          <a:chExt cx="0" cy="0"/>
+        </a:xfrm>
+      </p:grpSpPr>
+      <p:sp>
+        <p:nvSpPr>
+          <p:cNvPr id="2" name="Title 1"/>
+          <p:cNvSpPr>
+            <a:spLocks noGrp="1"/>
+          </p:cNvSpPr>
+          <p:nvPr>
+            <p:ph type="title"/>
+          </p:nvPr>
+        </p:nvSpPr>
+        <p:spPr/>
+        <p:txBody>
+          <a:bodyPr/>
+          <a:lstStyle/>
+          <a:p>
+            <a:r>
+              <a:rPr lang="en-US" altLang="zh-CN" dirty="0" smtClean="0"/>
+              <a:t>URL Routing</a:t>
+            </a:r>
+            <a:endParaRPr lang="zh-CN" altLang="en-US" dirty="0"/>
+          </a:p>
+        </p:txBody>
+      </p:sp>
+      <p:sp>
+        <p:nvSpPr>
+          <p:cNvPr id="3" name="Content Placeholder 2"/>
+          <p:cNvSpPr>
+            <a:spLocks noGrp="1"/>
+          </p:cNvSpPr>
+          <p:nvPr>
+            <p:ph idx="1"/>
+          </p:nvPr>
+        </p:nvSpPr>
+        <p:spPr/>
+        <p:txBody>
+          <a:bodyPr>
+            <a:normAutofit/>
+          </a:bodyPr>
+          <a:lstStyle/>
+          <a:p>
+            <a:r>
+              <a:rPr lang="en-US" altLang="zh-CN" dirty="0" smtClean="0"/>
+              <a:t>URL Pattern</a:t>
+            </a:r>
+          </a:p>
+          <a:p>
+            <a:pPr marL="0" indent="0">
+              <a:buNone/>
+            </a:pPr>
+            <a:r>
+              <a:rPr lang="en-US" altLang="zh-CN" dirty="0">
+                <a:hlinkClick r:id="rId2"/>
+              </a:rPr>
+              <a:t>http://mysite.com/Admin/Index</a:t>
+            </a:r>
+            <a:endParaRPr lang="en-US" altLang="zh-CN" dirty="0"/>
+          </a:p>
+          <a:p>
+            <a:pPr marL="0" indent="0">
+              <a:buNone/>
+            </a:pPr>
+            <a:r>
+              <a:rPr lang="en-US" altLang="zh-CN" dirty="0"/>
+              <a:t>{controller}/{action</a:t>
+            </a:r>
+            <a:r>
+              <a:rPr lang="en-US" altLang="zh-CN" dirty="0" smtClean="0"/>
+              <a:t>}</a:t>
+            </a:r>
+          </a:p>
+          <a:p>
+            <a:r>
+              <a:rPr lang="en-US" altLang="zh-CN" dirty="0" smtClean="0"/>
+              <a:t>Creating and Registering a Simple Route</a:t>
+            </a:r>
+          </a:p>
+          <a:p>
+            <a:r>
+              <a:rPr lang="en-US" altLang="zh-CN" dirty="0" smtClean="0"/>
+              <a:t>Defining Default Values</a:t>
+            </a:r>
+          </a:p>
+          <a:p>
+            <a:pPr marL="0" indent="0">
+              <a:buNone/>
+            </a:pPr>
+            <a:r>
+              <a:rPr lang="en-US" altLang="zh-CN" sz="2000" dirty="0" err="1"/>
+              <a:t>routes.MapRoute</a:t>
+            </a:r>
+            <a:r>
+              <a:rPr lang="en-US" altLang="zh-CN" sz="2000" dirty="0"/>
+              <a:t>("</a:t>
+            </a:r>
+            <a:r>
+              <a:rPr lang="en-US" altLang="zh-CN" sz="2000" dirty="0" err="1"/>
+              <a:t>MyRoute</a:t>
+            </a:r>
+            <a:r>
+              <a:rPr lang="en-US" altLang="zh-CN" sz="2000" dirty="0"/>
+              <a:t>", "{controller}/{action}",</a:t>
+            </a:r>
+          </a:p>
+          <a:p>
+            <a:pPr marL="0" indent="0">
+              <a:buNone/>
+            </a:pPr>
+            <a:r>
+              <a:rPr lang="en-US" altLang="zh-CN" sz="2000" dirty="0"/>
+              <a:t>new { controller = "Home", action = "Index" </a:t>
+            </a:r>
+            <a:r>
+              <a:rPr lang="en-US" altLang="zh-CN" sz="2000" dirty="0" smtClean="0"/>
+              <a:t>});</a:t>
+            </a:r>
+            <a:endParaRPr lang="en-US" altLang="zh-CN" sz="2000" dirty="0"/>
+          </a:p>
+        </p:txBody>
+      </p:sp>
+    </p:spTree>
+    <p:extLst>
+      <p:ext uri="{BB962C8B-B14F-4D97-AF65-F5344CB8AC3E}">
+        <p14:creationId xmlns:p14="http://schemas.microsoft.com/office/powerpoint/2010/main" val="1680486435"/>
+      </p:ext>
+    </p:extLst>
+  </p:cSld>
+  <p:clrMapOvr>
+    <a:masterClrMapping/>
+  </p:clrMapOvr>
+  <p:timing>
+    <p:tnLst>
+      <p:par>
+        <p:cTn id="1" dur="indefinite" restart="never" nodeType="tmRoot"/>
+      </p:par>
+    </p:tnLst>
+  </p:timing>
+</p:sld>
+</file>
+
+<file path=ppt/slides/slide6.xml><?xml version="1.0" encoding="utf-8"?>
+<p:sld xmlns:a="http://schemas.openxmlformats.org/drawingml/2006/main" xmlns:r="http://schemas.openxmlformats.org/officeDocument/2006/relationships" xmlns:p="http://schemas.openxmlformats.org/presentationml/2006/main">
+  <p:cSld>
+    <p:spTree>
+      <p:nvGrpSpPr>
+        <p:cNvPr id="1" name=""/>
+        <p:cNvGrpSpPr/>
+        <p:nvPr/>
+      </p:nvGrpSpPr>
+      <p:grpSpPr>
+        <a:xfrm>
+          <a:off x="0" y="0"/>
+          <a:ext cx="0" cy="0"/>
+          <a:chOff x="0" y="0"/>
+          <a:chExt cx="0" cy="0"/>
+        </a:xfrm>
+      </p:grpSpPr>
+      <p:sp>
+        <p:nvSpPr>
+          <p:cNvPr id="2" name="Title 1"/>
+          <p:cNvSpPr>
+            <a:spLocks noGrp="1"/>
+          </p:cNvSpPr>
+          <p:nvPr>
+            <p:ph type="title"/>
+          </p:nvPr>
+        </p:nvSpPr>
+        <p:spPr/>
+        <p:txBody>
+          <a:bodyPr/>
+          <a:lstStyle/>
+          <a:p>
+            <a:r>
+              <a:rPr lang="en-US" altLang="zh-CN" dirty="0"/>
+              <a:t>URL Routing</a:t>
+            </a:r>
+            <a:endParaRPr lang="zh-CN" altLang="en-US" dirty="0"/>
+          </a:p>
+        </p:txBody>
+      </p:sp>
+      <p:sp>
+        <p:nvSpPr>
+          <p:cNvPr id="3" name="Content Placeholder 2"/>
+          <p:cNvSpPr>
+            <a:spLocks noGrp="1"/>
+          </p:cNvSpPr>
+          <p:nvPr>
+            <p:ph idx="1"/>
+          </p:nvPr>
+        </p:nvSpPr>
+        <p:spPr/>
+        <p:txBody>
+          <a:bodyPr>
+            <a:normAutofit/>
+          </a:bodyPr>
+          <a:lstStyle/>
+          <a:p>
+            <a:r>
+              <a:rPr lang="en-US" altLang="zh-CN" dirty="0"/>
+              <a:t>Using </a:t>
+            </a:r>
+            <a:r>
+              <a:rPr lang="en-US" altLang="zh-CN" dirty="0" err="1"/>
+              <a:t>satic</a:t>
+            </a:r>
+            <a:r>
+              <a:rPr lang="en-US" altLang="zh-CN" dirty="0"/>
+              <a:t> URL Segments</a:t>
+            </a:r>
+          </a:p>
+          <a:p>
+            <a:pPr marL="0" indent="0">
+              <a:buNone/>
+            </a:pPr>
+            <a:r>
+              <a:rPr lang="en-US" altLang="zh-CN" sz="2000" b="1" dirty="0">
+                <a:hlinkClick r:id="rId2"/>
+              </a:rPr>
+              <a:t>http://</a:t>
+            </a:r>
+            <a:r>
+              <a:rPr lang="en-US" altLang="zh-CN" sz="2000" b="1" dirty="0" smtClean="0">
+                <a:hlinkClick r:id="rId2"/>
+              </a:rPr>
+              <a:t>mydomain.com/Public/Home/Index</a:t>
+            </a:r>
+            <a:endParaRPr lang="en-US" altLang="zh-CN" sz="2000" b="1" dirty="0" smtClean="0"/>
+          </a:p>
+          <a:p>
+            <a:pPr marL="0" indent="0">
+              <a:buNone/>
+            </a:pPr>
+            <a:r>
+              <a:rPr lang="en-US" altLang="zh-CN" sz="2000" dirty="0" err="1" smtClean="0"/>
+              <a:t>routes.MapRoute</a:t>
+            </a:r>
+            <a:r>
+              <a:rPr lang="en-US" altLang="zh-CN" sz="2000" dirty="0"/>
+              <a:t>("", "Public/{controller}/{action}",</a:t>
+            </a:r>
+          </a:p>
+          <a:p>
+            <a:pPr marL="0" indent="0">
+              <a:buNone/>
+            </a:pPr>
+            <a:r>
+              <a:rPr lang="en-US" altLang="zh-CN" sz="2000" dirty="0"/>
+              <a:t>new { controller = "Home", action = "Index" </a:t>
+            </a:r>
+            <a:r>
+              <a:rPr lang="en-US" altLang="zh-CN" sz="2000" dirty="0" smtClean="0"/>
+              <a:t>});</a:t>
+            </a:r>
+            <a:endParaRPr lang="en-US" altLang="zh-CN" sz="2000" dirty="0"/>
+          </a:p>
+          <a:p>
+            <a:pPr marL="0" indent="0">
+              <a:buNone/>
+            </a:pPr>
+            <a:r>
+              <a:rPr lang="en-US" altLang="zh-CN" sz="2000" b="1" dirty="0">
+                <a:hlinkClick r:id="rId3"/>
+              </a:rPr>
+              <a:t>http://</a:t>
+            </a:r>
+            <a:r>
+              <a:rPr lang="en-US" altLang="zh-CN" sz="2000" b="1" dirty="0" smtClean="0">
+                <a:hlinkClick r:id="rId3"/>
+              </a:rPr>
+              <a:t>mydomain.com/MyHome/Index</a:t>
+            </a:r>
+            <a:endParaRPr lang="en-US" altLang="zh-CN" sz="2000" b="1" dirty="0" smtClean="0"/>
+          </a:p>
+          <a:p>
+            <a:pPr marL="0" indent="0">
+              <a:buNone/>
+            </a:pPr>
+            <a:r>
+              <a:rPr lang="en-US" altLang="zh-CN" sz="2000" dirty="0" err="1"/>
+              <a:t>routes.MapRoute</a:t>
+            </a:r>
+            <a:r>
+              <a:rPr lang="en-US" altLang="zh-CN" sz="2000" dirty="0"/>
+              <a:t>("", </a:t>
+            </a:r>
+            <a:r>
+              <a:rPr lang="en-US" altLang="zh-CN" sz="2000" dirty="0" smtClean="0"/>
+              <a:t>“My{controller</a:t>
+            </a:r>
+            <a:r>
+              <a:rPr lang="en-US" altLang="zh-CN" sz="2000" dirty="0"/>
+              <a:t>}/{action</a:t>
+            </a:r>
+            <a:r>
+              <a:rPr lang="en-US" altLang="zh-CN" sz="2000" dirty="0" smtClean="0"/>
+              <a:t>}");</a:t>
+            </a:r>
+          </a:p>
+          <a:p>
+            <a:pPr marL="0" indent="0">
+              <a:buNone/>
+            </a:pPr>
+            <a:r>
+              <a:rPr lang="en-US" altLang="zh-CN" sz="2000" b="1" dirty="0">
+                <a:hlinkClick r:id="rId4"/>
+              </a:rPr>
+              <a:t>http://</a:t>
+            </a:r>
+            <a:r>
+              <a:rPr lang="en-US" altLang="zh-CN" sz="2000" b="1" dirty="0" smtClean="0">
+                <a:hlinkClick r:id="rId4"/>
+              </a:rPr>
+              <a:t>mydomain.com/Shop/Index</a:t>
+            </a:r>
+            <a:endParaRPr lang="en-US" altLang="zh-CN" sz="2000" b="1" dirty="0"/>
+          </a:p>
+          <a:p>
+            <a:pPr marL="0" indent="0">
+              <a:buNone/>
+            </a:pPr>
+            <a:r>
+              <a:rPr lang="en-US" altLang="zh-CN" sz="2000" dirty="0" err="1"/>
+              <a:t>routes.MapRoute</a:t>
+            </a:r>
+            <a:r>
+              <a:rPr lang="en-US" altLang="zh-CN" sz="2000" dirty="0"/>
+              <a:t>("</a:t>
+            </a:r>
+            <a:r>
+              <a:rPr lang="en-US" altLang="zh-CN" sz="2000" dirty="0" err="1"/>
+              <a:t>ShopSchema</a:t>
+            </a:r>
+            <a:r>
+              <a:rPr lang="en-US" altLang="zh-CN" sz="2000" dirty="0"/>
+              <a:t>", "Shop/{action</a:t>
+            </a:r>
+            <a:r>
+              <a:rPr lang="en-US" altLang="zh-CN" sz="2000" dirty="0" smtClean="0"/>
+              <a:t>}", new </a:t>
+            </a:r>
+            <a:r>
+              <a:rPr lang="en-US" altLang="zh-CN" sz="2000" dirty="0"/>
+              <a:t>{ controller = "Home" });</a:t>
+            </a:r>
+            <a:endParaRPr lang="en-US" altLang="zh-CN" sz="2000" b="1" dirty="0" smtClean="0"/>
+          </a:p>
+          <a:p>
+            <a:pPr marL="0" indent="0">
+              <a:buNone/>
+            </a:pPr>
+            <a:endParaRPr lang="en-US" altLang="zh-CN" sz="2000" b="1" dirty="0" smtClean="0"/>
+          </a:p>
+          <a:p>
+            <a:pPr marL="0" indent="0">
+              <a:buNone/>
+            </a:pPr>
+            <a:endParaRPr lang="zh-CN" altLang="en-US" sz="2000" dirty="0"/>
+          </a:p>
+        </p:txBody>
+      </p:sp>
+    </p:spTree>
+    <p:extLst>
+      <p:ext uri="{BB962C8B-B14F-4D97-AF65-F5344CB8AC3E}">
+        <p14:creationId xmlns:p14="http://schemas.microsoft.com/office/powerpoint/2010/main" val="119405127"/>
+      </p:ext>
+    </p:extLst>
+  </p:cSld>
+  <p:clrMapOvr>
+    <a:masterClrMapping/>
+  </p:clrMapOvr>
+  <p:timing>
+    <p:tnLst>
+      <p:par>
+        <p:cTn id="1" dur="indefinite" restart="never" nodeType="tmRoot">
+          <p:childTnLst>
+            <p:seq concurrent="1" nextAc="seek">
+              <p:cTn id="2" dur="indefinite" nodeType="mainSeq">
+                <p:childTnLst>
+                  <p:par>
+                    <p:cTn id="3" fill="hold">
+                      <p:stCondLst>
+                        <p:cond delay="indefinite"/>
+                      </p:stCondLst>
+                      <p:childTnLst>
+                        <p:par>
+                          <p:cTn id="4" fill="hold">
+                            <p:stCondLst>
+                              <p:cond delay="0"/>
+                            </p:stCondLst>
+                            <p:childTnLst>
+                              <p:par>
+                                <p:cTn id="5" presetID="2" presetClass="entr" presetSubtype="4" fill="hold" nodeType="clickEffect">
+                                  <p:stCondLst>
+                                    <p:cond delay="0"/>
+                                  </p:stCondLst>
+                                  <p:childTnLst>
+                                    <p:set>
+                                      <p:cBhvr>
+                                        <p:cTn id="6" dur="1" fill="hold">
+                                          <p:stCondLst>
+                                            <p:cond delay="0"/>
+                                          </p:stCondLst>
+                                        </p:cTn>
+                                        <p:tgtEl>
+                                          <p:spTgt spid="3">
+                                            <p:txEl>
+                                              <p:pRg st="1" end="1"/>
+                                            </p:txEl>
+                                          </p:spTgt>
+                                        </p:tgtEl>
+                                        <p:attrNameLst>
+                                          <p:attrName>style.visibility</p:attrName>
+                                        </p:attrNameLst>
+                                      </p:cBhvr>
+                                      <p:to>
+                                        <p:strVal val="visible"/>
+                                      </p:to>
+                                    </p:set>
+                                    <p:anim calcmode="lin" valueType="num">
+                                      <p:cBhvr additive="base">
+                                        <p:cTn id="7" dur="500" fill="hold"/>
+                                        <p:tgtEl>
+                                          <p:spTgt spid="3">
+                                            <p:txEl>
+                                              <p:pRg st="1" end="1"/>
+                                            </p:txEl>
+                                          </p:spTgt>
+                                        </p:tgtEl>
+                                        <p:attrNameLst>
+                                          <p:attrName>ppt_x</p:attrName>
+                                        </p:attrNameLst>
+                                      </p:cBhvr>
+                                      <p:tavLst>
+                                        <p:tav tm="0">
+                                          <p:val>
+                                            <p:strVal val="#ppt_x"/>
+                                          </p:val>
+                                        </p:tav>
+                                        <p:tav tm="100000">
+                                          <p:val>
+                                            <p:strVal val="#ppt_x"/>
+                                          </p:val>
+                                        </p:tav>
+                                      </p:tavLst>
+                                    </p:anim>
+                                    <p:anim calcmode="lin" valueType="num">
+                                      <p:cBhvr additive="base">
+                                        <p:cTn id="8" dur="500" fill="hold"/>
+                                        <p:tgtEl>
+                                          <p:spTgt spid="3">
+                                            <p:txEl>
+                                              <p:pRg st="1" end="1"/>
+                                            </p:txEl>
+                                          </p:spTgt>
+                                        </p:tgtEl>
+                                        <p:attrNameLst>
+                                          <p:attrName>ppt_y</p:attrName>
+                                        </p:attrNameLst>
+                                      </p:cBhvr>
+                                      <p:tavLst>
+                                        <p:tav tm="0">
+                                          <p:val>
+                                            <p:strVal val="1+#ppt_h/2"/>
+                                          </p:val>
+                                        </p:tav>
+                                        <p:tav tm="100000">
+                                          <p:val>
+                                            <p:strVal val="#ppt_y"/>
+                                          </p:val>
+                                        </p:tav>
+                                      </p:tavLst>
+                                    </p:anim>
+                                  </p:childTnLst>
+                                </p:cTn>
+                              </p:par>
+                            </p:childTnLst>
+                          </p:cTn>
+                        </p:par>
+                      </p:childTnLst>
+                    </p:cTn>
+                  </p:par>
+                  <p:par>
+                    <p:cTn id="9" fill="hold">
+                      <p:stCondLst>
+                        <p:cond delay="indefinite"/>
+                      </p:stCondLst>
+                      <p:childTnLst>
+                        <p:par>
+                          <p:cTn id="10" fill="hold">
+                            <p:stCondLst>
+                              <p:cond delay="0"/>
+                            </p:stCondLst>
+                            <p:childTnLst>
+                              <p:par>
+                                <p:cTn id="11" presetID="2" presetClass="entr" presetSubtype="4" fill="hold" nodeType="clickEffect">
+                                  <p:stCondLst>
+                                    <p:cond delay="0"/>
+                                  </p:stCondLst>
+                                  <p:childTnLst>
+                                    <p:set>
+                                      <p:cBhvr>
+                                        <p:cTn id="12" dur="1" fill="hold">
+                                          <p:stCondLst>
+                                            <p:cond delay="0"/>
+                                          </p:stCondLst>
+                                        </p:cTn>
+                                        <p:tgtEl>
+                                          <p:spTgt spid="3">
+                                            <p:txEl>
+                                              <p:pRg st="2" end="2"/>
+                                            </p:txEl>
+                                          </p:spTgt>
+                                        </p:tgtEl>
+                                        <p:attrNameLst>
+                                          <p:attrName>style.visibility</p:attrName>
+                                        </p:attrNameLst>
+                                      </p:cBhvr>
+                                      <p:to>
+                                        <p:strVal val="visible"/>
+                                      </p:to>
+                                    </p:set>
+                                    <p:anim calcmode="lin" valueType="num">
+                                      <p:cBhvr additive="base">
+                                        <p:cTn id="13" dur="500" fill="hold"/>
+                                        <p:tgtEl>
+                                          <p:spTgt spid="3">
+                                            <p:txEl>
+                                              <p:pRg st="2" end="2"/>
+                                            </p:txEl>
+                                          </p:spTgt>
+                                        </p:tgtEl>
+                                        <p:attrNameLst>
+                                          <p:attrName>ppt_x</p:attrName>
+                                        </p:attrNameLst>
+                                      </p:cBhvr>
+                                      <p:tavLst>
+                                        <p:tav tm="0">
+                                          <p:val>
+                                            <p:strVal val="#ppt_x"/>
+                                          </p:val>
+                                        </p:tav>
+                                        <p:tav tm="100000">
+                                          <p:val>
+                                            <p:strVal val="#ppt_x"/>
+                                          </p:val>
+                                        </p:tav>
+                                      </p:tavLst>
+                                    </p:anim>
+                                    <p:anim calcmode="lin" valueType="num">
+                                      <p:cBhvr additive="base">
+                                        <p:cTn id="14" dur="500" fill="hold"/>
+                                        <p:tgtEl>
+                                          <p:spTgt spid="3">
+                                            <p:txEl>
+                                              <p:pRg st="2" end="2"/>
+                                            </p:txEl>
+                                          </p:spTgt>
+                                        </p:tgtEl>
+                                        <p:attrNameLst>
+                                          <p:attrName>ppt_y</p:attrName>
+                                        </p:attrNameLst>
+                                      </p:cBhvr>
+                                      <p:tavLst>
+                                        <p:tav tm="0">
+                                          <p:val>
+                                            <p:strVal val="1+#ppt_h/2"/>
+                                          </p:val>
+                                        </p:tav>
+                                        <p:tav tm="100000">
+                                          <p:val>
+                                            <p:strVal val="#ppt_y"/>
+                                          </p:val>
+                                        </p:tav>
+                                      </p:tavLst>
+                                    </p:anim>
+                                  </p:childTnLst>
+                                </p:cTn>
+                              </p:par>
+                              <p:par>
+                                <p:cTn id="15" presetID="2" presetClass="entr" presetSubtype="4" fill="hold" nodeType="withEffect">
+                                  <p:stCondLst>
+                                    <p:cond delay="0"/>
+                                  </p:stCondLst>
+                                  <p:childTnLst>
+                                    <p:set>
+                                      <p:cBhvr>
+                                        <p:cTn id="16" dur="1" fill="hold">
+                                          <p:stCondLst>
+                                            <p:cond delay="0"/>
+                                          </p:stCondLst>
+                                        </p:cTn>
+                                        <p:tgtEl>
+                                          <p:spTgt spid="3">
+                                            <p:txEl>
+                                              <p:pRg st="3" end="3"/>
+                                            </p:txEl>
+                                          </p:spTgt>
+                                        </p:tgtEl>
+                                        <p:attrNameLst>
+                                          <p:attrName>style.visibility</p:attrName>
+                                        </p:attrNameLst>
+                                      </p:cBhvr>
+                                      <p:to>
+                                        <p:strVal val="visible"/>
+                                      </p:to>
+                                    </p:set>
+                                    <p:anim calcmode="lin" valueType="num">
+                                      <p:cBhvr additive="base">
+                                        <p:cTn id="17" dur="500" fill="hold"/>
+                                        <p:tgtEl>
+                                          <p:spTgt spid="3">
+                                            <p:txEl>
+                                              <p:pRg st="3" end="3"/>
+                                            </p:txEl>
+                                          </p:spTgt>
+                                        </p:tgtEl>
+                                        <p:attrNameLst>
+                                          <p:attrName>ppt_x</p:attrName>
+                                        </p:attrNameLst>
+                                      </p:cBhvr>
+                                      <p:tavLst>
+                                        <p:tav tm="0">
+                                          <p:val>
+                                            <p:strVal val="#ppt_x"/>
+                                          </p:val>
+                                        </p:tav>
+                                        <p:tav tm="100000">
+                                          <p:val>
+                                            <p:strVal val="#ppt_x"/>
+                                          </p:val>
+                                        </p:tav>
+                                      </p:tavLst>
+                                    </p:anim>
+                                    <p:anim calcmode="lin" valueType="num">
+                                      <p:cBhvr additive="base">
+                                        <p:cTn id="18" dur="500" fill="hold"/>
+                                        <p:tgtEl>
+                                          <p:spTgt spid="3">
+                                            <p:txEl>
+                                              <p:pRg st="3" end="3"/>
+                                            </p:txEl>
+                                          </p:spTgt>
+                                        </p:tgtEl>
+                                        <p:attrNameLst>
+                                          <p:attrName>ppt_y</p:attrName>
+                                        </p:attrNameLst>
+                                      </p:cBhvr>
+                                      <p:tavLst>
+                                        <p:tav tm="0">
+                                          <p:val>
+                                            <p:strVal val="1+#ppt_h/2"/>
+                                          </p:val>
+                                        </p:tav>
+                                        <p:tav tm="100000">
+                                          <p:val>
+                                            <p:strVal val="#ppt_y"/>
+                                          </p:val>
+                                        </p:tav>
+                                      </p:tavLst>
+                                    </p:anim>
+                                  </p:childTnLst>
+                                </p:cTn>
+                              </p:par>
+                            </p:childTnLst>
+                          </p:cTn>
+                        </p:par>
+                      </p:childTnLst>
+                    </p:cTn>
+                  </p:par>
+                  <p:par>
+                    <p:cTn id="19" fill="hold">
+                      <p:stCondLst>
+                        <p:cond delay="indefinite"/>
+                      </p:stCondLst>
+                      <p:childTnLst>
+                        <p:par>
+                          <p:cTn id="20" fill="hold">
+                            <p:stCondLst>
+                              <p:cond delay="0"/>
+                            </p:stCondLst>
+                            <p:childTnLst>
+                              <p:par>
+                                <p:cTn id="21" presetID="2" presetClass="entr" presetSubtype="4" fill="hold" nodeType="clickEffect">
+                                  <p:stCondLst>
+                                    <p:cond delay="0"/>
+                                  </p:stCondLst>
+                                  <p:childTnLst>
+                                    <p:set>
+                                      <p:cBhvr>
+                                        <p:cTn id="22" dur="1" fill="hold">
+                                          <p:stCondLst>
+                                            <p:cond delay="0"/>
+                                          </p:stCondLst>
+                                        </p:cTn>
+                                        <p:tgtEl>
+                                          <p:spTgt spid="3">
+                                            <p:txEl>
+                                              <p:pRg st="4" end="4"/>
+                                            </p:txEl>
+                                          </p:spTgt>
+                                        </p:tgtEl>
+                                        <p:attrNameLst>
+                                          <p:attrName>style.visibility</p:attrName>
+                                        </p:attrNameLst>
+                                      </p:cBhvr>
+                                      <p:to>
+                                        <p:strVal val="visible"/>
+                                      </p:to>
+                                    </p:set>
+                                    <p:anim calcmode="lin" valueType="num">
+                                      <p:cBhvr additive="base">
+                                        <p:cTn id="23" dur="500" fill="hold"/>
+                                        <p:tgtEl>
+                                          <p:spTgt spid="3">
+                                            <p:txEl>
+                                              <p:pRg st="4" end="4"/>
+                                            </p:txEl>
+                                          </p:spTgt>
+                                        </p:tgtEl>
+                                        <p:attrNameLst>
+                                          <p:attrName>ppt_x</p:attrName>
+                                        </p:attrNameLst>
+                                      </p:cBhvr>
+                                      <p:tavLst>
+                                        <p:tav tm="0">
+                                          <p:val>
+                                            <p:strVal val="#ppt_x"/>
+                                          </p:val>
+                                        </p:tav>
+                                        <p:tav tm="100000">
+                                          <p:val>
+                                            <p:strVal val="#ppt_x"/>
+                                          </p:val>
+                                        </p:tav>
+                                      </p:tavLst>
+                                    </p:anim>
+                                    <p:anim calcmode="lin" valueType="num">
+                                      <p:cBhvr additive="base">
+                                        <p:cTn id="24" dur="500" fill="hold"/>
+                                        <p:tgtEl>
+                                          <p:spTgt spid="3">
+                                            <p:txEl>
+                                              <p:pRg st="4" end="4"/>
+                                            </p:txEl>
+                                          </p:spTgt>
+                                        </p:tgtEl>
+                                        <p:attrNameLst>
+                                          <p:attrName>ppt_y</p:attrName>
+                                        </p:attrNameLst>
+                                      </p:cBhvr>
+                                      <p:tavLst>
+                                        <p:tav tm="0">
+                                          <p:val>
+                                            <p:strVal val="1+#ppt_h/2"/>
+                                          </p:val>
+                                        </p:tav>
+                                        <p:tav tm="100000">
+                                          <p:val>
+                                            <p:strVal val="#ppt_y"/>
+                                          </p:val>
+                                        </p:tav>
+                                      </p:tavLst>
+                                    </p:anim>
+                                  </p:childTnLst>
+                                </p:cTn>
+                              </p:par>
+                            </p:childTnLst>
+                          </p:cTn>
+                        </p:par>
+                      </p:childTnLst>
+                    </p:cTn>
+                  </p:par>
+                  <p:par>
+                    <p:cTn id="25" fill="hold">
+                      <p:stCondLst>
+                        <p:cond delay="indefinite"/>
+                      </p:stCondLst>
+                      <p:childTnLst>
+                        <p:par>
+                          <p:cTn id="26" fill="hold">
+                            <p:stCondLst>
+                              <p:cond delay="0"/>
+                            </p:stCondLst>
+                            <p:childTnLst>
+                              <p:par>
+                                <p:cTn id="27" presetID="2" presetClass="entr" presetSubtype="4" fill="hold" nodeType="clickEffect">
+                                  <p:stCondLst>
+                                    <p:cond delay="0"/>
+                                  </p:stCondLst>
+                                  <p:childTnLst>
+                                    <p:set>
+                                      <p:cBhvr>
+                                        <p:cTn id="28" dur="1" fill="hold">
+                                          <p:stCondLst>
+                                            <p:cond delay="0"/>
+                                          </p:stCondLst>
+                                        </p:cTn>
+                                        <p:tgtEl>
+                                          <p:spTgt spid="3">
+                                            <p:txEl>
+                                              <p:pRg st="5" end="5"/>
+                                            </p:txEl>
+                                          </p:spTgt>
+                                        </p:tgtEl>
+                                        <p:attrNameLst>
+                                          <p:attrName>style.visibility</p:attrName>
+                                        </p:attrNameLst>
+                                      </p:cBhvr>
+                                      <p:to>
+                                        <p:strVal val="visible"/>
+                                      </p:to>
+                                    </p:set>
+                                    <p:anim calcmode="lin" valueType="num">
+                                      <p:cBhvr additive="base">
+                                        <p:cTn id="29" dur="500" fill="hold"/>
+                                        <p:tgtEl>
+                                          <p:spTgt spid="3">
+                                            <p:txEl>
+                                              <p:pRg st="5" end="5"/>
+                                            </p:txEl>
+                                          </p:spTgt>
+                                        </p:tgtEl>
+                                        <p:attrNameLst>
+                                          <p:attrName>ppt_x</p:attrName>
+                                        </p:attrNameLst>
+                                      </p:cBhvr>
+                                      <p:tavLst>
+                                        <p:tav tm="0">
+                                          <p:val>
+                                            <p:strVal val="#ppt_x"/>
+                                          </p:val>
+                                        </p:tav>
+                                        <p:tav tm="100000">
+                                          <p:val>
+                                            <p:strVal val="#ppt_x"/>
+                                          </p:val>
+                                        </p:tav>
+                                      </p:tavLst>
+                                    </p:anim>
+                                    <p:anim calcmode="lin" valueType="num">
+                                      <p:cBhvr additive="base">
+                                        <p:cTn id="30" dur="500" fill="hold"/>
+                                        <p:tgtEl>
+                                          <p:spTgt spid="3">
+                                            <p:txEl>
+                                              <p:pRg st="5" end="5"/>
+                                            </p:txEl>
+                                          </p:spTgt>
+                                        </p:tgtEl>
+                                        <p:attrNameLst>
+                                          <p:attrName>ppt_y</p:attrName>
+                                        </p:attrNameLst>
+                                      </p:cBhvr>
+                                      <p:tavLst>
+                                        <p:tav tm="0">
+                                          <p:val>
+                                            <p:strVal val="1+#ppt_h/2"/>
+                                          </p:val>
+                                        </p:tav>
+                                        <p:tav tm="100000">
+                                          <p:val>
+                                            <p:strVal val="#ppt_y"/>
+                                          </p:val>
+                                        </p:tav>
+                                      </p:tavLst>
+                                    </p:anim>
+                                  </p:childTnLst>
+                                </p:cTn>
+                              </p:par>
+                            </p:childTnLst>
+                          </p:cTn>
+                        </p:par>
+                      </p:childTnLst>
+                    </p:cTn>
+                  </p:par>
+                  <p:par>
+                    <p:cTn id="31" fill="hold">
+                      <p:stCondLst>
+                        <p:cond delay="indefinite"/>
+                      </p:stCondLst>
+                      <p:childTnLst>
+                        <p:par>
+                          <p:cTn id="32" fill="hold">
+                            <p:stCondLst>
+                              <p:cond delay="0"/>
+                            </p:stCondLst>
+                            <p:childTnLst>
+                              <p:par>
+                                <p:cTn id="33" presetID="2" presetClass="entr" presetSubtype="4" fill="hold" nodeType="clickEffect">
+                                  <p:stCondLst>
+                                    <p:cond delay="0"/>
+                                  </p:stCondLst>
+                                  <p:childTnLst>
+                                    <p:set>
+                                      <p:cBhvr>
+                                        <p:cTn id="34" dur="1" fill="hold">
+                                          <p:stCondLst>
+                                            <p:cond delay="0"/>
+                                          </p:stCondLst>
+                                        </p:cTn>
+                                        <p:tgtEl>
+                                          <p:spTgt spid="3">
+                                            <p:txEl>
+                                              <p:pRg st="6" end="6"/>
+                                            </p:txEl>
+                                          </p:spTgt>
+                                        </p:tgtEl>
+                                        <p:attrNameLst>
+                                          <p:attrName>style.visibility</p:attrName>
+                                        </p:attrNameLst>
+                                      </p:cBhvr>
+                                      <p:to>
+                                        <p:strVal val="visible"/>
+                                      </p:to>
+                                    </p:set>
+                                    <p:anim calcmode="lin" valueType="num">
+                                      <p:cBhvr additive="base">
+                                        <p:cTn id="35" dur="500" fill="hold"/>
+                                        <p:tgtEl>
+                                          <p:spTgt spid="3">
+                                            <p:txEl>
+                                              <p:pRg st="6" end="6"/>
+                                            </p:txEl>
+                                          </p:spTgt>
+                                        </p:tgtEl>
+                                        <p:attrNameLst>
+                                          <p:attrName>ppt_x</p:attrName>
+                                        </p:attrNameLst>
+                                      </p:cBhvr>
+                                      <p:tavLst>
+                                        <p:tav tm="0">
+                                          <p:val>
+                                            <p:strVal val="#ppt_x"/>
+                                          </p:val>
+                                        </p:tav>
+                                        <p:tav tm="100000">
+                                          <p:val>
+                                            <p:strVal val="#ppt_x"/>
+                                          </p:val>
+                                        </p:tav>
+                                      </p:tavLst>
+                                    </p:anim>
+                                    <p:anim calcmode="lin" valueType="num">
+                                      <p:cBhvr additive="base">
+                                        <p:cTn id="36" dur="500" fill="hold"/>
+                                        <p:tgtEl>
+                                          <p:spTgt spid="3">
+                                            <p:txEl>
+                                              <p:pRg st="6" end="6"/>
+                                            </p:txEl>
+                                          </p:spTgt>
+                                        </p:tgtEl>
+                                        <p:attrNameLst>
+                                          <p:attrName>ppt_y</p:attrName>
+                                        </p:attrNameLst>
+                                      </p:cBhvr>
+                                      <p:tavLst>
+                                        <p:tav tm="0">
+                                          <p:val>
+                                            <p:strVal val="1+#ppt_h/2"/>
+                                          </p:val>
+                                        </p:tav>
+                                        <p:tav tm="100000">
+                                          <p:val>
+                                            <p:strVal val="#ppt_y"/>
+                                          </p:val>
+                                        </p:tav>
+                                      </p:tavLst>
+                                    </p:anim>
+                                  </p:childTnLst>
+                                </p:cTn>
+                              </p:par>
+                            </p:childTnLst>
+                          </p:cTn>
+                        </p:par>
+                      </p:childTnLst>
+                    </p:cTn>
+                  </p:par>
+                  <p:par>
+                    <p:cTn id="37" fill="hold">
+                      <p:stCondLst>
+                        <p:cond delay="indefinite"/>
+                      </p:stCondLst>
+                      <p:childTnLst>
+                        <p:par>
+                          <p:cTn id="38" fill="hold">
+                            <p:stCondLst>
+                              <p:cond delay="0"/>
+                            </p:stCondLst>
+                            <p:childTnLst>
+                              <p:par>
+                                <p:cTn id="39" presetID="2" presetClass="entr" presetSubtype="4" fill="hold" nodeType="clickEffect">
+                                  <p:stCondLst>
+                                    <p:cond delay="0"/>
+                                  </p:stCondLst>
+                                  <p:childTnLst>
+                                    <p:set>
+                                      <p:cBhvr>
+                                        <p:cTn id="40" dur="1" fill="hold">
+                                          <p:stCondLst>
+                                            <p:cond delay="0"/>
+                                          </p:stCondLst>
+                                        </p:cTn>
+                                        <p:tgtEl>
+                                          <p:spTgt spid="3">
+                                            <p:txEl>
+                                              <p:pRg st="7" end="7"/>
+                                            </p:txEl>
+                                          </p:spTgt>
+                                        </p:tgtEl>
+                                        <p:attrNameLst>
+                                          <p:attrName>style.visibility</p:attrName>
+                                        </p:attrNameLst>
+                                      </p:cBhvr>
+                                      <p:to>
+                                        <p:strVal val="visible"/>
+                                      </p:to>
+                                    </p:set>
+                                    <p:anim calcmode="lin" valueType="num">
+                                      <p:cBhvr additive="base">
+                                        <p:cTn id="41" dur="500" fill="hold"/>
+                                        <p:tgtEl>
+                                          <p:spTgt spid="3">
+                                            <p:txEl>
+                                              <p:pRg st="7" end="7"/>
+                                            </p:txEl>
+                                          </p:spTgt>
+                                        </p:tgtEl>
+                                        <p:attrNameLst>
+                                          <p:attrName>ppt_x</p:attrName>
+                                        </p:attrNameLst>
+                                      </p:cBhvr>
+                                      <p:tavLst>
+                                        <p:tav tm="0">
+                                          <p:val>
+                                            <p:strVal val="#ppt_x"/>
+                                          </p:val>
+                                        </p:tav>
+                                        <p:tav tm="100000">
+                                          <p:val>
+                                            <p:strVal val="#ppt_x"/>
+                                          </p:val>
+                                        </p:tav>
+                                      </p:tavLst>
+                                    </p:anim>
+                                    <p:anim calcmode="lin" valueType="num">
+                                      <p:cBhvr additive="base">
+                                        <p:cTn id="42" dur="500" fill="hold"/>
+                                        <p:tgtEl>
+                                          <p:spTgt spid="3">
+                                            <p:txEl>
+                                              <p:pRg st="7" end="7"/>
+                                            </p:txEl>
+                                          </p:spTgt>
+                                        </p:tgtEl>
+                                        <p:attrNameLst>
+                                          <p:attrName>ppt_y</p:attrName>
+                                        </p:attrNameLst>
+                                      </p:cBhvr>
+                                      <p:tavLst>
+                                        <p:tav tm="0">
+                                          <p:val>
+                                            <p:strVal val="1+#ppt_h/2"/>
+                                          </p:val>
+                                        </p:tav>
+                                        <p:tav tm="100000">
+                                          <p:val>
+                                            <p:strVal val="#ppt_y"/>
+                                          </p:val>
+                                        </p:tav>
+                                      </p:tavLst>
+                                    </p:anim>
+                                  </p:childTnLst>
+                                </p:cTn>
+                              </p:par>
+                            </p:childTnLst>
+                          </p:cTn>
+                        </p:par>
+                      </p:childTnLst>
+                    </p:cTn>
+                  </p:par>
+                </p:childTnLst>
+              </p:cTn>
+              <p:prevCondLst>
+                <p:cond evt="onPrev" delay="0">
+                  <p:tgtEl>
+                    <p:sldTgt/>
+                  </p:tgtEl>
+                </p:cond>
+              </p:prevCondLst>
+              <p:nextCondLst>
+                <p:cond evt="onNext" delay="0">
+                  <p:tgtEl>
+                    <p:sldTgt/>
+                  </p:tgtEl>
+                </p:cond>
+              </p:nextCondLst>
+            </p:seq>
+          </p:childTnLst>
+        </p:cTn>
+      </p:par>
+    </p:tnLst>
+  </p:timing>
+</p:sld>
+</file>
+
+<file path=ppt/slides/slide7.xml><?xml version="1.0" encoding="utf-8"?>
+<p:sld xmlns:a="http://schemas.openxmlformats.org/drawingml/2006/main" xmlns:r="http://schemas.openxmlformats.org/officeDocument/2006/relationships" xmlns:p="http://schemas.openxmlformats.org/presentationml/2006/main">
+  <p:cSld>
+    <p:spTree>
+      <p:nvGrpSpPr>
+        <p:cNvPr id="1" name=""/>
+        <p:cNvGrpSpPr/>
+        <p:nvPr/>
+      </p:nvGrpSpPr>
+      <p:grpSpPr>
+        <a:xfrm>
+          <a:off x="0" y="0"/>
+          <a:ext cx="0" cy="0"/>
+          <a:chOff x="0" y="0"/>
+          <a:chExt cx="0" cy="0"/>
+        </a:xfrm>
+      </p:grpSpPr>
+      <p:sp>
+        <p:nvSpPr>
+          <p:cNvPr id="2" name="Title 1"/>
+          <p:cNvSpPr>
+            <a:spLocks noGrp="1"/>
+          </p:cNvSpPr>
+          <p:nvPr>
+            <p:ph type="title"/>
+          </p:nvPr>
+        </p:nvSpPr>
+        <p:spPr/>
+        <p:txBody>
+          <a:bodyPr/>
+          <a:lstStyle/>
+          <a:p>
+            <a:r>
+              <a:rPr lang="en-US" altLang="zh-CN" dirty="0" smtClean="0"/>
+              <a:t>URL Routing</a:t>
+            </a:r>
+            <a:endParaRPr lang="zh-CN" altLang="en-US" dirty="0"/>
+          </a:p>
+        </p:txBody>
+      </p:sp>
+      <p:sp>
+        <p:nvSpPr>
+          <p:cNvPr id="3" name="Content Placeholder 2"/>
+          <p:cNvSpPr>
+            <a:spLocks noGrp="1"/>
+          </p:cNvSpPr>
+          <p:nvPr>
+            <p:ph idx="1"/>
+          </p:nvPr>
+        </p:nvSpPr>
+        <p:spPr/>
+        <p:txBody>
+          <a:bodyPr>
+            <a:normAutofit fontScale="92500" lnSpcReduction="20000"/>
+          </a:bodyPr>
+          <a:lstStyle/>
+          <a:p>
+            <a:r>
+              <a:rPr lang="en-US" altLang="zh-CN" dirty="0" err="1" smtClean="0"/>
+              <a:t>Constrianing</a:t>
+            </a:r>
+            <a:r>
+              <a:rPr lang="en-US" altLang="zh-CN" dirty="0" smtClean="0"/>
+              <a:t> Routes</a:t>
+            </a:r>
+          </a:p>
+          <a:p>
+            <a:pPr marL="457200" indent="-457200">
+              <a:buFont typeface="+mj-lt"/>
+              <a:buAutoNum type="arabicPeriod"/>
+            </a:pPr>
+            <a:r>
+              <a:rPr lang="en-US" altLang="zh-CN" sz="2000" dirty="0" err="1" smtClean="0"/>
+              <a:t>Constrianing</a:t>
+            </a:r>
+            <a:r>
+              <a:rPr lang="en-US" altLang="zh-CN" sz="2000" dirty="0" smtClean="0"/>
+              <a:t> a Route Using a </a:t>
+            </a:r>
+            <a:r>
+              <a:rPr lang="en-US" altLang="zh-CN" sz="2000" dirty="0" err="1" smtClean="0"/>
+              <a:t>Regrular</a:t>
+            </a:r>
+            <a:r>
+              <a:rPr lang="en-US" altLang="zh-CN" sz="2000" dirty="0" smtClean="0"/>
+              <a:t> Expression</a:t>
+            </a:r>
+          </a:p>
+          <a:p>
+            <a:pPr marL="457200" lvl="1" indent="0">
+              <a:buNone/>
+            </a:pPr>
+            <a:r>
+              <a:rPr lang="en-US" altLang="zh-CN" sz="1600" dirty="0" err="1" smtClean="0"/>
+              <a:t>routes.MapRoute</a:t>
+            </a:r>
+            <a:r>
+              <a:rPr lang="en-US" altLang="zh-CN" sz="1600" dirty="0"/>
+              <a:t>("</a:t>
+            </a:r>
+            <a:r>
+              <a:rPr lang="en-US" altLang="zh-CN" sz="1600" dirty="0" err="1"/>
+              <a:t>MyRoute</a:t>
+            </a:r>
+            <a:r>
+              <a:rPr lang="en-US" altLang="zh-CN" sz="1600" dirty="0"/>
+              <a:t>", "{controller}/{action}/{id}/{*catchall}",</a:t>
+            </a:r>
+          </a:p>
+          <a:p>
+            <a:pPr marL="457200" lvl="1" indent="0">
+              <a:buNone/>
+            </a:pPr>
+            <a:r>
+              <a:rPr lang="en-US" altLang="zh-CN" sz="1600" dirty="0"/>
+              <a:t>new { controller = "Home", action = "Index", id = </a:t>
+            </a:r>
+            <a:r>
+              <a:rPr lang="en-US" altLang="zh-CN" sz="1600" dirty="0" err="1"/>
+              <a:t>UrlParameter.Optional</a:t>
+            </a:r>
+            <a:r>
+              <a:rPr lang="en-US" altLang="zh-CN" sz="1600" dirty="0"/>
+              <a:t> },</a:t>
+            </a:r>
+          </a:p>
+          <a:p>
+            <a:pPr marL="457200" lvl="1" indent="0">
+              <a:buNone/>
+            </a:pPr>
+            <a:r>
+              <a:rPr lang="en-US" altLang="zh-CN" sz="1600" b="1" dirty="0"/>
+              <a:t>new { controller = "^H</a:t>
+            </a:r>
+            <a:r>
+              <a:rPr lang="en-US" altLang="zh-CN" sz="1600" b="1" dirty="0" smtClean="0"/>
+              <a:t>.*"}</a:t>
+            </a:r>
+            <a:r>
+              <a:rPr lang="en-US" altLang="zh-CN" sz="1600" dirty="0" smtClean="0"/>
+              <a:t>);</a:t>
+            </a:r>
+            <a:endParaRPr lang="en-US" altLang="zh-CN" sz="1600" dirty="0"/>
+          </a:p>
+          <a:p>
+            <a:pPr marL="457200" lvl="1" indent="0">
+              <a:buNone/>
+            </a:pPr>
+            <a:endParaRPr lang="en-US" altLang="zh-CN" sz="1600" dirty="0" smtClean="0"/>
+          </a:p>
+          <a:p>
+            <a:pPr marL="457200" indent="-457200">
+              <a:buFont typeface="+mj-lt"/>
+              <a:buAutoNum type="arabicPeriod"/>
+            </a:pPr>
+            <a:r>
+              <a:rPr lang="en-US" altLang="zh-CN" sz="2000" dirty="0"/>
+              <a:t>Constraining a Route to a Set of Specific </a:t>
+            </a:r>
+            <a:r>
+              <a:rPr lang="en-US" altLang="zh-CN" sz="2000" dirty="0" smtClean="0"/>
+              <a:t>Values</a:t>
+            </a:r>
+          </a:p>
+          <a:p>
+            <a:pPr marL="457200" lvl="1" indent="0">
+              <a:buNone/>
+            </a:pPr>
+            <a:r>
+              <a:rPr lang="en-US" altLang="zh-CN" sz="1600" dirty="0" err="1" smtClean="0"/>
+              <a:t>routes.MapRoute</a:t>
+            </a:r>
+            <a:r>
+              <a:rPr lang="en-US" altLang="zh-CN" sz="1600" dirty="0"/>
+              <a:t>("</a:t>
+            </a:r>
+            <a:r>
+              <a:rPr lang="en-US" altLang="zh-CN" sz="1600" dirty="0" err="1"/>
+              <a:t>MyRoute</a:t>
+            </a:r>
+            <a:r>
+              <a:rPr lang="en-US" altLang="zh-CN" sz="1600" dirty="0"/>
+              <a:t>", "{controller}/{action}/{id}/{*catchall}",</a:t>
+            </a:r>
+          </a:p>
+          <a:p>
+            <a:pPr marL="457200" lvl="1" indent="0">
+              <a:buNone/>
+            </a:pPr>
+            <a:r>
+              <a:rPr lang="en-US" altLang="zh-CN" sz="1600" dirty="0"/>
+              <a:t>new { controller = "Home", action = "Index", id = </a:t>
+            </a:r>
+            <a:r>
+              <a:rPr lang="en-US" altLang="zh-CN" sz="1600" dirty="0" err="1"/>
+              <a:t>UrlParameter.Optional</a:t>
+            </a:r>
+            <a:r>
+              <a:rPr lang="en-US" altLang="zh-CN" sz="1600" dirty="0"/>
+              <a:t> },</a:t>
+            </a:r>
+          </a:p>
+          <a:p>
+            <a:pPr marL="457200" lvl="1" indent="0">
+              <a:buNone/>
+            </a:pPr>
+            <a:r>
+              <a:rPr lang="en-US" altLang="zh-CN" sz="1600" b="1" dirty="0"/>
+              <a:t>new { controller = "^H.*", action </a:t>
+            </a:r>
+            <a:r>
+              <a:rPr lang="en-US" altLang="zh-CN" sz="1600" b="1" dirty="0" smtClean="0"/>
+              <a:t>= "^Index$|^About</a:t>
+            </a:r>
+            <a:r>
+              <a:rPr lang="en-US" altLang="zh-CN" sz="1600" b="1" dirty="0" smtClean="0"/>
+              <a:t>$"}</a:t>
+            </a:r>
+            <a:r>
+              <a:rPr lang="en-US" altLang="zh-CN" sz="1600" dirty="0" smtClean="0"/>
+              <a:t>);</a:t>
+            </a:r>
+            <a:endParaRPr lang="en-US" altLang="zh-CN" sz="1600" dirty="0"/>
+          </a:p>
+          <a:p>
+            <a:pPr marL="457200" lvl="1" indent="0">
+              <a:buNone/>
+            </a:pPr>
+            <a:endParaRPr lang="en-US" altLang="zh-CN" sz="1600" dirty="0" smtClean="0"/>
+          </a:p>
+          <a:p>
+            <a:pPr marL="457200" indent="-457200">
+              <a:buFont typeface="+mj-lt"/>
+              <a:buAutoNum type="arabicPeriod"/>
+            </a:pPr>
+            <a:r>
+              <a:rPr lang="en-US" altLang="zh-CN" sz="2000" dirty="0"/>
+              <a:t>Constraining a Route Using HTTP </a:t>
+            </a:r>
+            <a:r>
+              <a:rPr lang="en-US" altLang="zh-CN" sz="2000" dirty="0" smtClean="0"/>
+              <a:t>Methods</a:t>
+            </a:r>
+          </a:p>
+          <a:p>
+            <a:pPr marL="457200" lvl="1" indent="0">
+              <a:buNone/>
+            </a:pPr>
+            <a:r>
+              <a:rPr lang="en-US" altLang="zh-CN" sz="1600" dirty="0" err="1" smtClean="0"/>
+              <a:t>routes.MapRoute</a:t>
+            </a:r>
+            <a:r>
+              <a:rPr lang="en-US" altLang="zh-CN" sz="1600" dirty="0" smtClean="0"/>
+              <a:t>("</a:t>
+            </a:r>
+            <a:r>
+              <a:rPr lang="en-US" altLang="zh-CN" sz="1600" dirty="0" err="1" smtClean="0"/>
+              <a:t>MyRoute</a:t>
+            </a:r>
+            <a:r>
+              <a:rPr lang="en-US" altLang="zh-CN" sz="1600" dirty="0" smtClean="0"/>
+              <a:t>", "{controller}/{action}/{id}/{*catchall}",</a:t>
+            </a:r>
+          </a:p>
+          <a:p>
+            <a:pPr marL="457200" lvl="1" indent="0">
+              <a:buNone/>
+            </a:pPr>
+            <a:r>
+              <a:rPr lang="en-US" altLang="zh-CN" sz="1600" dirty="0" smtClean="0"/>
+              <a:t>new { controller = "Home", action = "Index", id = </a:t>
+            </a:r>
+            <a:r>
+              <a:rPr lang="en-US" altLang="zh-CN" sz="1600" dirty="0" err="1" smtClean="0"/>
+              <a:t>UrlParameter.Optional</a:t>
+            </a:r>
+            <a:r>
+              <a:rPr lang="en-US" altLang="zh-CN" sz="1600" dirty="0" smtClean="0"/>
+              <a:t> },</a:t>
+            </a:r>
+          </a:p>
+          <a:p>
+            <a:pPr marL="457200" lvl="1" indent="0">
+              <a:buNone/>
+            </a:pPr>
+            <a:r>
+              <a:rPr lang="en-US" altLang="zh-CN" sz="1600" b="1" dirty="0" smtClean="0"/>
+              <a:t>new { controller = "^H.*", action = "</a:t>
+            </a:r>
+            <a:r>
+              <a:rPr lang="en-US" altLang="zh-CN" sz="1600" b="1" dirty="0" err="1" smtClean="0"/>
+              <a:t>Index|About</a:t>
+            </a:r>
+            <a:r>
+              <a:rPr lang="en-US" altLang="zh-CN" sz="1600" b="1" dirty="0" smtClean="0"/>
+              <a:t>", </a:t>
+            </a:r>
+            <a:r>
+              <a:rPr lang="en-US" altLang="zh-CN" sz="1600" b="1" dirty="0" err="1" smtClean="0"/>
+              <a:t>httpMethod</a:t>
+            </a:r>
+            <a:r>
+              <a:rPr lang="en-US" altLang="zh-CN" sz="1600" b="1" dirty="0" smtClean="0"/>
+              <a:t> = new </a:t>
+            </a:r>
+            <a:r>
+              <a:rPr lang="en-US" altLang="zh-CN" sz="1600" b="1" dirty="0" err="1" smtClean="0"/>
+              <a:t>HttpMethodConstraint</a:t>
+            </a:r>
+            <a:r>
+              <a:rPr lang="en-US" altLang="zh-CN" sz="1600" b="1" dirty="0" smtClean="0"/>
+              <a:t>("GET") }</a:t>
+            </a:r>
+            <a:r>
+              <a:rPr lang="en-US" altLang="zh-CN" sz="1600" dirty="0" smtClean="0"/>
+              <a:t>);</a:t>
+            </a:r>
+          </a:p>
+          <a:p>
+            <a:pPr marL="457200" indent="-457200">
+              <a:buFont typeface="+mj-lt"/>
+              <a:buAutoNum type="arabicPeriod"/>
+            </a:pPr>
+            <a:r>
+              <a:rPr lang="en-US" altLang="zh-CN" sz="2000" dirty="0" smtClean="0"/>
+              <a:t>Defining a Custom Constraint by implementing </a:t>
+            </a:r>
+            <a:r>
+              <a:rPr lang="en-US" altLang="zh-CN" sz="2000" b="1" dirty="0" err="1"/>
+              <a:t>IRouteConstraint</a:t>
+            </a:r>
+            <a:endParaRPr lang="en-US" altLang="zh-CN" sz="2000" dirty="0" smtClean="0"/>
+          </a:p>
+          <a:p>
+            <a:pPr marL="457200" indent="-457200">
+              <a:buFont typeface="+mj-lt"/>
+              <a:buAutoNum type="arabicPeriod"/>
+            </a:pPr>
+            <a:endParaRPr lang="zh-CN" altLang="en-US" sz="2000" dirty="0"/>
+          </a:p>
+        </p:txBody>
+      </p:sp>
+    </p:spTree>
+    <p:extLst>
+      <p:ext uri="{BB962C8B-B14F-4D97-AF65-F5344CB8AC3E}">
+        <p14:creationId xmlns:p14="http://schemas.microsoft.com/office/powerpoint/2010/main" val="2510761635"/>
+      </p:ext>
+    </p:extLst>
+  </p:cSld>
+  <p:clrMapOvr>
+    <a:masterClrMapping/>
+  </p:clrMapOvr>
+  <p:timing>
+    <p:tnLst>
+      <p:par>
+        <p:cTn id="1" dur="indefinite" restart="never" nodeType="tmRoot"/>
+      </p:par>
+    </p:tnLst>
+  </p:timing>
+</p:sld>
+</file>
+
+<file path=ppt/slides/slide8.xml><?xml version="1.0" encoding="utf-8"?>
+<p:sld xmlns:a="http://schemas.openxmlformats.org/drawingml/2006/main" xmlns:r="http://schemas.openxmlformats.org/officeDocument/2006/relationships" xmlns:p="http://schemas.openxmlformats.org/presentationml/2006/main">
+  <p:cSld>
+    <p:spTree>
+      <p:nvGrpSpPr>
+        <p:cNvPr id="1" name=""/>
+        <p:cNvGrpSpPr/>
+        <p:nvPr/>
+      </p:nvGrpSpPr>
+      <p:grpSpPr>
+        <a:xfrm>
+          <a:off x="0" y="0"/>
+          <a:ext cx="0" cy="0"/>
+          <a:chOff x="0" y="0"/>
+          <a:chExt cx="0" cy="0"/>
+        </a:xfrm>
+      </p:grpSpPr>
+      <p:sp>
+        <p:nvSpPr>
+          <p:cNvPr id="2" name="Title 1"/>
+          <p:cNvSpPr>
+            <a:spLocks noGrp="1"/>
+          </p:cNvSpPr>
+          <p:nvPr>
+            <p:ph type="title"/>
+          </p:nvPr>
+        </p:nvSpPr>
+        <p:spPr/>
+        <p:txBody>
+          <a:bodyPr/>
+          <a:lstStyle/>
+          <a:p>
+            <a:r>
+              <a:rPr lang="en-US" altLang="zh-CN" dirty="0"/>
+              <a:t>URL Routing</a:t>
+            </a:r>
+            <a:endParaRPr lang="zh-CN" altLang="en-US" dirty="0"/>
+          </a:p>
+        </p:txBody>
+      </p:sp>
+      <p:sp>
+        <p:nvSpPr>
+          <p:cNvPr id="3" name="Content Placeholder 2"/>
+          <p:cNvSpPr>
+            <a:spLocks noGrp="1"/>
+          </p:cNvSpPr>
+          <p:nvPr>
+            <p:ph idx="1"/>
+          </p:nvPr>
+        </p:nvSpPr>
+        <p:spPr/>
+        <p:txBody>
+          <a:bodyPr>
+            <a:normAutofit/>
+          </a:bodyPr>
+          <a:lstStyle/>
+          <a:p>
+            <a:r>
+              <a:rPr lang="en-US" altLang="zh-CN" dirty="0" smtClean="0"/>
+              <a:t>Generating Outgoing URL in Views</a:t>
+            </a:r>
+          </a:p>
+          <a:p>
+            <a:pPr marL="0" indent="0">
+              <a:buNone/>
+            </a:pPr>
+            <a:r>
+              <a:rPr lang="en-US" altLang="zh-CN" sz="2400" dirty="0" smtClean="0"/>
+              <a:t>Using the Routing System to Generate an Outgoing URL</a:t>
+            </a:r>
+          </a:p>
+          <a:p>
+            <a:pPr marL="0" indent="0">
+              <a:buNone/>
+            </a:pPr>
+            <a:r>
+              <a:rPr lang="en-US" altLang="zh-CN" sz="2000" dirty="0" smtClean="0"/>
+              <a:t>@</a:t>
+            </a:r>
+            <a:r>
+              <a:rPr lang="en-US" altLang="zh-CN" sz="2000" dirty="0" err="1" smtClean="0"/>
+              <a:t>Html.ActionLink</a:t>
+            </a:r>
+            <a:r>
+              <a:rPr lang="en-US" altLang="zh-CN" sz="2000" dirty="0" smtClean="0"/>
+              <a:t>("Create New", "Create") based on based on the current routing configuration</a:t>
+            </a:r>
+          </a:p>
+          <a:p>
+            <a:pPr marL="0" indent="0">
+              <a:buNone/>
+            </a:pPr>
+            <a:r>
+              <a:rPr lang="en-US" altLang="zh-CN" sz="2000" dirty="0" smtClean="0"/>
+              <a:t>&lt;a </a:t>
+            </a:r>
+            <a:r>
+              <a:rPr lang="en-US" altLang="zh-CN" sz="2000" dirty="0" err="1" smtClean="0"/>
+              <a:t>href</a:t>
+            </a:r>
+            <a:r>
+              <a:rPr lang="en-US" altLang="zh-CN" sz="2000" dirty="0" smtClean="0"/>
+              <a:t>="/Product/Create"&gt;Create New&lt;/a&gt;</a:t>
+            </a:r>
+          </a:p>
+          <a:p>
+            <a:pPr marL="0" indent="0">
+              <a:buNone/>
+            </a:pPr>
+            <a:r>
+              <a:rPr lang="en-US" altLang="zh-CN" sz="2400" dirty="0" smtClean="0"/>
+              <a:t>Targeting </a:t>
+            </a:r>
+            <a:r>
+              <a:rPr lang="en-US" altLang="zh-CN" sz="2400" dirty="0"/>
+              <a:t>Other </a:t>
+            </a:r>
+            <a:r>
+              <a:rPr lang="en-US" altLang="zh-CN" sz="2400" dirty="0" smtClean="0"/>
+              <a:t>Controllers</a:t>
+            </a:r>
+          </a:p>
+          <a:p>
+            <a:pPr marL="0" indent="0">
+              <a:buNone/>
+            </a:pPr>
+            <a:r>
+              <a:rPr lang="en-US" altLang="zh-CN" sz="2000" dirty="0"/>
+              <a:t> @</a:t>
+            </a:r>
+            <a:r>
+              <a:rPr lang="en-US" altLang="zh-CN" sz="2000" dirty="0" err="1"/>
+              <a:t>Html.ActionLink</a:t>
+            </a:r>
+            <a:r>
+              <a:rPr lang="en-US" altLang="zh-CN" sz="2000" dirty="0"/>
+              <a:t>("Target other controller - return to Home/Contact", "Contact", "Home</a:t>
+            </a:r>
+            <a:r>
+              <a:rPr lang="en-US" altLang="zh-CN" sz="2000" dirty="0" smtClean="0"/>
+              <a:t>")</a:t>
+            </a:r>
+          </a:p>
+          <a:p>
+            <a:pPr marL="0" indent="0">
+              <a:buNone/>
+            </a:pPr>
+            <a:r>
+              <a:rPr lang="en-US" altLang="zh-CN" sz="2400" dirty="0"/>
+              <a:t>Passing Extra Values</a:t>
+            </a:r>
+          </a:p>
+          <a:p>
+            <a:pPr marL="0" indent="0">
+              <a:buNone/>
+            </a:pPr>
+            <a:r>
+              <a:rPr lang="en-US" altLang="zh-CN" sz="2000" dirty="0"/>
+              <a:t>@</a:t>
+            </a:r>
+            <a:r>
+              <a:rPr lang="en-US" altLang="zh-CN" sz="2000" dirty="0" err="1" smtClean="0"/>
+              <a:t>Html.ActionLink</a:t>
+            </a:r>
+            <a:r>
+              <a:rPr lang="en-US" altLang="zh-CN" sz="2000" dirty="0"/>
+              <a:t>("Edit", "Edit", new { id=</a:t>
+            </a:r>
+            <a:r>
+              <a:rPr lang="en-US" altLang="zh-CN" sz="2000" dirty="0" err="1"/>
+              <a:t>item.ProductID</a:t>
+            </a:r>
+            <a:r>
+              <a:rPr lang="en-US" altLang="zh-CN" sz="2000" dirty="0"/>
+              <a:t> </a:t>
+            </a:r>
+            <a:r>
+              <a:rPr lang="en-US" altLang="zh-CN" sz="2000" dirty="0" smtClean="0"/>
+              <a:t>})</a:t>
+            </a:r>
+          </a:p>
+          <a:p>
+            <a:pPr marL="0" indent="0">
+              <a:buNone/>
+            </a:pPr>
+            <a:r>
+              <a:rPr lang="en-US" altLang="zh-CN" sz="2000" dirty="0"/>
+              <a:t>&lt;a </a:t>
+            </a:r>
+            <a:r>
+              <a:rPr lang="en-US" altLang="zh-CN" sz="2000" dirty="0" err="1"/>
+              <a:t>href</a:t>
+            </a:r>
+            <a:r>
+              <a:rPr lang="en-US" altLang="zh-CN" sz="2000" dirty="0"/>
+              <a:t>="/Product/Edit/1"&gt;Edit&lt;/a&gt;</a:t>
+            </a:r>
+          </a:p>
+        </p:txBody>
+      </p:sp>
+    </p:spTree>
+    <p:extLst>
+      <p:ext uri="{BB962C8B-B14F-4D97-AF65-F5344CB8AC3E}">
+        <p14:creationId xmlns:p14="http://schemas.microsoft.com/office/powerpoint/2010/main" val="3757410692"/>
+      </p:ext>
+    </p:extLst>
+  </p:cSld>
+  <p:clrMapOvr>
+    <a:masterClrMapping/>
+  </p:clrMapOvr>
+</p:sld>
+</file>
+
+<file path=ppt/slides/slide9.xml><?xml version="1.0" encoding="utf-8"?>
+<p:sld xmlns:a="http://schemas.openxmlformats.org/drawingml/2006/main" xmlns:r="http://schemas.openxmlformats.org/officeDocument/2006/relationships" xmlns:p="http://schemas.openxmlformats.org/presentationml/2006/main">
+  <p:cSld>
+    <p:spTree>
+      <p:nvGrpSpPr>
+        <p:cNvPr id="1" name=""/>
+        <p:cNvGrpSpPr/>
+        <p:nvPr/>
+      </p:nvGrpSpPr>
+      <p:grpSpPr>
+        <a:xfrm>
+          <a:off x="0" y="0"/>
+          <a:ext cx="0" cy="0"/>
+          <a:chOff x="0" y="0"/>
+          <a:chExt cx="0" cy="0"/>
+        </a:xfrm>
+      </p:grpSpPr>
+      <p:sp>
+        <p:nvSpPr>
+          <p:cNvPr id="2" name="Title 1"/>
+          <p:cNvSpPr>
+            <a:spLocks noGrp="1"/>
+          </p:cNvSpPr>
+          <p:nvPr>
+            <p:ph type="title"/>
+          </p:nvPr>
+        </p:nvSpPr>
+        <p:spPr/>
+        <p:txBody>
+          <a:bodyPr/>
+          <a:lstStyle/>
+          <a:p>
+            <a:r>
+              <a:rPr lang="en-US" altLang="zh-CN" dirty="0"/>
+              <a:t>URL Routing</a:t>
+            </a:r>
+            <a:endParaRPr lang="zh-CN" altLang="en-US" dirty="0"/>
+          </a:p>
+        </p:txBody>
+      </p:sp>
+      <p:sp>
+        <p:nvSpPr>
+          <p:cNvPr id="3" name="Content Placeholder 2"/>
+          <p:cNvSpPr>
+            <a:spLocks noGrp="1"/>
+          </p:cNvSpPr>
+          <p:nvPr>
+            <p:ph idx="1"/>
+          </p:nvPr>
+        </p:nvSpPr>
+        <p:spPr/>
+        <p:txBody>
+          <a:bodyPr>
+            <a:normAutofit/>
+          </a:bodyPr>
+          <a:lstStyle/>
+          <a:p>
+            <a:pPr marL="0" indent="0">
+              <a:buNone/>
+            </a:pPr>
+            <a:r>
+              <a:rPr lang="en-US" altLang="zh-CN" sz="2400" b="1" dirty="0" smtClean="0"/>
+              <a:t>Specifying HTML Attributes</a:t>
+            </a:r>
+          </a:p>
+          <a:p>
+            <a:pPr marL="0" indent="0">
+              <a:buNone/>
+            </a:pPr>
+            <a:r>
+              <a:rPr lang="en-US" altLang="zh-CN" sz="2400" dirty="0"/>
+              <a:t>@</a:t>
+            </a:r>
+            <a:r>
+              <a:rPr lang="en-US" altLang="zh-CN" sz="2400" dirty="0" err="1"/>
+              <a:t>Html.ActionLink</a:t>
+            </a:r>
+            <a:r>
+              <a:rPr lang="en-US" altLang="zh-CN" sz="2400" dirty="0"/>
+              <a:t>("Edit", "Edit", new { id = </a:t>
+            </a:r>
+            <a:r>
+              <a:rPr lang="en-US" altLang="zh-CN" sz="2400" dirty="0" err="1"/>
+              <a:t>item.ProductID</a:t>
+            </a:r>
+            <a:r>
+              <a:rPr lang="en-US" altLang="zh-CN" sz="2400" dirty="0"/>
+              <a:t> }, new { id="</a:t>
+            </a:r>
+            <a:r>
+              <a:rPr lang="en-US" altLang="zh-CN" sz="2400" dirty="0" err="1"/>
+              <a:t>anchorID</a:t>
+            </a:r>
+            <a:r>
+              <a:rPr lang="en-US" altLang="zh-CN" sz="2400" dirty="0"/>
+              <a:t>"+ </a:t>
+            </a:r>
+            <a:r>
+              <a:rPr lang="en-US" altLang="zh-CN" sz="2400" dirty="0" err="1"/>
+              <a:t>item.ProductID</a:t>
+            </a:r>
+            <a:r>
+              <a:rPr lang="en-US" altLang="zh-CN" sz="2400" dirty="0"/>
+              <a:t>, style = "</a:t>
+            </a:r>
+            <a:r>
+              <a:rPr lang="en-US" altLang="zh-CN" sz="2400" dirty="0" err="1"/>
+              <a:t>background-color:red</a:t>
+            </a:r>
+            <a:r>
+              <a:rPr lang="en-US" altLang="zh-CN" sz="2400" dirty="0"/>
+              <a:t>;" </a:t>
+            </a:r>
+            <a:r>
+              <a:rPr lang="en-US" altLang="zh-CN" sz="2400" dirty="0" smtClean="0"/>
+              <a:t>})</a:t>
+            </a:r>
+          </a:p>
+          <a:p>
+            <a:pPr marL="0" indent="0">
+              <a:buNone/>
+            </a:pPr>
+            <a:endParaRPr lang="zh-CN" altLang="en-US" sz="2400" dirty="0"/>
+          </a:p>
+        </p:txBody>
+      </p:sp>
+      <p:pic>
+        <p:nvPicPr>
+          <p:cNvPr id="4" name="Picture 3"/>
+          <p:cNvPicPr>
+            <a:picLocks noChangeAspect="1"/>
+          </p:cNvPicPr>
+          <p:nvPr/>
+        </p:nvPicPr>
+        <p:blipFill>
+          <a:blip r:embed="rId2"/>
+          <a:stretch>
+            <a:fillRect/>
+          </a:stretch>
+        </p:blipFill>
+        <p:spPr>
+          <a:xfrm>
+            <a:off x="838200" y="3177325"/>
+            <a:ext cx="7296150" cy="2667000"/>
+          </a:xfrm>
+          <a:prstGeom prst="rect">
+            <a:avLst/>
+          </a:prstGeom>
+        </p:spPr>
+      </p:pic>
+    </p:spTree>
+    <p:extLst>
+      <p:ext uri="{BB962C8B-B14F-4D97-AF65-F5344CB8AC3E}">
+        <p14:creationId xmlns:p14="http://schemas.microsoft.com/office/powerpoint/2010/main" val="880257457"/>
       </p:ext>
     </p:extLst>
   </p:cSld>
@@ -3658,7 +7860,7 @@
   <a:extraClrSchemeLst/>
   <a:extLst>
     <a:ext uri="{05A4C25C-085E-4340-85A3-A5531E510DB2}">
-      <thm15:themeFamily xmlns:thm15="http://schemas.microsoft.com/office/thememl/2012/main" xmlns="" name="Office Theme" id="{62F939B6-93AF-4DB8-9C6B-D6C7DFDC589F}" vid="{4A3C46E8-61CC-4603-A589-7422A47A8E4A}"/>
+      <thm15:themeFamily xmlns:thm15="http://schemas.microsoft.com/office/thememl/2012/main" name="Office Theme" id="{62F939B6-93AF-4DB8-9C6B-D6C7DFDC589F}" vid="{4A3C46E8-61CC-4603-A589-7422A47A8E4A}"/>
     </a:ext>
   </a:extLst>
 </a:theme>

</xml_diff>

<commit_message>
tech talk about asp.net mvc
</commit_message>
<xml_diff>
--- a/BasicMVCNorthwind/Asp.Net MVC Tech Talk.pptx
+++ b/BasicMVCNorthwind/Asp.Net MVC Tech Talk.pptx
@@ -23,6 +23,8 @@
     <p:sldId id="271" r:id="rId17"/>
     <p:sldId id="273" r:id="rId18"/>
     <p:sldId id="272" r:id="rId19"/>
+    <p:sldId id="274" r:id="rId20"/>
+    <p:sldId id="275" r:id="rId21"/>
   </p:sldIdLst>
   <p:sldSz cx="12192000" cy="6858000"/>
   <p:notesSz cx="6858000" cy="9144000"/>
@@ -123,7 +125,7 @@
   </p:defaultTextStyle>
   <p:extLst>
     <p:ext uri="{EFAFB233-063F-42B5-8137-9DF3F51BA10A}">
-      <p15:sldGuideLst xmlns:p15="http://schemas.microsoft.com/office/powerpoint/2012/main">
+      <p15:sldGuideLst xmlns:p15="http://schemas.microsoft.com/office/powerpoint/2012/main" xmlns="">
         <p15:guide id="1" orient="horz" pos="2160">
           <p15:clr>
             <a:srgbClr val="A4A3A4"/>
@@ -5294,11 +5296,13 @@
         </p:nvSpPr>
         <p:spPr/>
         <p:txBody>
-          <a:bodyPr/>
+          <a:bodyPr>
+            <a:normAutofit fontScale="40000" lnSpcReduction="20000"/>
+          </a:bodyPr>
           <a:lstStyle/>
           <a:p>
             <a:r>
-              <a:rPr lang="en-US" altLang="zh-CN" dirty="0" smtClean="0"/>
+              <a:rPr lang="en-US" altLang="zh-CN" b="1" dirty="0" smtClean="0"/>
               <a:t>Razor Engine</a:t>
             </a:r>
           </a:p>
@@ -5325,21 +5329,214 @@
           </a:p>
           <a:p>
             <a:r>
-              <a:rPr lang="en-US" altLang="zh-CN" dirty="0"/>
-              <a:t>Using Sections</a:t>
-            </a:r>
-          </a:p>
-          <a:p>
-            <a:r>
-              <a:rPr lang="en-US" altLang="zh-CN" dirty="0"/>
-              <a:t>Using Partial Views</a:t>
-            </a:r>
-          </a:p>
-          <a:p>
-            <a:r>
-              <a:rPr lang="en-US" altLang="zh-CN" dirty="0"/>
-              <a:t>Using Child Actions</a:t>
-            </a:r>
+              <a:rPr lang="en-US" altLang="zh-CN" b="1" dirty="0"/>
+              <a:t>Using </a:t>
+            </a:r>
+            <a:r>
+              <a:rPr lang="en-US" altLang="zh-CN" b="1" dirty="0" smtClean="0"/>
+              <a:t>Sections</a:t>
+            </a:r>
+          </a:p>
+          <a:p>
+            <a:pPr marL="0" indent="0">
+              <a:buNone/>
+            </a:pPr>
+            <a:r>
+              <a:rPr lang="en-US" altLang="zh-CN" sz="2400" dirty="0"/>
+              <a:t>Provides regions of contents within a </a:t>
+            </a:r>
+            <a:r>
+              <a:rPr lang="en-US" altLang="zh-CN" sz="2400" dirty="0" smtClean="0"/>
+              <a:t>layout</a:t>
+            </a:r>
+          </a:p>
+          <a:p>
+            <a:pPr marL="0" indent="0">
+              <a:buNone/>
+            </a:pPr>
+            <a:r>
+              <a:rPr lang="en-US" sz="2400" dirty="0"/>
+              <a:t>@section Footer {</a:t>
+            </a:r>
+          </a:p>
+          <a:p>
+            <a:pPr marL="0" indent="0">
+              <a:buNone/>
+            </a:pPr>
+            <a:r>
+              <a:rPr lang="en-US" sz="2400" dirty="0"/>
+              <a:t>    &lt;div class="view"&gt;</a:t>
+            </a:r>
+          </a:p>
+          <a:p>
+            <a:pPr marL="0" indent="0">
+              <a:buNone/>
+            </a:pPr>
+            <a:r>
+              <a:rPr lang="en-US" sz="2400" dirty="0"/>
+              <a:t>        This is the footer</a:t>
+            </a:r>
+          </a:p>
+          <a:p>
+            <a:pPr marL="0" indent="0">
+              <a:buNone/>
+            </a:pPr>
+            <a:r>
+              <a:rPr lang="en-US" sz="2400" dirty="0"/>
+              <a:t>    &lt;/div&gt;</a:t>
+            </a:r>
+          </a:p>
+          <a:p>
+            <a:pPr marL="0" indent="0">
+              <a:buNone/>
+            </a:pPr>
+            <a:r>
+              <a:rPr lang="en-US" sz="2400" dirty="0"/>
+              <a:t>}</a:t>
+            </a:r>
+            <a:endParaRPr lang="en-US" altLang="zh-CN" sz="2400" dirty="0"/>
+          </a:p>
+          <a:p>
+            <a:r>
+              <a:rPr lang="en-US" altLang="zh-CN" b="1" dirty="0"/>
+              <a:t>Using Partial </a:t>
+            </a:r>
+            <a:r>
+              <a:rPr lang="en-US" altLang="zh-CN" b="1" dirty="0" smtClean="0"/>
+              <a:t>Views</a:t>
+            </a:r>
+          </a:p>
+          <a:p>
+            <a:pPr marL="0" indent="0">
+              <a:buNone/>
+            </a:pPr>
+            <a:r>
+              <a:rPr lang="en-US" sz="2400" dirty="0"/>
+              <a:t>@</a:t>
+            </a:r>
+            <a:r>
+              <a:rPr lang="en-US" sz="2400" dirty="0" err="1"/>
+              <a:t>Html.Partial</a:t>
+            </a:r>
+            <a:r>
+              <a:rPr lang="en-US" sz="2400" dirty="0"/>
+              <a:t>("</a:t>
+            </a:r>
+            <a:r>
+              <a:rPr lang="en-US" sz="2400" dirty="0" err="1"/>
+              <a:t>MyPartial</a:t>
+            </a:r>
+            <a:r>
+              <a:rPr lang="en-US" sz="2400" dirty="0"/>
+              <a:t>")</a:t>
+            </a:r>
+            <a:endParaRPr lang="en-US" altLang="zh-CN" sz="2400" dirty="0"/>
+          </a:p>
+          <a:p>
+            <a:r>
+              <a:rPr lang="en-US" altLang="zh-CN" b="1" dirty="0"/>
+              <a:t>Using Child </a:t>
+            </a:r>
+            <a:r>
+              <a:rPr lang="en-US" altLang="zh-CN" b="1" dirty="0" smtClean="0"/>
+              <a:t>Actions</a:t>
+            </a:r>
+          </a:p>
+          <a:p>
+            <a:pPr marL="0" indent="0">
+              <a:buNone/>
+            </a:pPr>
+            <a:r>
+              <a:rPr lang="en-US" dirty="0"/>
+              <a:t> [</a:t>
+            </a:r>
+            <a:r>
+              <a:rPr lang="en-US" dirty="0" err="1"/>
+              <a:t>ChildActionOnly</a:t>
+            </a:r>
+            <a:r>
+              <a:rPr lang="en-US" dirty="0"/>
+              <a:t>]</a:t>
+            </a:r>
+          </a:p>
+          <a:p>
+            <a:pPr marL="0" indent="0">
+              <a:buNone/>
+            </a:pPr>
+            <a:r>
+              <a:rPr lang="en-US" dirty="0"/>
+              <a:t>        public </a:t>
+            </a:r>
+            <a:r>
+              <a:rPr lang="en-US" dirty="0" err="1"/>
+              <a:t>ActionResult</a:t>
+            </a:r>
+            <a:r>
+              <a:rPr lang="en-US" dirty="0"/>
+              <a:t> Time()</a:t>
+            </a:r>
+          </a:p>
+          <a:p>
+            <a:pPr marL="0" indent="0">
+              <a:buNone/>
+            </a:pPr>
+            <a:r>
+              <a:rPr lang="en-US" dirty="0"/>
+              <a:t>        {</a:t>
+            </a:r>
+          </a:p>
+          <a:p>
+            <a:pPr marL="0" indent="0">
+              <a:buNone/>
+            </a:pPr>
+            <a:r>
+              <a:rPr lang="en-US" dirty="0"/>
+              <a:t>            return </a:t>
+            </a:r>
+            <a:r>
+              <a:rPr lang="en-US" dirty="0" err="1"/>
+              <a:t>PartialView</a:t>
+            </a:r>
+            <a:r>
+              <a:rPr lang="en-US" dirty="0"/>
+              <a:t>(</a:t>
+            </a:r>
+            <a:r>
+              <a:rPr lang="en-US" dirty="0" err="1"/>
+              <a:t>DateTime.Now</a:t>
+            </a:r>
+            <a:r>
+              <a:rPr lang="en-US" dirty="0"/>
+              <a:t>);</a:t>
+            </a:r>
+          </a:p>
+          <a:p>
+            <a:pPr marL="0" indent="0">
+              <a:buNone/>
+            </a:pPr>
+            <a:r>
+              <a:rPr lang="en-US" dirty="0"/>
+              <a:t>        }</a:t>
+            </a:r>
+            <a:endParaRPr lang="en-US" altLang="zh-CN" dirty="0" smtClean="0"/>
+          </a:p>
+          <a:p>
+            <a:pPr marL="0" indent="0">
+              <a:buNone/>
+            </a:pPr>
+            <a:r>
+              <a:rPr lang="en-US" sz="2400" dirty="0"/>
+              <a:t>@</a:t>
+            </a:r>
+            <a:r>
+              <a:rPr lang="en-US" sz="2400" dirty="0" err="1"/>
+              <a:t>Html.Action</a:t>
+            </a:r>
+            <a:r>
+              <a:rPr lang="en-US" sz="2400" dirty="0"/>
+              <a:t>("Time")</a:t>
+            </a:r>
+            <a:endParaRPr lang="en-US" altLang="zh-CN" sz="2400" dirty="0"/>
           </a:p>
         </p:txBody>
       </p:sp>
@@ -5395,7 +5592,11 @@
           <a:bodyPr/>
           <a:lstStyle/>
           <a:p>
-            <a:endParaRPr lang="zh-CN" altLang="en-US"/>
+            <a:r>
+              <a:rPr lang="en-US" altLang="zh-CN" dirty="0"/>
+              <a:t>Views</a:t>
+            </a:r>
+            <a:endParaRPr lang="zh-CN" altLang="en-US" dirty="0"/>
           </a:p>
         </p:txBody>
       </p:sp>
@@ -5409,12 +5610,405 @@
             <p:ph idx="1"/>
           </p:nvPr>
         </p:nvSpPr>
-        <p:spPr/>
-        <p:txBody>
-          <a:bodyPr/>
+        <p:spPr>
+          <a:xfrm>
+            <a:off x="838200" y="1825624"/>
+            <a:ext cx="10515600" cy="4967061"/>
+          </a:xfrm>
+        </p:spPr>
+        <p:txBody>
+          <a:bodyPr>
+            <a:normAutofit fontScale="85000" lnSpcReduction="20000"/>
+          </a:bodyPr>
           <a:lstStyle/>
           <a:p>
-            <a:endParaRPr lang="zh-CN" altLang="en-US" dirty="0"/>
+            <a:r>
+              <a:rPr lang="en-US" altLang="zh-CN" dirty="0" smtClean="0"/>
+              <a:t>Built-in Helper Methods</a:t>
+            </a:r>
+          </a:p>
+          <a:p>
+            <a:pPr marL="0" indent="0">
+              <a:buNone/>
+            </a:pPr>
+            <a:r>
+              <a:rPr lang="en-US" dirty="0" err="1"/>
+              <a:t>BeginForm</a:t>
+            </a:r>
+            <a:r>
+              <a:rPr lang="en-US" dirty="0"/>
+              <a:t>()	</a:t>
+            </a:r>
+          </a:p>
+          <a:p>
+            <a:pPr marL="0" indent="0">
+              <a:buNone/>
+            </a:pPr>
+            <a:r>
+              <a:rPr lang="en-US" dirty="0" err="1"/>
+              <a:t>Html.CheckBox</a:t>
+            </a:r>
+            <a:r>
+              <a:rPr lang="en-US" dirty="0"/>
+              <a:t>("</a:t>
+            </a:r>
+            <a:r>
+              <a:rPr lang="en-US" dirty="0" err="1"/>
+              <a:t>myCheckbox</a:t>
+            </a:r>
+            <a:r>
+              <a:rPr lang="en-US" dirty="0"/>
+              <a:t>", false</a:t>
+            </a:r>
+            <a:r>
+              <a:rPr lang="en-US" dirty="0" smtClean="0"/>
+              <a:t>)</a:t>
+            </a:r>
+          </a:p>
+          <a:p>
+            <a:pPr marL="0" indent="0">
+              <a:buNone/>
+            </a:pPr>
+            <a:r>
+              <a:rPr lang="en-US" sz="2400" b="1" i="1" dirty="0"/>
+              <a:t>&lt;input id="</a:t>
+            </a:r>
+            <a:r>
+              <a:rPr lang="en-US" sz="2400" b="1" i="1" dirty="0" err="1"/>
+              <a:t>myCheckbox</a:t>
+            </a:r>
+            <a:r>
+              <a:rPr lang="en-US" sz="2400" b="1" i="1" dirty="0"/>
+              <a:t>" name="</a:t>
+            </a:r>
+            <a:r>
+              <a:rPr lang="en-US" sz="2400" b="1" i="1" dirty="0" err="1"/>
+              <a:t>myCheckbox</a:t>
+            </a:r>
+            <a:r>
+              <a:rPr lang="en-US" sz="2400" b="1" i="1" dirty="0"/>
+              <a:t>" type="checkbox" value="true" /&gt;</a:t>
+            </a:r>
+          </a:p>
+          <a:p>
+            <a:pPr marL="0" indent="0">
+              <a:buNone/>
+            </a:pPr>
+            <a:r>
+              <a:rPr lang="en-US" sz="2400" b="1" i="1" dirty="0"/>
+              <a:t>&lt;input name="</a:t>
+            </a:r>
+            <a:r>
+              <a:rPr lang="en-US" sz="2400" b="1" i="1" dirty="0" err="1"/>
+              <a:t>myCheckbox</a:t>
+            </a:r>
+            <a:r>
+              <a:rPr lang="en-US" sz="2400" b="1" i="1" dirty="0"/>
+              <a:t>" type="hidden" value="false" /&gt;</a:t>
+            </a:r>
+            <a:endParaRPr lang="en-US" sz="2400" i="1" dirty="0"/>
+          </a:p>
+          <a:p>
+            <a:pPr marL="0" indent="0">
+              <a:buNone/>
+            </a:pPr>
+            <a:r>
+              <a:rPr lang="en-US" dirty="0" err="1"/>
+              <a:t>Html.Hidden</a:t>
+            </a:r>
+            <a:r>
+              <a:rPr lang="en-US" dirty="0"/>
+              <a:t>("</a:t>
+            </a:r>
+            <a:r>
+              <a:rPr lang="en-US" dirty="0" err="1"/>
+              <a:t>myHidden</a:t>
+            </a:r>
+            <a:r>
+              <a:rPr lang="en-US" dirty="0"/>
+              <a:t>", "</a:t>
+            </a:r>
+            <a:r>
+              <a:rPr lang="en-US" dirty="0" err="1"/>
+              <a:t>val</a:t>
+            </a:r>
+            <a:r>
+              <a:rPr lang="en-US" dirty="0"/>
+              <a:t>")</a:t>
+            </a:r>
+          </a:p>
+          <a:p>
+            <a:pPr marL="0" indent="0">
+              <a:buNone/>
+            </a:pPr>
+            <a:r>
+              <a:rPr lang="en-US" dirty="0" err="1"/>
+              <a:t>Html.RadioButton</a:t>
+            </a:r>
+            <a:r>
+              <a:rPr lang="en-US" dirty="0"/>
+              <a:t>("</a:t>
+            </a:r>
+            <a:r>
+              <a:rPr lang="en-US" dirty="0" err="1"/>
+              <a:t>myRadiobutton</a:t>
+            </a:r>
+            <a:r>
+              <a:rPr lang="en-US" dirty="0"/>
+              <a:t>", "</a:t>
+            </a:r>
+            <a:r>
+              <a:rPr lang="en-US" dirty="0" err="1"/>
+              <a:t>val</a:t>
+            </a:r>
+            <a:r>
+              <a:rPr lang="en-US" dirty="0"/>
+              <a:t>", true)</a:t>
+            </a:r>
+          </a:p>
+          <a:p>
+            <a:pPr marL="0" indent="0">
+              <a:buNone/>
+            </a:pPr>
+            <a:r>
+              <a:rPr lang="en-US" dirty="0" err="1"/>
+              <a:t>Html.Password</a:t>
+            </a:r>
+            <a:r>
+              <a:rPr lang="en-US" dirty="0"/>
+              <a:t>("</a:t>
+            </a:r>
+            <a:r>
+              <a:rPr lang="en-US" dirty="0" err="1"/>
+              <a:t>myPassword</a:t>
+            </a:r>
+            <a:r>
+              <a:rPr lang="en-US" dirty="0"/>
+              <a:t>", "</a:t>
+            </a:r>
+            <a:r>
+              <a:rPr lang="en-US" dirty="0" err="1"/>
+              <a:t>val</a:t>
+            </a:r>
+            <a:r>
+              <a:rPr lang="en-US" dirty="0"/>
+              <a:t>")</a:t>
+            </a:r>
+          </a:p>
+          <a:p>
+            <a:pPr marL="0" indent="0">
+              <a:buNone/>
+            </a:pPr>
+            <a:r>
+              <a:rPr lang="en-US" dirty="0" err="1"/>
+              <a:t>Html.TextArea</a:t>
+            </a:r>
+            <a:r>
+              <a:rPr lang="en-US" dirty="0"/>
+              <a:t>("</a:t>
+            </a:r>
+            <a:r>
+              <a:rPr lang="en-US" dirty="0" err="1"/>
+              <a:t>myTextarea</a:t>
+            </a:r>
+            <a:r>
+              <a:rPr lang="en-US" dirty="0"/>
+              <a:t>", "</a:t>
+            </a:r>
+            <a:r>
+              <a:rPr lang="en-US" dirty="0" err="1"/>
+              <a:t>val</a:t>
+            </a:r>
+            <a:r>
+              <a:rPr lang="en-US" dirty="0"/>
+              <a:t>", 5, 20, null)</a:t>
+            </a:r>
+          </a:p>
+          <a:p>
+            <a:pPr marL="0" indent="0">
+              <a:buNone/>
+            </a:pPr>
+            <a:r>
+              <a:rPr lang="en-US" dirty="0" err="1"/>
+              <a:t>Html.TextBox</a:t>
+            </a:r>
+            <a:r>
+              <a:rPr lang="en-US" dirty="0"/>
+              <a:t>("</a:t>
+            </a:r>
+            <a:r>
+              <a:rPr lang="en-US" dirty="0" err="1"/>
+              <a:t>myTextbox</a:t>
+            </a:r>
+            <a:r>
+              <a:rPr lang="en-US" dirty="0"/>
+              <a:t>", "</a:t>
+            </a:r>
+            <a:r>
+              <a:rPr lang="en-US" dirty="0" err="1"/>
+              <a:t>val</a:t>
+            </a:r>
+            <a:r>
+              <a:rPr lang="en-US" dirty="0"/>
+              <a:t>")</a:t>
+            </a:r>
+          </a:p>
+          <a:p>
+            <a:pPr marL="0" indent="0">
+              <a:buNone/>
+            </a:pPr>
+            <a:r>
+              <a:rPr lang="en-US" sz="2400" b="1" i="1" dirty="0"/>
+              <a:t>&lt;input id="</a:t>
+            </a:r>
+            <a:r>
+              <a:rPr lang="en-US" sz="2400" b="1" i="1" dirty="0" err="1"/>
+              <a:t>myTextbox</a:t>
+            </a:r>
+            <a:r>
+              <a:rPr lang="en-US" sz="2400" b="1" i="1" dirty="0"/>
+              <a:t>" name="</a:t>
+            </a:r>
+            <a:r>
+              <a:rPr lang="en-US" sz="2400" b="1" i="1" dirty="0" err="1"/>
+              <a:t>myTextbox</a:t>
+            </a:r>
+            <a:r>
+              <a:rPr lang="en-US" sz="2400" b="1" i="1" dirty="0"/>
+              <a:t>" type="text" value="</a:t>
+            </a:r>
+            <a:r>
+              <a:rPr lang="en-US" sz="2400" b="1" i="1" dirty="0" err="1"/>
+              <a:t>val</a:t>
+            </a:r>
+            <a:r>
+              <a:rPr lang="en-US" sz="2400" b="1" i="1" dirty="0"/>
+              <a:t>" /&gt;</a:t>
+            </a:r>
+          </a:p>
+          <a:p>
+            <a:pPr marL="0" indent="0">
+              <a:buNone/>
+            </a:pPr>
+            <a:r>
+              <a:rPr lang="en-US" dirty="0" err="1"/>
+              <a:t>Html.Label</a:t>
+            </a:r>
+            <a:r>
+              <a:rPr lang="en-US" dirty="0"/>
+              <a:t>("</a:t>
+            </a:r>
+            <a:r>
+              <a:rPr lang="en-US" dirty="0" err="1"/>
+              <a:t>ProductName</a:t>
+            </a:r>
+            <a:r>
+              <a:rPr lang="en-US" dirty="0"/>
+              <a:t>","Product Name")</a:t>
+            </a:r>
+          </a:p>
+          <a:p>
+            <a:pPr marL="0" indent="0">
+              <a:buNone/>
+            </a:pPr>
+            <a:r>
+              <a:rPr lang="en-US" altLang="zh-CN" sz="2400" b="1" i="1" dirty="0"/>
+              <a:t>&lt;</a:t>
+            </a:r>
+            <a:r>
+              <a:rPr lang="en-US" altLang="zh-CN" sz="2400" b="1" i="1" dirty="0"/>
+              <a:t>label for="</a:t>
+            </a:r>
+            <a:r>
+              <a:rPr lang="en-US" altLang="zh-CN" sz="2400" b="1" i="1" dirty="0" err="1"/>
+              <a:t>ProductName</a:t>
+            </a:r>
+            <a:r>
+              <a:rPr lang="en-US" altLang="zh-CN" sz="2400" b="1" i="1" dirty="0"/>
+              <a:t>"&gt;Product Name&lt;/label&gt;</a:t>
+            </a:r>
+            <a:endParaRPr lang="zh-CN" altLang="en-US" sz="2400" b="1" i="1" dirty="0"/>
+          </a:p>
+        </p:txBody>
+      </p:sp>
+      <p:sp>
+        <p:nvSpPr>
+          <p:cNvPr id="4" name="Rounded Rectangle 3"/>
+          <p:cNvSpPr/>
+          <p:nvPr/>
+        </p:nvSpPr>
+        <p:spPr>
+          <a:xfrm>
+            <a:off x="4394717" y="1259632"/>
+            <a:ext cx="6839340" cy="1250302"/>
+          </a:xfrm>
+          <a:prstGeom prst="roundRect">
+            <a:avLst/>
+          </a:prstGeom>
+        </p:spPr>
+        <p:style>
+          <a:lnRef idx="2">
+            <a:schemeClr val="accent1">
+              <a:shade val="50000"/>
+            </a:schemeClr>
+          </a:lnRef>
+          <a:fillRef idx="1">
+            <a:schemeClr val="accent1"/>
+          </a:fillRef>
+          <a:effectRef idx="0">
+            <a:schemeClr val="accent1"/>
+          </a:effectRef>
+          <a:fontRef idx="minor">
+            <a:schemeClr val="lt1"/>
+          </a:fontRef>
+        </p:style>
+        <p:txBody>
+          <a:bodyPr rtlCol="0" anchor="ctr"/>
+          <a:lstStyle/>
+          <a:p>
+            <a:r>
+              <a:rPr lang="en-US" b="1" dirty="0" err="1"/>
+              <a:t>Html.TextBoxFor</a:t>
+            </a:r>
+            <a:r>
+              <a:rPr lang="en-US" b="1" dirty="0"/>
+              <a:t>(x =&gt; </a:t>
+            </a:r>
+            <a:r>
+              <a:rPr lang="en-US" b="1" dirty="0" err="1"/>
+              <a:t>x.FirstName</a:t>
+            </a:r>
+            <a:r>
+              <a:rPr lang="en-US" b="1" dirty="0" smtClean="0"/>
+              <a:t>)</a:t>
+            </a:r>
+          </a:p>
+          <a:p>
+            <a:r>
+              <a:rPr lang="en-US" b="1" dirty="0" smtClean="0"/>
+              <a:t>&lt;</a:t>
+            </a:r>
+            <a:r>
+              <a:rPr lang="en-US" b="1" dirty="0"/>
+              <a:t>input id="</a:t>
+            </a:r>
+            <a:r>
+              <a:rPr lang="en-US" b="1" dirty="0" err="1"/>
+              <a:t>FirstName</a:t>
+            </a:r>
+            <a:r>
+              <a:rPr lang="en-US" b="1" dirty="0"/>
+              <a:t>" name="</a:t>
+            </a:r>
+            <a:r>
+              <a:rPr lang="en-US" b="1" dirty="0" err="1"/>
+              <a:t>FirstName</a:t>
+            </a:r>
+            <a:r>
+              <a:rPr lang="en-US" b="1" dirty="0"/>
+              <a:t>" type="text" value="" /&gt;</a:t>
+            </a:r>
+            <a:endParaRPr lang="en-US" dirty="0"/>
           </a:p>
         </p:txBody>
       </p:sp>
@@ -5422,6 +6016,269 @@
     <p:extLst>
       <p:ext uri="{BB962C8B-B14F-4D97-AF65-F5344CB8AC3E}">
         <p14:creationId xmlns:p14="http://schemas.microsoft.com/office/powerpoint/2010/main" val="2263667834"/>
+      </p:ext>
+    </p:extLst>
+  </p:cSld>
+  <p:clrMapOvr>
+    <a:masterClrMapping/>
+  </p:clrMapOvr>
+  <p:timing>
+    <p:tnLst>
+      <p:par>
+        <p:cTn id="1" dur="indefinite" restart="never" nodeType="tmRoot"/>
+      </p:par>
+    </p:tnLst>
+  </p:timing>
+</p:sld>
+</file>
+
+<file path=ppt/slides/slide19.xml><?xml version="1.0" encoding="utf-8"?>
+<p:sld xmlns:a="http://schemas.openxmlformats.org/drawingml/2006/main" xmlns:r="http://schemas.openxmlformats.org/officeDocument/2006/relationships" xmlns:p="http://schemas.openxmlformats.org/presentationml/2006/main">
+  <p:cSld>
+    <p:spTree>
+      <p:nvGrpSpPr>
+        <p:cNvPr id="1" name=""/>
+        <p:cNvGrpSpPr/>
+        <p:nvPr/>
+      </p:nvGrpSpPr>
+      <p:grpSpPr>
+        <a:xfrm>
+          <a:off x="0" y="0"/>
+          <a:ext cx="0" cy="0"/>
+          <a:chOff x="0" y="0"/>
+          <a:chExt cx="0" cy="0"/>
+        </a:xfrm>
+      </p:grpSpPr>
+      <p:sp>
+        <p:nvSpPr>
+          <p:cNvPr id="2" name="Title 1"/>
+          <p:cNvSpPr>
+            <a:spLocks noGrp="1"/>
+          </p:cNvSpPr>
+          <p:nvPr>
+            <p:ph type="title"/>
+          </p:nvPr>
+        </p:nvSpPr>
+        <p:spPr/>
+        <p:txBody>
+          <a:bodyPr/>
+          <a:lstStyle/>
+          <a:p>
+            <a:r>
+              <a:rPr lang="en-US" altLang="zh-CN" dirty="0"/>
+              <a:t>Ajax Helper </a:t>
+            </a:r>
+            <a:r>
+              <a:rPr lang="en-US" altLang="zh-CN" dirty="0" smtClean="0"/>
+              <a:t>Methods</a:t>
+            </a:r>
+            <a:endParaRPr lang="en-US" dirty="0"/>
+          </a:p>
+        </p:txBody>
+      </p:sp>
+      <p:sp>
+        <p:nvSpPr>
+          <p:cNvPr id="3" name="Content Placeholder 2"/>
+          <p:cNvSpPr>
+            <a:spLocks noGrp="1"/>
+          </p:cNvSpPr>
+          <p:nvPr>
+            <p:ph idx="1"/>
+          </p:nvPr>
+        </p:nvSpPr>
+        <p:spPr/>
+        <p:txBody>
+          <a:bodyPr/>
+          <a:lstStyle/>
+          <a:p>
+            <a:endParaRPr lang="en-US" dirty="0" smtClean="0"/>
+          </a:p>
+          <a:p>
+            <a:r>
+              <a:rPr lang="en-US" dirty="0" smtClean="0"/>
+              <a:t>Add </a:t>
+            </a:r>
+            <a:r>
+              <a:rPr lang="en-US" dirty="0" err="1" smtClean="0"/>
+              <a:t>javascript</a:t>
+            </a:r>
+            <a:r>
+              <a:rPr lang="en-US" dirty="0"/>
+              <a:t> </a:t>
+            </a:r>
+            <a:r>
+              <a:rPr lang="en-US" dirty="0" smtClean="0"/>
+              <a:t>library </a:t>
+            </a:r>
+          </a:p>
+          <a:p>
+            <a:pPr marL="0" indent="0">
+              <a:buNone/>
+            </a:pPr>
+            <a:r>
+              <a:rPr lang="en-US" sz="2400" dirty="0" smtClean="0"/>
+              <a:t>jquery.unobtrusive-ajax.js</a:t>
+            </a:r>
+          </a:p>
+          <a:p>
+            <a:pPr marL="457200" indent="-457200">
+              <a:buFont typeface="+mj-lt"/>
+              <a:buAutoNum type="arabicPeriod"/>
+            </a:pPr>
+            <a:r>
+              <a:rPr lang="en-US" sz="2400" dirty="0"/>
+              <a:t> </a:t>
+            </a:r>
+            <a:r>
+              <a:rPr lang="en-US" sz="2400" dirty="0" err="1"/>
+              <a:t>bundles.Add</a:t>
+            </a:r>
+            <a:r>
+              <a:rPr lang="en-US" sz="2400" dirty="0"/>
+              <a:t>(new </a:t>
+            </a:r>
+            <a:r>
+              <a:rPr lang="en-US" sz="2400" dirty="0" err="1"/>
+              <a:t>ScriptBundle</a:t>
+            </a:r>
+            <a:r>
+              <a:rPr lang="en-US" sz="2400" dirty="0"/>
+              <a:t>("~/bundles/</a:t>
+            </a:r>
+            <a:r>
+              <a:rPr lang="en-US" sz="2400" dirty="0" err="1"/>
+              <a:t>jquery</a:t>
+            </a:r>
+            <a:r>
+              <a:rPr lang="en-US" sz="2400" dirty="0"/>
+              <a:t>").Include(</a:t>
+            </a:r>
+          </a:p>
+          <a:p>
+            <a:pPr marL="0" indent="0">
+              <a:buNone/>
+            </a:pPr>
+            <a:r>
+              <a:rPr lang="en-US" sz="2400" dirty="0"/>
+              <a:t>                        "~/Scripts/</a:t>
+            </a:r>
+            <a:r>
+              <a:rPr lang="en-US" sz="2400" dirty="0" err="1"/>
+              <a:t>jquery</a:t>
+            </a:r>
+            <a:r>
+              <a:rPr lang="en-US" sz="2400" dirty="0"/>
+              <a:t>-{version}.</a:t>
+            </a:r>
+            <a:r>
+              <a:rPr lang="en-US" sz="2400" dirty="0" err="1"/>
+              <a:t>js</a:t>
+            </a:r>
+            <a:r>
+              <a:rPr lang="en-US" sz="2400" dirty="0"/>
+              <a:t>", "~/Scripts/</a:t>
+            </a:r>
+            <a:r>
+              <a:rPr lang="en-US" sz="2400" dirty="0" err="1"/>
+              <a:t>jquery.unobtrusive</a:t>
+            </a:r>
+            <a:r>
+              <a:rPr lang="en-US" sz="2400" dirty="0" smtClean="0"/>
+              <a:t>*"));</a:t>
+            </a:r>
+          </a:p>
+          <a:p>
+            <a:pPr marL="0" indent="0">
+              <a:buNone/>
+            </a:pPr>
+            <a:r>
+              <a:rPr lang="en-US" sz="2400" dirty="0" smtClean="0"/>
+              <a:t>2.  use </a:t>
+            </a:r>
+            <a:r>
+              <a:rPr lang="en-US" sz="2400" dirty="0"/>
+              <a:t> @</a:t>
+            </a:r>
+            <a:r>
+              <a:rPr lang="en-US" sz="2400" dirty="0" err="1"/>
+              <a:t>RenderSection</a:t>
+            </a:r>
+            <a:r>
+              <a:rPr lang="en-US" sz="2400" dirty="0"/>
+              <a:t>("scripts", required: false)</a:t>
+            </a:r>
+            <a:endParaRPr lang="en-US" sz="2400" dirty="0"/>
+          </a:p>
+        </p:txBody>
+      </p:sp>
+      <p:pic>
+        <p:nvPicPr>
+          <p:cNvPr id="1026" name="Picture 2"/>
+          <p:cNvPicPr>
+            <a:picLocks noChangeAspect="1" noChangeArrowheads="1"/>
+          </p:cNvPicPr>
+          <p:nvPr/>
+        </p:nvPicPr>
+        <p:blipFill>
+          <a:blip r:embed="rId2">
+            <a:extLst>
+              <a:ext uri="{28A0092B-C50C-407E-A947-70E740481C1C}">
+                <a14:useLocalDpi xmlns:a14="http://schemas.microsoft.com/office/drawing/2010/main" val="0"/>
+              </a:ext>
+            </a:extLst>
+          </a:blip>
+          <a:srcRect/>
+          <a:stretch>
+            <a:fillRect/>
+          </a:stretch>
+        </p:blipFill>
+        <p:spPr bwMode="auto">
+          <a:xfrm>
+            <a:off x="1216771" y="4613599"/>
+            <a:ext cx="5876925" cy="952500"/>
+          </a:xfrm>
+          <a:prstGeom prst="rect">
+            <a:avLst/>
+          </a:prstGeom>
+          <a:noFill/>
+          <a:ln>
+            <a:noFill/>
+          </a:ln>
+          <a:effectLst/>
+          <a:extLst>
+            <a:ext uri="{909E8E84-426E-40DD-AFC4-6F175D3DCCD1}">
+              <a14:hiddenFill xmlns:a14="http://schemas.microsoft.com/office/drawing/2010/main">
+                <a:solidFill>
+                  <a:schemeClr val="accent1"/>
+                </a:solidFill>
+              </a14:hiddenFill>
+            </a:ext>
+            <a:ext uri="{91240B29-F687-4F45-9708-019B960494DF}">
+              <a14:hiddenLine xmlns:a14="http://schemas.microsoft.com/office/drawing/2010/main" w="9525">
+                <a:solidFill>
+                  <a:schemeClr val="tx1"/>
+                </a:solidFill>
+                <a:miter lim="800000"/>
+                <a:headEnd/>
+                <a:tailEnd/>
+              </a14:hiddenLine>
+            </a:ext>
+            <a:ext uri="{AF507438-7753-43E0-B8FC-AC1667EBCBE1}">
+              <a14:hiddenEffects xmlns:a14="http://schemas.microsoft.com/office/drawing/2010/main">
+                <a:effectLst>
+                  <a:outerShdw dist="35921" dir="2700000" algn="ctr" rotWithShape="0">
+                    <a:schemeClr val="bg2"/>
+                  </a:outerShdw>
+                </a:effectLst>
+              </a14:hiddenEffects>
+            </a:ext>
+          </a:extLst>
+        </p:spPr>
+      </p:pic>
+    </p:spTree>
+    <p:extLst>
+      <p:ext uri="{BB962C8B-B14F-4D97-AF65-F5344CB8AC3E}">
+        <p14:creationId xmlns:p14="http://schemas.microsoft.com/office/powerpoint/2010/main" val="755226655"/>
       </p:ext>
     </p:extLst>
   </p:cSld>
@@ -5518,14 +6375,19 @@
           </a:p>
           <a:p>
             <a:r>
+              <a:rPr lang="en-US" altLang="zh-CN" dirty="0"/>
+              <a:t>Ajax Helper </a:t>
+            </a:r>
+            <a:r>
+              <a:rPr lang="en-US" altLang="zh-CN" dirty="0" smtClean="0"/>
+              <a:t>Methods</a:t>
+            </a:r>
+            <a:endParaRPr lang="en-US" altLang="zh-CN" dirty="0" smtClean="0"/>
+          </a:p>
+          <a:p>
+            <a:r>
               <a:rPr lang="en-US" altLang="zh-CN" dirty="0" smtClean="0"/>
               <a:t>Model Binding</a:t>
-            </a:r>
-          </a:p>
-          <a:p>
-            <a:r>
-              <a:rPr lang="en-US" altLang="zh-CN" dirty="0" smtClean="0"/>
-              <a:t>Ajax Helper Methods</a:t>
             </a:r>
           </a:p>
           <a:p>
@@ -5537,6 +6399,94 @@
     <p:extLst>
       <p:ext uri="{BB962C8B-B14F-4D97-AF65-F5344CB8AC3E}">
         <p14:creationId xmlns:p14="http://schemas.microsoft.com/office/powerpoint/2010/main" val="2545670779"/>
+      </p:ext>
+    </p:extLst>
+  </p:cSld>
+  <p:clrMapOvr>
+    <a:masterClrMapping/>
+  </p:clrMapOvr>
+  <p:timing>
+    <p:tnLst>
+      <p:par>
+        <p:cTn id="1" dur="indefinite" restart="never" nodeType="tmRoot"/>
+      </p:par>
+    </p:tnLst>
+  </p:timing>
+</p:sld>
+</file>
+
+<file path=ppt/slides/slide20.xml><?xml version="1.0" encoding="utf-8"?>
+<p:sld xmlns:a="http://schemas.openxmlformats.org/drawingml/2006/main" xmlns:r="http://schemas.openxmlformats.org/officeDocument/2006/relationships" xmlns:p="http://schemas.openxmlformats.org/presentationml/2006/main">
+  <p:cSld>
+    <p:spTree>
+      <p:nvGrpSpPr>
+        <p:cNvPr id="1" name=""/>
+        <p:cNvGrpSpPr/>
+        <p:nvPr/>
+      </p:nvGrpSpPr>
+      <p:grpSpPr>
+        <a:xfrm>
+          <a:off x="0" y="0"/>
+          <a:ext cx="0" cy="0"/>
+          <a:chOff x="0" y="0"/>
+          <a:chExt cx="0" cy="0"/>
+        </a:xfrm>
+      </p:grpSpPr>
+      <p:sp>
+        <p:nvSpPr>
+          <p:cNvPr id="2" name="Title 1"/>
+          <p:cNvSpPr>
+            <a:spLocks noGrp="1"/>
+          </p:cNvSpPr>
+          <p:nvPr>
+            <p:ph type="title"/>
+          </p:nvPr>
+        </p:nvSpPr>
+        <p:spPr/>
+        <p:txBody>
+          <a:bodyPr/>
+          <a:lstStyle/>
+          <a:p>
+            <a:r>
+              <a:rPr lang="en-US" altLang="zh-CN" dirty="0"/>
+              <a:t>Ajax Helper Methods</a:t>
+            </a:r>
+            <a:endParaRPr lang="en-US" dirty="0"/>
+          </a:p>
+        </p:txBody>
+      </p:sp>
+      <p:sp>
+        <p:nvSpPr>
+          <p:cNvPr id="3" name="Content Placeholder 2"/>
+          <p:cNvSpPr>
+            <a:spLocks noGrp="1"/>
+          </p:cNvSpPr>
+          <p:nvPr>
+            <p:ph idx="1"/>
+          </p:nvPr>
+        </p:nvSpPr>
+        <p:spPr/>
+        <p:txBody>
+          <a:bodyPr/>
+          <a:lstStyle/>
+          <a:p>
+            <a:r>
+              <a:rPr lang="en-US" smtClean="0"/>
+              <a:t>Use Ajax Link</a:t>
+            </a:r>
+          </a:p>
+          <a:p>
+            <a:pPr marL="0" indent="0">
+              <a:buNone/>
+            </a:pPr>
+            <a:endParaRPr lang="en-US"/>
+          </a:p>
+        </p:txBody>
+      </p:sp>
+    </p:spTree>
+    <p:extLst>
+      <p:ext uri="{BB962C8B-B14F-4D97-AF65-F5344CB8AC3E}">
+        <p14:creationId xmlns:p14="http://schemas.microsoft.com/office/powerpoint/2010/main" val="332613068"/>
       </p:ext>
     </p:extLst>
   </p:cSld>
@@ -7974,7 +8924,7 @@
   <a:extraClrSchemeLst/>
   <a:extLst>
     <a:ext uri="{05A4C25C-085E-4340-85A3-A5531E510DB2}">
-      <thm15:themeFamily xmlns:thm15="http://schemas.microsoft.com/office/thememl/2012/main" name="Office Theme" id="{62F939B6-93AF-4DB8-9C6B-D6C7DFDC589F}" vid="{4A3C46E8-61CC-4603-A589-7422A47A8E4A}"/>
+      <thm15:themeFamily xmlns:thm15="http://schemas.microsoft.com/office/thememl/2012/main" xmlns="" name="Office Theme" id="{62F939B6-93AF-4DB8-9C6B-D6C7DFDC589F}" vid="{4A3C46E8-61CC-4603-A589-7422A47A8E4A}"/>
     </a:ext>
   </a:extLst>
 </a:theme>

</xml_diff>